<commit_message>
[MM] Updated talk and transcrpit
</commit_message>
<xml_diff>
--- a/Mitch_Hawaii_talk. .pptx
+++ b/Mitch_Hawaii_talk. .pptx
@@ -630,6 +630,93 @@
 </p:notes>
 </file>
 
+<file path=ppt/notesSlides/notesSlide10.xml><?xml version="1.0" encoding="utf-8"?>
+<p:notes xmlns:a="http://schemas.openxmlformats.org/drawingml/2006/main" xmlns:r="http://schemas.openxmlformats.org/officeDocument/2006/relationships" xmlns:p="http://schemas.openxmlformats.org/presentationml/2006/main">
+  <p:cSld>
+    <p:spTree>
+      <p:nvGrpSpPr>
+        <p:cNvPr id="1" name=""/>
+        <p:cNvGrpSpPr/>
+        <p:nvPr/>
+      </p:nvGrpSpPr>
+      <p:grpSpPr>
+        <a:xfrm>
+          <a:off x="0" y="0"/>
+          <a:ext cx="0" cy="0"/>
+          <a:chOff x="0" y="0"/>
+          <a:chExt cx="0" cy="0"/>
+        </a:xfrm>
+      </p:grpSpPr>
+      <p:sp>
+        <p:nvSpPr>
+          <p:cNvPr id="2" name="Slide Image Placeholder 1"/>
+          <p:cNvSpPr>
+            <a:spLocks noGrp="1" noRot="1" noChangeAspect="1"/>
+          </p:cNvSpPr>
+          <p:nvPr>
+            <p:ph type="sldImg"/>
+          </p:nvPr>
+        </p:nvSpPr>
+        <p:spPr/>
+      </p:sp>
+      <p:sp>
+        <p:nvSpPr>
+          <p:cNvPr id="3" name="Notes Placeholder 2"/>
+          <p:cNvSpPr>
+            <a:spLocks noGrp="1"/>
+          </p:cNvSpPr>
+          <p:nvPr>
+            <p:ph type="body" idx="1"/>
+          </p:nvPr>
+        </p:nvSpPr>
+        <p:spPr/>
+        <p:txBody>
+          <a:bodyPr/>
+          <a:lstStyle/>
+          <a:p>
+            <a:r>
+              <a:rPr lang="en-US" dirty="0"/>
+              <a:t>Bands from data -&gt; simulated bands. Side by side. </a:t>
+            </a:r>
+          </a:p>
+        </p:txBody>
+      </p:sp>
+      <p:sp>
+        <p:nvSpPr>
+          <p:cNvPr id="4" name="Slide Number Placeholder 3"/>
+          <p:cNvSpPr>
+            <a:spLocks noGrp="1"/>
+          </p:cNvSpPr>
+          <p:nvPr>
+            <p:ph type="sldNum" sz="quarter" idx="5"/>
+          </p:nvPr>
+        </p:nvSpPr>
+        <p:spPr/>
+        <p:txBody>
+          <a:bodyPr/>
+          <a:lstStyle/>
+          <a:p>
+            <a:fld id="{C6AEA146-89B5-4A42-BEB6-D6A5BB50F046}" type="slidenum">
+              <a:rPr lang="en-US" smtClean="0"/>
+              <a:t>11</a:t>
+            </a:fld>
+            <a:endParaRPr lang="en-US"/>
+          </a:p>
+        </p:txBody>
+      </p:sp>
+    </p:spTree>
+    <p:extLst>
+      <p:ext uri="{BB962C8B-B14F-4D97-AF65-F5344CB8AC3E}">
+        <p14:creationId xmlns:p14="http://schemas.microsoft.com/office/powerpoint/2010/main" val="2868716704"/>
+      </p:ext>
+    </p:extLst>
+  </p:cSld>
+  <p:clrMapOvr>
+    <a:masterClrMapping/>
+  </p:clrMapOvr>
+</p:notes>
+</file>
+
 <file path=ppt/notesSlides/notesSlide2.xml><?xml version="1.0" encoding="utf-8"?>
 <p:notes xmlns:a="http://schemas.openxmlformats.org/drawingml/2006/main" xmlns:r="http://schemas.openxmlformats.org/officeDocument/2006/relationships" xmlns:p="http://schemas.openxmlformats.org/presentationml/2006/main">
   <p:cSld>
@@ -1080,14 +1167,8 @@
           <a:p>
             <a:r>
               <a:rPr lang="en-US" dirty="0"/>
-              <a:t>They can measure charge and phonons separately, this gives them a direct measure of the yield. </a:t>
-            </a:r>
-          </a:p>
-          <a:p>
-            <a:endParaRPr lang="en-US" dirty="0"/>
-          </a:p>
-          <a:p>
-            <a:endParaRPr lang="en-US" dirty="0"/>
+              <a:t>Will talk more about it. Less bullet points. </a:t>
+            </a:r>
           </a:p>
         </p:txBody>
       </p:sp>
@@ -1108,7 +1189,7 @@
           <a:p>
             <a:fld id="{C6AEA146-89B5-4A42-BEB6-D6A5BB50F046}" type="slidenum">
               <a:rPr lang="en-US" smtClean="0"/>
-              <a:t>8</a:t>
+              <a:t>7</a:t>
             </a:fld>
             <a:endParaRPr lang="en-US"/>
           </a:p>
@@ -1117,7 +1198,7 @@
     </p:spTree>
     <p:extLst>
       <p:ext uri="{BB962C8B-B14F-4D97-AF65-F5344CB8AC3E}">
-        <p14:creationId xmlns:p14="http://schemas.microsoft.com/office/powerpoint/2010/main" val="2530409236"/>
+        <p14:creationId xmlns:p14="http://schemas.microsoft.com/office/powerpoint/2010/main" val="1293990840"/>
       </p:ext>
     </p:extLst>
   </p:cSld>
@@ -1201,7 +1282,7 @@
           <a:p>
             <a:fld id="{C6AEA146-89B5-4A42-BEB6-D6A5BB50F046}" type="slidenum">
               <a:rPr lang="en-US" smtClean="0"/>
-              <a:t>9</a:t>
+              <a:t>8</a:t>
             </a:fld>
             <a:endParaRPr lang="en-US"/>
           </a:p>
@@ -1210,7 +1291,7 @@
     </p:spTree>
     <p:extLst>
       <p:ext uri="{BB962C8B-B14F-4D97-AF65-F5344CB8AC3E}">
-        <p14:creationId xmlns:p14="http://schemas.microsoft.com/office/powerpoint/2010/main" val="286871158"/>
+        <p14:creationId xmlns:p14="http://schemas.microsoft.com/office/powerpoint/2010/main" val="2530409236"/>
       </p:ext>
     </p:extLst>
   </p:cSld>
@@ -1294,7 +1375,7 @@
           <a:p>
             <a:fld id="{C6AEA146-89B5-4A42-BEB6-D6A5BB50F046}" type="slidenum">
               <a:rPr lang="en-US" smtClean="0"/>
-              <a:t>10</a:t>
+              <a:t>9</a:t>
             </a:fld>
             <a:endParaRPr lang="en-US"/>
           </a:p>
@@ -1303,7 +1384,7 @@
     </p:spTree>
     <p:extLst>
       <p:ext uri="{BB962C8B-B14F-4D97-AF65-F5344CB8AC3E}">
-        <p14:creationId xmlns:p14="http://schemas.microsoft.com/office/powerpoint/2010/main" val="3607152850"/>
+        <p14:creationId xmlns:p14="http://schemas.microsoft.com/office/powerpoint/2010/main" val="286871158"/>
       </p:ext>
     </p:extLst>
   </p:cSld>
@@ -1359,8 +1440,14 @@
           <a:p>
             <a:r>
               <a:rPr lang="en-US" dirty="0"/>
-              <a:t>Bands from data -&gt; simulated bands. Side by side. </a:t>
-            </a:r>
+              <a:t>They can measure charge and phonons separately, this gives them a direct measure of the yield. </a:t>
+            </a:r>
+          </a:p>
+          <a:p>
+            <a:endParaRPr lang="en-US" dirty="0"/>
+          </a:p>
+          <a:p>
+            <a:endParaRPr lang="en-US" dirty="0"/>
           </a:p>
         </p:txBody>
       </p:sp>
@@ -1381,7 +1468,7 @@
           <a:p>
             <a:fld id="{C6AEA146-89B5-4A42-BEB6-D6A5BB50F046}" type="slidenum">
               <a:rPr lang="en-US" smtClean="0"/>
-              <a:t>11</a:t>
+              <a:t>10</a:t>
             </a:fld>
             <a:endParaRPr lang="en-US"/>
           </a:p>
@@ -1390,7 +1477,7 @@
     </p:spTree>
     <p:extLst>
       <p:ext uri="{BB962C8B-B14F-4D97-AF65-F5344CB8AC3E}">
-        <p14:creationId xmlns:p14="http://schemas.microsoft.com/office/powerpoint/2010/main" val="2868716704"/>
+        <p14:creationId xmlns:p14="http://schemas.microsoft.com/office/powerpoint/2010/main" val="3607152850"/>
       </p:ext>
     </p:extLst>
   </p:cSld>
@@ -5750,7 +5837,7 @@
               <a:rPr lang="en-US" smtClean="0"/>
               <a:t>2</a:t>
             </a:fld>
-            <a:endParaRPr lang="en-US"/>
+            <a:endParaRPr lang="en-US" dirty="0"/>
           </a:p>
         </p:txBody>
       </p:sp>
@@ -5784,6 +5871,351 @@
           </a:prstGeom>
         </p:spPr>
       </p:pic>
+      <p:sp>
+        <p:nvSpPr>
+          <p:cNvPr id="5" name="TextBox 4">
+            <a:extLst>
+              <a:ext uri="{FF2B5EF4-FFF2-40B4-BE49-F238E27FC236}">
+                <a16:creationId xmlns:a16="http://schemas.microsoft.com/office/drawing/2014/main" id="{42E4C1C9-D897-6144-8ADF-63341E5324EB}"/>
+              </a:ext>
+            </a:extLst>
+          </p:cNvPr>
+          <p:cNvSpPr txBox="1"/>
+          <p:nvPr/>
+        </p:nvSpPr>
+        <p:spPr>
+          <a:xfrm>
+            <a:off x="9429007" y="1939002"/>
+            <a:ext cx="1102289" cy="369332"/>
+          </a:xfrm>
+          <a:prstGeom prst="rect">
+            <a:avLst/>
+          </a:prstGeom>
+          <a:noFill/>
+        </p:spPr>
+        <p:txBody>
+          <a:bodyPr wrap="none" rtlCol="0">
+            <a:spAutoFit/>
+          </a:bodyPr>
+          <a:lstStyle/>
+          <a:p>
+            <a:r>
+              <a:rPr lang="en-US" dirty="0" err="1"/>
+              <a:t>CDMSlite</a:t>
+            </a:r>
+            <a:r>
+              <a:rPr lang="en-US" dirty="0"/>
+              <a:t> </a:t>
+            </a:r>
+          </a:p>
+        </p:txBody>
+      </p:sp>
+      <p:cxnSp>
+        <p:nvCxnSpPr>
+          <p:cNvPr id="8" name="Straight Arrow Connector 7">
+            <a:extLst>
+              <a:ext uri="{FF2B5EF4-FFF2-40B4-BE49-F238E27FC236}">
+                <a16:creationId xmlns:a16="http://schemas.microsoft.com/office/drawing/2014/main" id="{BC09A26C-7FDB-794F-BB1E-910BFAD1083D}"/>
+              </a:ext>
+            </a:extLst>
+          </p:cNvPr>
+          <p:cNvCxnSpPr>
+            <a:stCxn id="5" idx="1"/>
+          </p:cNvCxnSpPr>
+          <p:nvPr/>
+        </p:nvCxnSpPr>
+        <p:spPr>
+          <a:xfrm flipH="1">
+            <a:off x="8182098" y="2123668"/>
+            <a:ext cx="1246909" cy="52841"/>
+          </a:xfrm>
+          <a:prstGeom prst="straightConnector1">
+            <a:avLst/>
+          </a:prstGeom>
+          <a:ln>
+            <a:tailEnd type="triangle"/>
+          </a:ln>
+        </p:spPr>
+        <p:style>
+          <a:lnRef idx="1">
+            <a:schemeClr val="accent1"/>
+          </a:lnRef>
+          <a:fillRef idx="0">
+            <a:schemeClr val="accent1"/>
+          </a:fillRef>
+          <a:effectRef idx="0">
+            <a:schemeClr val="accent1"/>
+          </a:effectRef>
+          <a:fontRef idx="minor">
+            <a:schemeClr val="tx1"/>
+          </a:fontRef>
+        </p:style>
+      </p:cxnSp>
+      <p:sp>
+        <p:nvSpPr>
+          <p:cNvPr id="9" name="TextBox 8">
+            <a:extLst>
+              <a:ext uri="{FF2B5EF4-FFF2-40B4-BE49-F238E27FC236}">
+                <a16:creationId xmlns:a16="http://schemas.microsoft.com/office/drawing/2014/main" id="{71A5F053-8419-0A41-BAF2-6097B776BDB3}"/>
+              </a:ext>
+            </a:extLst>
+          </p:cNvPr>
+          <p:cNvSpPr txBox="1"/>
+          <p:nvPr/>
+        </p:nvSpPr>
+        <p:spPr>
+          <a:xfrm>
+            <a:off x="8610600" y="4286992"/>
+            <a:ext cx="865301" cy="369332"/>
+          </a:xfrm>
+          <a:prstGeom prst="rect">
+            <a:avLst/>
+          </a:prstGeom>
+          <a:noFill/>
+        </p:spPr>
+        <p:txBody>
+          <a:bodyPr wrap="none" rtlCol="0">
+            <a:spAutoFit/>
+          </a:bodyPr>
+          <a:lstStyle/>
+          <a:p>
+            <a:r>
+              <a:rPr lang="en-US" dirty="0"/>
+              <a:t>CRESST</a:t>
+            </a:r>
+          </a:p>
+        </p:txBody>
+      </p:sp>
+      <p:cxnSp>
+        <p:nvCxnSpPr>
+          <p:cNvPr id="11" name="Straight Arrow Connector 10">
+            <a:extLst>
+              <a:ext uri="{FF2B5EF4-FFF2-40B4-BE49-F238E27FC236}">
+                <a16:creationId xmlns:a16="http://schemas.microsoft.com/office/drawing/2014/main" id="{F0212805-0856-9643-B036-283EE69E3F30}"/>
+              </a:ext>
+            </a:extLst>
+          </p:cNvPr>
+          <p:cNvCxnSpPr>
+            <a:cxnSpLocks/>
+          </p:cNvCxnSpPr>
+          <p:nvPr/>
+        </p:nvCxnSpPr>
+        <p:spPr>
+          <a:xfrm flipV="1">
+            <a:off x="9429007" y="3633897"/>
+            <a:ext cx="154380" cy="641220"/>
+          </a:xfrm>
+          <a:prstGeom prst="straightConnector1">
+            <a:avLst/>
+          </a:prstGeom>
+          <a:ln>
+            <a:tailEnd type="triangle"/>
+          </a:ln>
+        </p:spPr>
+        <p:style>
+          <a:lnRef idx="1">
+            <a:schemeClr val="accent1"/>
+          </a:lnRef>
+          <a:fillRef idx="0">
+            <a:schemeClr val="accent1"/>
+          </a:fillRef>
+          <a:effectRef idx="0">
+            <a:schemeClr val="accent1"/>
+          </a:effectRef>
+          <a:fontRef idx="minor">
+            <a:schemeClr val="tx1"/>
+          </a:fontRef>
+        </p:style>
+      </p:cxnSp>
+      <p:sp>
+        <p:nvSpPr>
+          <p:cNvPr id="13" name="TextBox 12">
+            <a:extLst>
+              <a:ext uri="{FF2B5EF4-FFF2-40B4-BE49-F238E27FC236}">
+                <a16:creationId xmlns:a16="http://schemas.microsoft.com/office/drawing/2014/main" id="{3614C080-7AA8-5A4D-8216-BA1244D7719C}"/>
+              </a:ext>
+            </a:extLst>
+          </p:cNvPr>
+          <p:cNvSpPr txBox="1"/>
+          <p:nvPr/>
+        </p:nvSpPr>
+        <p:spPr>
+          <a:xfrm>
+            <a:off x="9506197" y="2308334"/>
+            <a:ext cx="1298753" cy="369332"/>
+          </a:xfrm>
+          <a:prstGeom prst="rect">
+            <a:avLst/>
+          </a:prstGeom>
+          <a:noFill/>
+        </p:spPr>
+        <p:txBody>
+          <a:bodyPr wrap="none" rtlCol="0">
+            <a:spAutoFit/>
+          </a:bodyPr>
+          <a:lstStyle/>
+          <a:p>
+            <a:r>
+              <a:rPr lang="en-US" dirty="0" err="1"/>
+              <a:t>SuperCDMS</a:t>
+            </a:r>
+            <a:endParaRPr lang="en-US" dirty="0"/>
+          </a:p>
+        </p:txBody>
+      </p:sp>
+      <p:cxnSp>
+        <p:nvCxnSpPr>
+          <p:cNvPr id="15" name="Straight Arrow Connector 14">
+            <a:extLst>
+              <a:ext uri="{FF2B5EF4-FFF2-40B4-BE49-F238E27FC236}">
+                <a16:creationId xmlns:a16="http://schemas.microsoft.com/office/drawing/2014/main" id="{AB87FB95-D986-154E-8EC4-0329477DB758}"/>
+              </a:ext>
+            </a:extLst>
+          </p:cNvPr>
+          <p:cNvCxnSpPr>
+            <a:cxnSpLocks/>
+            <a:stCxn id="13" idx="1"/>
+          </p:cNvCxnSpPr>
+          <p:nvPr/>
+        </p:nvCxnSpPr>
+        <p:spPr>
+          <a:xfrm flipH="1">
+            <a:off x="9310255" y="2493000"/>
+            <a:ext cx="195942" cy="20915"/>
+          </a:xfrm>
+          <a:prstGeom prst="straightConnector1">
+            <a:avLst/>
+          </a:prstGeom>
+          <a:ln>
+            <a:tailEnd type="triangle"/>
+          </a:ln>
+        </p:spPr>
+        <p:style>
+          <a:lnRef idx="1">
+            <a:schemeClr val="accent1"/>
+          </a:lnRef>
+          <a:fillRef idx="0">
+            <a:schemeClr val="accent1"/>
+          </a:fillRef>
+          <a:effectRef idx="0">
+            <a:schemeClr val="accent1"/>
+          </a:effectRef>
+          <a:fontRef idx="minor">
+            <a:schemeClr val="tx1"/>
+          </a:fontRef>
+        </p:style>
+      </p:cxnSp>
+      <p:sp>
+        <p:nvSpPr>
+          <p:cNvPr id="17" name="TextBox 16">
+            <a:extLst>
+              <a:ext uri="{FF2B5EF4-FFF2-40B4-BE49-F238E27FC236}">
+                <a16:creationId xmlns:a16="http://schemas.microsoft.com/office/drawing/2014/main" id="{F50392BB-9FD4-8349-B4F8-C05A417A61ED}"/>
+              </a:ext>
+            </a:extLst>
+          </p:cNvPr>
+          <p:cNvSpPr txBox="1"/>
+          <p:nvPr/>
+        </p:nvSpPr>
+        <p:spPr>
+          <a:xfrm>
+            <a:off x="9574773" y="4471658"/>
+            <a:ext cx="545214" cy="369332"/>
+          </a:xfrm>
+          <a:prstGeom prst="rect">
+            <a:avLst/>
+          </a:prstGeom>
+          <a:noFill/>
+        </p:spPr>
+        <p:txBody>
+          <a:bodyPr wrap="none" rtlCol="0">
+            <a:spAutoFit/>
+          </a:bodyPr>
+          <a:lstStyle/>
+          <a:p>
+            <a:r>
+              <a:rPr lang="en-US" dirty="0"/>
+              <a:t>LUX</a:t>
+            </a:r>
+          </a:p>
+        </p:txBody>
+      </p:sp>
+      <p:cxnSp>
+        <p:nvCxnSpPr>
+          <p:cNvPr id="19" name="Straight Arrow Connector 18">
+            <a:extLst>
+              <a:ext uri="{FF2B5EF4-FFF2-40B4-BE49-F238E27FC236}">
+                <a16:creationId xmlns:a16="http://schemas.microsoft.com/office/drawing/2014/main" id="{8A5FB1F2-AB6F-6D42-BB04-60355E830876}"/>
+              </a:ext>
+            </a:extLst>
+          </p:cNvPr>
+          <p:cNvCxnSpPr>
+            <a:cxnSpLocks/>
+          </p:cNvCxnSpPr>
+          <p:nvPr/>
+        </p:nvCxnSpPr>
+        <p:spPr>
+          <a:xfrm flipV="1">
+            <a:off x="9847380" y="4001295"/>
+            <a:ext cx="290473" cy="655029"/>
+          </a:xfrm>
+          <a:prstGeom prst="straightConnector1">
+            <a:avLst/>
+          </a:prstGeom>
+          <a:ln>
+            <a:tailEnd type="triangle"/>
+          </a:ln>
+        </p:spPr>
+        <p:style>
+          <a:lnRef idx="1">
+            <a:schemeClr val="accent1"/>
+          </a:lnRef>
+          <a:fillRef idx="0">
+            <a:schemeClr val="accent1"/>
+          </a:fillRef>
+          <a:effectRef idx="0">
+            <a:schemeClr val="accent1"/>
+          </a:effectRef>
+          <a:fontRef idx="minor">
+            <a:schemeClr val="tx1"/>
+          </a:fontRef>
+        </p:style>
+      </p:cxnSp>
+      <p:sp>
+        <p:nvSpPr>
+          <p:cNvPr id="22" name="TextBox 21">
+            <a:extLst>
+              <a:ext uri="{FF2B5EF4-FFF2-40B4-BE49-F238E27FC236}">
+                <a16:creationId xmlns:a16="http://schemas.microsoft.com/office/drawing/2014/main" id="{073E0A56-A830-F847-9EC6-A267EE061E39}"/>
+              </a:ext>
+            </a:extLst>
+          </p:cNvPr>
+          <p:cNvSpPr txBox="1"/>
+          <p:nvPr/>
+        </p:nvSpPr>
+        <p:spPr>
+          <a:xfrm>
+            <a:off x="9762360" y="5551945"/>
+            <a:ext cx="2085179" cy="307777"/>
+          </a:xfrm>
+          <a:prstGeom prst="rect">
+            <a:avLst/>
+          </a:prstGeom>
+          <a:noFill/>
+        </p:spPr>
+        <p:txBody>
+          <a:bodyPr wrap="square" rtlCol="0">
+            <a:spAutoFit/>
+          </a:bodyPr>
+          <a:lstStyle/>
+          <a:p>
+            <a:r>
+              <a:rPr lang="en-US" sz="1400" dirty="0"/>
+              <a:t>R. Agnese, Et al. 2018 </a:t>
+            </a:r>
+          </a:p>
+        </p:txBody>
+      </p:sp>
     </p:spTree>
     <p:extLst>
       <p:ext uri="{BB962C8B-B14F-4D97-AF65-F5344CB8AC3E}">
@@ -6252,7 +6684,9 @@
           </a:xfrm>
         </p:spPr>
         <p:txBody>
-          <a:bodyPr/>
+          <a:bodyPr>
+            <a:normAutofit/>
+          </a:bodyPr>
           <a:lstStyle/>
           <a:p>
             <a:endParaRPr lang="en-US" sz="1800" dirty="0"/>
@@ -6260,7 +6694,15 @@
           <a:p>
             <a:r>
               <a:rPr lang="en-US" sz="1800" dirty="0"/>
-              <a:t>Spectrum </a:t>
+              <a:t>A detector developed at </a:t>
+            </a:r>
+            <a:r>
+              <a:rPr lang="en-US" sz="1800" dirty="0" err="1"/>
+              <a:t>Standford</a:t>
+            </a:r>
+            <a:r>
+              <a:rPr lang="en-US" sz="1800" dirty="0"/>
+              <a:t> has developed   a detector that can support 160V bias and a 14eV resolution. </a:t>
             </a:r>
           </a:p>
           <a:p>
@@ -6269,11 +6711,17 @@
           <a:p>
             <a:r>
               <a:rPr lang="en-US" sz="1800" dirty="0"/>
-              <a:t>(Non-overlapping) ?  </a:t>
+              <a:t>Even with this high sensitivity they are still subject to randomness in electron hole pair production </a:t>
             </a:r>
           </a:p>
           <a:p>
             <a:endParaRPr lang="en-US" sz="1800" dirty="0"/>
+          </a:p>
+          <a:p>
+            <a:r>
+              <a:rPr lang="en-US" sz="1800" dirty="0"/>
+              <a:t>Each peak represents a different number of electron hole pairs produced. </a:t>
+            </a:r>
           </a:p>
           <a:p>
             <a:pPr marL="0" indent="0">
@@ -6343,14 +6791,82 @@
         </p:blipFill>
         <p:spPr>
           <a:xfrm>
-            <a:off x="5682486" y="1146857"/>
-            <a:ext cx="5856227" cy="5205535"/>
+            <a:off x="6096000" y="1146857"/>
+            <a:ext cx="5620841" cy="5205535"/>
           </a:xfrm>
           <a:prstGeom prst="rect">
             <a:avLst/>
           </a:prstGeom>
         </p:spPr>
       </p:pic>
+      <p:pic>
+        <p:nvPicPr>
+          <p:cNvPr id="7" name="Picture 6">
+            <a:extLst>
+              <a:ext uri="{FF2B5EF4-FFF2-40B4-BE49-F238E27FC236}">
+                <a16:creationId xmlns:a16="http://schemas.microsoft.com/office/drawing/2014/main" id="{109F7AE0-4D8B-624C-9494-2DCD824196A7}"/>
+              </a:ext>
+            </a:extLst>
+          </p:cNvPr>
+          <p:cNvPicPr>
+            <a:picLocks noChangeAspect="1"/>
+          </p:cNvPicPr>
+          <p:nvPr/>
+        </p:nvPicPr>
+        <p:blipFill>
+          <a:blip r:embed="rId4"/>
+          <a:stretch>
+            <a:fillRect/>
+          </a:stretch>
+        </p:blipFill>
+        <p:spPr>
+          <a:xfrm>
+            <a:off x="1932463" y="5475601"/>
+            <a:ext cx="2833888" cy="526051"/>
+          </a:xfrm>
+          <a:prstGeom prst="rect">
+            <a:avLst/>
+          </a:prstGeom>
+        </p:spPr>
+      </p:pic>
+      <p:sp>
+        <p:nvSpPr>
+          <p:cNvPr id="4" name="TextBox 3">
+            <a:extLst>
+              <a:ext uri="{FF2B5EF4-FFF2-40B4-BE49-F238E27FC236}">
+                <a16:creationId xmlns:a16="http://schemas.microsoft.com/office/drawing/2014/main" id="{6509065F-62D1-A24E-9F2E-5D10B0D5AB97}"/>
+              </a:ext>
+            </a:extLst>
+          </p:cNvPr>
+          <p:cNvSpPr txBox="1"/>
+          <p:nvPr/>
+        </p:nvSpPr>
+        <p:spPr>
+          <a:xfrm>
+            <a:off x="7825839" y="6418695"/>
+            <a:ext cx="3336967" cy="646331"/>
+          </a:xfrm>
+          <a:prstGeom prst="rect">
+            <a:avLst/>
+          </a:prstGeom>
+          <a:noFill/>
+        </p:spPr>
+        <p:txBody>
+          <a:bodyPr wrap="square" rtlCol="0">
+            <a:spAutoFit/>
+          </a:bodyPr>
+          <a:lstStyle/>
+          <a:p>
+            <a:r>
+              <a:rPr lang="en-US" dirty="0"/>
+              <a:t>R.K. Romani, et al. 2017 </a:t>
+            </a:r>
+          </a:p>
+          <a:p>
+            <a:endParaRPr lang="en-US" dirty="0"/>
+          </a:p>
+        </p:txBody>
+      </p:sp>
     </p:spTree>
     <p:extLst>
       <p:ext uri="{BB962C8B-B14F-4D97-AF65-F5344CB8AC3E}">
@@ -6485,7 +7001,7 @@
         <p:spPr>
           <a:xfrm>
             <a:off x="825843" y="1649978"/>
-            <a:ext cx="4930346" cy="3970318"/>
+            <a:ext cx="4930346" cy="4524315"/>
           </a:xfrm>
           <a:prstGeom prst="rect">
             <a:avLst/>
@@ -6504,15 +7020,7 @@
             </a:pPr>
             <a:r>
               <a:rPr lang="en-US" dirty="0"/>
-              <a:t>For a single </a:t>
-            </a:r>
-            <a:r>
-              <a:rPr lang="en-US" dirty="0" err="1"/>
-              <a:t>Er</a:t>
-            </a:r>
-            <a:r>
-              <a:rPr lang="en-US" dirty="0"/>
-              <a:t>, there is some variation in the number of e-h pairs created. </a:t>
+              <a:t>The mean number of electron hole pairs produced varies greatly for electron recoils and nuclear recoils. </a:t>
             </a:r>
           </a:p>
           <a:p>
@@ -6527,7 +7035,23 @@
               <a:buFont typeface="Arial" panose="020B0604020202020204" pitchFamily="34" charset="0"/>
               <a:buChar char="•"/>
             </a:pPr>
+            <a:r>
+              <a:rPr lang="en-US" dirty="0"/>
+              <a:t>Measurements of charge and phonon would mean great discrimination between the two (far better than PSD and liquid scintillators) </a:t>
+            </a:r>
+          </a:p>
+          <a:p>
             <a:endParaRPr lang="en-US" dirty="0"/>
+          </a:p>
+          <a:p>
+            <a:pPr marL="285750" indent="-285750">
+              <a:buFont typeface="Arial" panose="020B0604020202020204" pitchFamily="34" charset="0"/>
+              <a:buChar char="•"/>
+            </a:pPr>
+            <a:r>
+              <a:rPr lang="en-US" dirty="0"/>
+              <a:t>This becomes difficult at low energy. </a:t>
+            </a:r>
           </a:p>
           <a:p>
             <a:pPr marL="285750" indent="-285750">
@@ -6541,10 +7065,7 @@
               <a:buFont typeface="Arial" panose="020B0604020202020204" pitchFamily="34" charset="0"/>
               <a:buChar char="•"/>
             </a:pPr>
-            <a:r>
-              <a:rPr lang="en-US" dirty="0"/>
-              <a:t>Here is average </a:t>
-            </a:r>
+            <a:endParaRPr lang="en-US" dirty="0"/>
           </a:p>
           <a:p>
             <a:pPr marL="285750" indent="-285750">
@@ -6552,23 +7073,6 @@
               <a:buChar char="•"/>
             </a:pPr>
             <a:endParaRPr lang="en-US" dirty="0"/>
-          </a:p>
-          <a:p>
-            <a:pPr marL="285750" indent="-285750">
-              <a:buFont typeface="Arial" panose="020B0604020202020204" pitchFamily="34" charset="0"/>
-              <a:buChar char="•"/>
-            </a:pPr>
-            <a:endParaRPr lang="en-US" dirty="0"/>
-          </a:p>
-          <a:p>
-            <a:pPr marL="285750" indent="-285750">
-              <a:buFont typeface="Arial" panose="020B0604020202020204" pitchFamily="34" charset="0"/>
-              <a:buChar char="•"/>
-            </a:pPr>
-            <a:r>
-              <a:rPr lang="en-US" dirty="0"/>
-              <a:t>There is variation in this average that needs to be accounted for. </a:t>
-            </a:r>
           </a:p>
           <a:p>
             <a:endParaRPr lang="en-US" dirty="0"/>
@@ -7017,6 +7521,58 @@
       </p:sp>
       <p:sp>
         <p:nvSpPr>
+          <p:cNvPr id="4" name="Content Placeholder 3">
+            <a:extLst>
+              <a:ext uri="{FF2B5EF4-FFF2-40B4-BE49-F238E27FC236}">
+                <a16:creationId xmlns:a16="http://schemas.microsoft.com/office/drawing/2014/main" id="{6F374B33-AC70-2C4A-9EE4-BA7883936DDA}"/>
+              </a:ext>
+            </a:extLst>
+          </p:cNvPr>
+          <p:cNvSpPr>
+            <a:spLocks noGrp="1"/>
+          </p:cNvSpPr>
+          <p:nvPr>
+            <p:ph idx="1"/>
+          </p:nvPr>
+        </p:nvSpPr>
+        <p:spPr>
+          <a:xfrm>
+            <a:off x="838200" y="2728149"/>
+            <a:ext cx="4968834" cy="4351338"/>
+          </a:xfrm>
+        </p:spPr>
+        <p:txBody>
+          <a:bodyPr>
+            <a:normAutofit/>
+          </a:bodyPr>
+          <a:lstStyle/>
+          <a:p>
+            <a:r>
+              <a:rPr lang="en-US" sz="1800" dirty="0"/>
+              <a:t>Using Luke amp type detectors may have dramatic consequences for WIMP search.</a:t>
+            </a:r>
+          </a:p>
+          <a:p>
+            <a:endParaRPr lang="en-US" sz="1800" dirty="0"/>
+          </a:p>
+          <a:p>
+            <a:r>
+              <a:rPr lang="en-US" sz="1800" dirty="0"/>
+              <a:t>Choice of </a:t>
+            </a:r>
+            <a:r>
+              <a:rPr lang="en-US" sz="1800" dirty="0" err="1"/>
+              <a:t>fano</a:t>
+            </a:r>
+            <a:r>
+              <a:rPr lang="en-US" sz="1800" dirty="0"/>
+              <a:t> factor can change limit set on WIMP cross section. </a:t>
+            </a:r>
+          </a:p>
+        </p:txBody>
+      </p:sp>
+      <p:sp>
+        <p:nvSpPr>
           <p:cNvPr id="11" name="Slide Number Placeholder 10">
             <a:extLst>
               <a:ext uri="{FF2B5EF4-FFF2-40B4-BE49-F238E27FC236}">
@@ -7059,15 +7615,15 @@
           <p:nvPr/>
         </p:nvPicPr>
         <p:blipFill>
-          <a:blip r:embed="rId2"/>
+          <a:blip r:embed="rId3"/>
           <a:stretch>
             <a:fillRect/>
           </a:stretch>
         </p:blipFill>
         <p:spPr>
           <a:xfrm>
-            <a:off x="3059777" y="1324655"/>
-            <a:ext cx="6072445" cy="5397729"/>
+            <a:off x="6060571" y="1323746"/>
+            <a:ext cx="5459869" cy="4853217"/>
           </a:xfrm>
           <a:prstGeom prst="rect">
             <a:avLst/>

</xml_diff>

<commit_message>
[MM] Added Error bars
</commit_message>
<xml_diff>
--- a/Mitch_Hawaii_talk. .pptx
+++ b/Mitch_Hawaii_talk. .pptx
@@ -5,21 +5,31 @@
     <p:sldMasterId id="2147483648" r:id="rId1"/>
   </p:sldMasterIdLst>
   <p:notesMasterIdLst>
-    <p:notesMasterId r:id="rId14"/>
+    <p:notesMasterId r:id="rId24"/>
   </p:notesMasterIdLst>
   <p:sldIdLst>
     <p:sldId id="256" r:id="rId2"/>
-    <p:sldId id="263" r:id="rId3"/>
-    <p:sldId id="267" r:id="rId4"/>
-    <p:sldId id="264" r:id="rId5"/>
+    <p:sldId id="282" r:id="rId3"/>
+    <p:sldId id="263" r:id="rId4"/>
+    <p:sldId id="267" r:id="rId5"/>
     <p:sldId id="277" r:id="rId6"/>
-    <p:sldId id="257" r:id="rId7"/>
-    <p:sldId id="271" r:id="rId8"/>
-    <p:sldId id="278" r:id="rId9"/>
-    <p:sldId id="274" r:id="rId10"/>
-    <p:sldId id="276" r:id="rId11"/>
-    <p:sldId id="275" r:id="rId12"/>
-    <p:sldId id="269" r:id="rId13"/>
+    <p:sldId id="264" r:id="rId7"/>
+    <p:sldId id="257" r:id="rId8"/>
+    <p:sldId id="271" r:id="rId9"/>
+    <p:sldId id="278" r:id="rId10"/>
+    <p:sldId id="274" r:id="rId11"/>
+    <p:sldId id="286" r:id="rId12"/>
+    <p:sldId id="275" r:id="rId13"/>
+    <p:sldId id="269" r:id="rId14"/>
+    <p:sldId id="288" r:id="rId15"/>
+    <p:sldId id="289" r:id="rId16"/>
+    <p:sldId id="279" r:id="rId17"/>
+    <p:sldId id="280" r:id="rId18"/>
+    <p:sldId id="281" r:id="rId19"/>
+    <p:sldId id="283" r:id="rId20"/>
+    <p:sldId id="284" r:id="rId21"/>
+    <p:sldId id="290" r:id="rId22"/>
+    <p:sldId id="291" r:id="rId23"/>
   </p:sldIdLst>
   <p:sldSz cx="12192000" cy="6858000"/>
   <p:notesSz cx="6858000" cy="9144000"/>
@@ -208,7 +218,7 @@
           <a:p>
             <a:fld id="{A66BF76A-CB69-344A-AA05-A4A0C5F81F1B}" type="datetimeFigureOut">
               <a:rPr lang="en-US" smtClean="0"/>
-              <a:t>10/25/18</a:t>
+              <a:t>11/23/18</a:t>
             </a:fld>
             <a:endParaRPr lang="en-US"/>
           </a:p>
@@ -519,79 +529,7 @@
           <a:bodyPr/>
           <a:lstStyle/>
           <a:p>
-            <a:pPr marL="0" marR="0" lvl="0" indent="0" algn="l" defTabSz="914400" rtl="0" eaLnBrk="1" fontAlgn="auto" latinLnBrk="0" hangingPunct="1">
-              <a:lnSpc>
-                <a:spcPct val="100000"/>
-              </a:lnSpc>
-              <a:spcBef>
-                <a:spcPts val="0"/>
-              </a:spcBef>
-              <a:spcAft>
-                <a:spcPts val="0"/>
-              </a:spcAft>
-              <a:buClrTx/>
-              <a:buSzTx/>
-              <a:buFontTx/>
-              <a:buNone/>
-              <a:tabLst/>
-              <a:defRPr/>
-            </a:pPr>
-            <a:r>
-              <a:rPr lang="en-US" sz="1200" dirty="0"/>
-              <a:t>Going to Focus on WIMPS only. </a:t>
-            </a:r>
-          </a:p>
-          <a:p>
-            <a:pPr marL="0" marR="0" lvl="0" indent="0" algn="l" defTabSz="914400" rtl="0" eaLnBrk="1" fontAlgn="auto" latinLnBrk="0" hangingPunct="1">
-              <a:lnSpc>
-                <a:spcPct val="100000"/>
-              </a:lnSpc>
-              <a:spcBef>
-                <a:spcPts val="0"/>
-              </a:spcBef>
-              <a:spcAft>
-                <a:spcPts val="0"/>
-              </a:spcAft>
-              <a:buClrTx/>
-              <a:buSzTx/>
-              <a:buFontTx/>
-              <a:buNone/>
-              <a:tabLst/>
-              <a:defRPr/>
-            </a:pPr>
-            <a:endParaRPr lang="en-US" sz="1200" dirty="0"/>
-          </a:p>
-          <a:p>
-            <a:pPr marL="0" marR="0" lvl="0" indent="0" algn="l" defTabSz="914400" rtl="0" eaLnBrk="1" fontAlgn="auto" latinLnBrk="0" hangingPunct="1">
-              <a:lnSpc>
-                <a:spcPct val="100000"/>
-              </a:lnSpc>
-              <a:spcBef>
-                <a:spcPts val="0"/>
-              </a:spcBef>
-              <a:spcAft>
-                <a:spcPts val="0"/>
-              </a:spcAft>
-              <a:buClrTx/>
-              <a:buSzTx/>
-              <a:buFontTx/>
-              <a:buNone/>
-              <a:tabLst/>
-              <a:defRPr/>
-            </a:pPr>
-            <a:r>
-              <a:rPr lang="en-US" sz="1200" dirty="0"/>
-              <a:t>Dark Matter experiments such as CDMS and CREST are trying to push down to lower thresholds. </a:t>
-            </a:r>
-          </a:p>
-          <a:p>
             <a:endParaRPr lang="en-US" dirty="0"/>
-          </a:p>
-          <a:p>
-            <a:r>
-              <a:rPr lang="en-US" dirty="0"/>
-              <a:t>The detects that are trying to do this are solid state detectors with some sort of voltage applied to them. They are essentially electron-hole pair counters. </a:t>
-            </a:r>
           </a:p>
         </p:txBody>
       </p:sp>
@@ -621,7 +559,7 @@
     </p:spTree>
     <p:extLst>
       <p:ext uri="{BB962C8B-B14F-4D97-AF65-F5344CB8AC3E}">
-        <p14:creationId xmlns:p14="http://schemas.microsoft.com/office/powerpoint/2010/main" val="1234004632"/>
+        <p14:creationId xmlns:p14="http://schemas.microsoft.com/office/powerpoint/2010/main" val="2850332984"/>
       </p:ext>
     </p:extLst>
   </p:cSld>
@@ -714,7 +652,7 @@
     </p:spTree>
     <p:extLst>
       <p:ext uri="{BB962C8B-B14F-4D97-AF65-F5344CB8AC3E}">
-        <p14:creationId xmlns:p14="http://schemas.microsoft.com/office/powerpoint/2010/main" val="3607152850"/>
+        <p14:creationId xmlns:p14="http://schemas.microsoft.com/office/powerpoint/2010/main" val="3435237193"/>
       </p:ext>
     </p:extLst>
   </p:cSld>
@@ -770,8 +708,14 @@
           <a:p>
             <a:r>
               <a:rPr lang="en-US" dirty="0"/>
-              <a:t>Bands from data -&gt; simulated bands. Side by side. </a:t>
-            </a:r>
+              <a:t>They can measure charge and phonons separately, this gives them a direct measure of the yield. </a:t>
+            </a:r>
+          </a:p>
+          <a:p>
+            <a:endParaRPr lang="en-US" dirty="0"/>
+          </a:p>
+          <a:p>
+            <a:endParaRPr lang="en-US" dirty="0"/>
           </a:p>
         </p:txBody>
       </p:sp>
@@ -801,7 +745,560 @@
     </p:spTree>
     <p:extLst>
       <p:ext uri="{BB962C8B-B14F-4D97-AF65-F5344CB8AC3E}">
+        <p14:creationId xmlns:p14="http://schemas.microsoft.com/office/powerpoint/2010/main" val="3607152850"/>
+      </p:ext>
+    </p:extLst>
+  </p:cSld>
+  <p:clrMapOvr>
+    <a:masterClrMapping/>
+  </p:clrMapOvr>
+</p:notes>
+</file>
+
+<file path=ppt/notesSlides/notesSlide12.xml><?xml version="1.0" encoding="utf-8"?>
+<p:notes xmlns:a="http://schemas.openxmlformats.org/drawingml/2006/main" xmlns:r="http://schemas.openxmlformats.org/officeDocument/2006/relationships" xmlns:p="http://schemas.openxmlformats.org/presentationml/2006/main">
+  <p:cSld>
+    <p:spTree>
+      <p:nvGrpSpPr>
+        <p:cNvPr id="1" name=""/>
+        <p:cNvGrpSpPr/>
+        <p:nvPr/>
+      </p:nvGrpSpPr>
+      <p:grpSpPr>
+        <a:xfrm>
+          <a:off x="0" y="0"/>
+          <a:ext cx="0" cy="0"/>
+          <a:chOff x="0" y="0"/>
+          <a:chExt cx="0" cy="0"/>
+        </a:xfrm>
+      </p:grpSpPr>
+      <p:sp>
+        <p:nvSpPr>
+          <p:cNvPr id="2" name="Slide Image Placeholder 1"/>
+          <p:cNvSpPr>
+            <a:spLocks noGrp="1" noRot="1" noChangeAspect="1"/>
+          </p:cNvSpPr>
+          <p:nvPr>
+            <p:ph type="sldImg"/>
+          </p:nvPr>
+        </p:nvSpPr>
+        <p:spPr/>
+      </p:sp>
+      <p:sp>
+        <p:nvSpPr>
+          <p:cNvPr id="3" name="Notes Placeholder 2"/>
+          <p:cNvSpPr>
+            <a:spLocks noGrp="1"/>
+          </p:cNvSpPr>
+          <p:nvPr>
+            <p:ph type="body" idx="1"/>
+          </p:nvPr>
+        </p:nvSpPr>
+        <p:spPr/>
+        <p:txBody>
+          <a:bodyPr/>
+          <a:lstStyle/>
+          <a:p>
+            <a:r>
+              <a:rPr lang="en-US" dirty="0"/>
+              <a:t>Bands from data -&gt; simulated bands. Side by side. </a:t>
+            </a:r>
+          </a:p>
+        </p:txBody>
+      </p:sp>
+      <p:sp>
+        <p:nvSpPr>
+          <p:cNvPr id="4" name="Slide Number Placeholder 3"/>
+          <p:cNvSpPr>
+            <a:spLocks noGrp="1"/>
+          </p:cNvSpPr>
+          <p:nvPr>
+            <p:ph type="sldNum" sz="quarter" idx="5"/>
+          </p:nvPr>
+        </p:nvSpPr>
+        <p:spPr/>
+        <p:txBody>
+          <a:bodyPr/>
+          <a:lstStyle/>
+          <a:p>
+            <a:fld id="{C6AEA146-89B5-4A42-BEB6-D6A5BB50F046}" type="slidenum">
+              <a:rPr lang="en-US" smtClean="0"/>
+              <a:t>13</a:t>
+            </a:fld>
+            <a:endParaRPr lang="en-US"/>
+          </a:p>
+        </p:txBody>
+      </p:sp>
+    </p:spTree>
+    <p:extLst>
+      <p:ext uri="{BB962C8B-B14F-4D97-AF65-F5344CB8AC3E}">
         <p14:creationId xmlns:p14="http://schemas.microsoft.com/office/powerpoint/2010/main" val="2868716704"/>
+      </p:ext>
+    </p:extLst>
+  </p:cSld>
+  <p:clrMapOvr>
+    <a:masterClrMapping/>
+  </p:clrMapOvr>
+</p:notes>
+</file>
+
+<file path=ppt/notesSlides/notesSlide13.xml><?xml version="1.0" encoding="utf-8"?>
+<p:notes xmlns:a="http://schemas.openxmlformats.org/drawingml/2006/main" xmlns:r="http://schemas.openxmlformats.org/officeDocument/2006/relationships" xmlns:p="http://schemas.openxmlformats.org/presentationml/2006/main">
+  <p:cSld>
+    <p:spTree>
+      <p:nvGrpSpPr>
+        <p:cNvPr id="1" name=""/>
+        <p:cNvGrpSpPr/>
+        <p:nvPr/>
+      </p:nvGrpSpPr>
+      <p:grpSpPr>
+        <a:xfrm>
+          <a:off x="0" y="0"/>
+          <a:ext cx="0" cy="0"/>
+          <a:chOff x="0" y="0"/>
+          <a:chExt cx="0" cy="0"/>
+        </a:xfrm>
+      </p:grpSpPr>
+      <p:sp>
+        <p:nvSpPr>
+          <p:cNvPr id="2" name="Slide Image Placeholder 1"/>
+          <p:cNvSpPr>
+            <a:spLocks noGrp="1" noRot="1" noChangeAspect="1"/>
+          </p:cNvSpPr>
+          <p:nvPr>
+            <p:ph type="sldImg"/>
+          </p:nvPr>
+        </p:nvSpPr>
+        <p:spPr/>
+      </p:sp>
+      <p:sp>
+        <p:nvSpPr>
+          <p:cNvPr id="3" name="Notes Placeholder 2"/>
+          <p:cNvSpPr>
+            <a:spLocks noGrp="1"/>
+          </p:cNvSpPr>
+          <p:nvPr>
+            <p:ph type="body" idx="1"/>
+          </p:nvPr>
+        </p:nvSpPr>
+        <p:spPr/>
+        <p:txBody>
+          <a:bodyPr/>
+          <a:lstStyle/>
+          <a:p>
+            <a:endParaRPr lang="en-US" dirty="0"/>
+          </a:p>
+        </p:txBody>
+      </p:sp>
+      <p:sp>
+        <p:nvSpPr>
+          <p:cNvPr id="4" name="Slide Number Placeholder 3"/>
+          <p:cNvSpPr>
+            <a:spLocks noGrp="1"/>
+          </p:cNvSpPr>
+          <p:nvPr>
+            <p:ph type="sldNum" sz="quarter" idx="5"/>
+          </p:nvPr>
+        </p:nvSpPr>
+        <p:spPr/>
+        <p:txBody>
+          <a:bodyPr/>
+          <a:lstStyle/>
+          <a:p>
+            <a:fld id="{C6AEA146-89B5-4A42-BEB6-D6A5BB50F046}" type="slidenum">
+              <a:rPr lang="en-US" smtClean="0"/>
+              <a:t>16</a:t>
+            </a:fld>
+            <a:endParaRPr lang="en-US"/>
+          </a:p>
+        </p:txBody>
+      </p:sp>
+    </p:spTree>
+    <p:extLst>
+      <p:ext uri="{BB962C8B-B14F-4D97-AF65-F5344CB8AC3E}">
+        <p14:creationId xmlns:p14="http://schemas.microsoft.com/office/powerpoint/2010/main" val="2799129288"/>
+      </p:ext>
+    </p:extLst>
+  </p:cSld>
+  <p:clrMapOvr>
+    <a:masterClrMapping/>
+  </p:clrMapOvr>
+</p:notes>
+</file>
+
+<file path=ppt/notesSlides/notesSlide14.xml><?xml version="1.0" encoding="utf-8"?>
+<p:notes xmlns:a="http://schemas.openxmlformats.org/drawingml/2006/main" xmlns:r="http://schemas.openxmlformats.org/officeDocument/2006/relationships" xmlns:p="http://schemas.openxmlformats.org/presentationml/2006/main">
+  <p:cSld>
+    <p:spTree>
+      <p:nvGrpSpPr>
+        <p:cNvPr id="1" name=""/>
+        <p:cNvGrpSpPr/>
+        <p:nvPr/>
+      </p:nvGrpSpPr>
+      <p:grpSpPr>
+        <a:xfrm>
+          <a:off x="0" y="0"/>
+          <a:ext cx="0" cy="0"/>
+          <a:chOff x="0" y="0"/>
+          <a:chExt cx="0" cy="0"/>
+        </a:xfrm>
+      </p:grpSpPr>
+      <p:sp>
+        <p:nvSpPr>
+          <p:cNvPr id="2" name="Slide Image Placeholder 1"/>
+          <p:cNvSpPr>
+            <a:spLocks noGrp="1" noRot="1" noChangeAspect="1"/>
+          </p:cNvSpPr>
+          <p:nvPr>
+            <p:ph type="sldImg"/>
+          </p:nvPr>
+        </p:nvSpPr>
+        <p:spPr/>
+      </p:sp>
+      <p:sp>
+        <p:nvSpPr>
+          <p:cNvPr id="3" name="Notes Placeholder 2"/>
+          <p:cNvSpPr>
+            <a:spLocks noGrp="1"/>
+          </p:cNvSpPr>
+          <p:nvPr>
+            <p:ph type="body" idx="1"/>
+          </p:nvPr>
+        </p:nvSpPr>
+        <p:spPr/>
+        <p:txBody>
+          <a:bodyPr/>
+          <a:lstStyle/>
+          <a:p>
+            <a:endParaRPr lang="en-US" dirty="0"/>
+          </a:p>
+        </p:txBody>
+      </p:sp>
+      <p:sp>
+        <p:nvSpPr>
+          <p:cNvPr id="4" name="Slide Number Placeholder 3"/>
+          <p:cNvSpPr>
+            <a:spLocks noGrp="1"/>
+          </p:cNvSpPr>
+          <p:nvPr>
+            <p:ph type="sldNum" sz="quarter" idx="5"/>
+          </p:nvPr>
+        </p:nvSpPr>
+        <p:spPr/>
+        <p:txBody>
+          <a:bodyPr/>
+          <a:lstStyle/>
+          <a:p>
+            <a:fld id="{C6AEA146-89B5-4A42-BEB6-D6A5BB50F046}" type="slidenum">
+              <a:rPr lang="en-US" smtClean="0"/>
+              <a:t>17</a:t>
+            </a:fld>
+            <a:endParaRPr lang="en-US"/>
+          </a:p>
+        </p:txBody>
+      </p:sp>
+    </p:spTree>
+    <p:extLst>
+      <p:ext uri="{BB962C8B-B14F-4D97-AF65-F5344CB8AC3E}">
+        <p14:creationId xmlns:p14="http://schemas.microsoft.com/office/powerpoint/2010/main" val="2532087093"/>
+      </p:ext>
+    </p:extLst>
+  </p:cSld>
+  <p:clrMapOvr>
+    <a:masterClrMapping/>
+  </p:clrMapOvr>
+</p:notes>
+</file>
+
+<file path=ppt/notesSlides/notesSlide15.xml><?xml version="1.0" encoding="utf-8"?>
+<p:notes xmlns:a="http://schemas.openxmlformats.org/drawingml/2006/main" xmlns:r="http://schemas.openxmlformats.org/officeDocument/2006/relationships" xmlns:p="http://schemas.openxmlformats.org/presentationml/2006/main">
+  <p:cSld>
+    <p:spTree>
+      <p:nvGrpSpPr>
+        <p:cNvPr id="1" name=""/>
+        <p:cNvGrpSpPr/>
+        <p:nvPr/>
+      </p:nvGrpSpPr>
+      <p:grpSpPr>
+        <a:xfrm>
+          <a:off x="0" y="0"/>
+          <a:ext cx="0" cy="0"/>
+          <a:chOff x="0" y="0"/>
+          <a:chExt cx="0" cy="0"/>
+        </a:xfrm>
+      </p:grpSpPr>
+      <p:sp>
+        <p:nvSpPr>
+          <p:cNvPr id="2" name="Slide Image Placeholder 1"/>
+          <p:cNvSpPr>
+            <a:spLocks noGrp="1" noRot="1" noChangeAspect="1"/>
+          </p:cNvSpPr>
+          <p:nvPr>
+            <p:ph type="sldImg"/>
+          </p:nvPr>
+        </p:nvSpPr>
+        <p:spPr/>
+      </p:sp>
+      <p:sp>
+        <p:nvSpPr>
+          <p:cNvPr id="3" name="Notes Placeholder 2"/>
+          <p:cNvSpPr>
+            <a:spLocks noGrp="1"/>
+          </p:cNvSpPr>
+          <p:nvPr>
+            <p:ph type="body" idx="1"/>
+          </p:nvPr>
+        </p:nvSpPr>
+        <p:spPr/>
+        <p:txBody>
+          <a:bodyPr/>
+          <a:lstStyle/>
+          <a:p>
+            <a:pPr marL="0" marR="0" lvl="0" indent="0" algn="l" defTabSz="914400" rtl="0" eaLnBrk="1" fontAlgn="auto" latinLnBrk="0" hangingPunct="1">
+              <a:lnSpc>
+                <a:spcPct val="100000"/>
+              </a:lnSpc>
+              <a:spcBef>
+                <a:spcPts val="0"/>
+              </a:spcBef>
+              <a:spcAft>
+                <a:spcPts val="0"/>
+              </a:spcAft>
+              <a:buClrTx/>
+              <a:buSzTx/>
+              <a:buFontTx/>
+              <a:buNone/>
+              <a:tabLst/>
+              <a:defRPr/>
+            </a:pPr>
+            <a:r>
+              <a:rPr lang="en-US" sz="1200" kern="1200" dirty="0">
+                <a:solidFill>
+                  <a:schemeClr val="tx1"/>
+                </a:solidFill>
+                <a:effectLst/>
+                <a:latin typeface="+mn-lt"/>
+                <a:ea typeface="+mn-ea"/>
+                <a:cs typeface="+mn-cs"/>
+              </a:rPr>
+              <a:t>Hypothesis on including the atomic binding energy introduces a kinematic cutoff can be incorporated by adding a constant q to Eq. </a:t>
+            </a:r>
+            <a:endParaRPr lang="en-US" dirty="0"/>
+          </a:p>
+          <a:p>
+            <a:endParaRPr lang="en-US" dirty="0"/>
+          </a:p>
+        </p:txBody>
+      </p:sp>
+      <p:sp>
+        <p:nvSpPr>
+          <p:cNvPr id="4" name="Slide Number Placeholder 3"/>
+          <p:cNvSpPr>
+            <a:spLocks noGrp="1"/>
+          </p:cNvSpPr>
+          <p:nvPr>
+            <p:ph type="sldNum" sz="quarter" idx="5"/>
+          </p:nvPr>
+        </p:nvSpPr>
+        <p:spPr/>
+        <p:txBody>
+          <a:bodyPr/>
+          <a:lstStyle/>
+          <a:p>
+            <a:fld id="{C6AEA146-89B5-4A42-BEB6-D6A5BB50F046}" type="slidenum">
+              <a:rPr lang="en-US" smtClean="0"/>
+              <a:t>18</a:t>
+            </a:fld>
+            <a:endParaRPr lang="en-US"/>
+          </a:p>
+        </p:txBody>
+      </p:sp>
+    </p:spTree>
+    <p:extLst>
+      <p:ext uri="{BB962C8B-B14F-4D97-AF65-F5344CB8AC3E}">
+        <p14:creationId xmlns:p14="http://schemas.microsoft.com/office/powerpoint/2010/main" val="335800786"/>
+      </p:ext>
+    </p:extLst>
+  </p:cSld>
+  <p:clrMapOvr>
+    <a:masterClrMapping/>
+  </p:clrMapOvr>
+</p:notes>
+</file>
+
+<file path=ppt/notesSlides/notesSlide16.xml><?xml version="1.0" encoding="utf-8"?>
+<p:notes xmlns:a="http://schemas.openxmlformats.org/drawingml/2006/main" xmlns:r="http://schemas.openxmlformats.org/officeDocument/2006/relationships" xmlns:p="http://schemas.openxmlformats.org/presentationml/2006/main">
+  <p:cSld>
+    <p:spTree>
+      <p:nvGrpSpPr>
+        <p:cNvPr id="1" name=""/>
+        <p:cNvGrpSpPr/>
+        <p:nvPr/>
+      </p:nvGrpSpPr>
+      <p:grpSpPr>
+        <a:xfrm>
+          <a:off x="0" y="0"/>
+          <a:ext cx="0" cy="0"/>
+          <a:chOff x="0" y="0"/>
+          <a:chExt cx="0" cy="0"/>
+        </a:xfrm>
+      </p:grpSpPr>
+      <p:sp>
+        <p:nvSpPr>
+          <p:cNvPr id="2" name="Slide Image Placeholder 1"/>
+          <p:cNvSpPr>
+            <a:spLocks noGrp="1" noRot="1" noChangeAspect="1"/>
+          </p:cNvSpPr>
+          <p:nvPr>
+            <p:ph type="sldImg"/>
+          </p:nvPr>
+        </p:nvSpPr>
+        <p:spPr/>
+      </p:sp>
+      <p:sp>
+        <p:nvSpPr>
+          <p:cNvPr id="3" name="Notes Placeholder 2"/>
+          <p:cNvSpPr>
+            <a:spLocks noGrp="1"/>
+          </p:cNvSpPr>
+          <p:nvPr>
+            <p:ph type="body" idx="1"/>
+          </p:nvPr>
+        </p:nvSpPr>
+        <p:spPr/>
+        <p:txBody>
+          <a:bodyPr/>
+          <a:lstStyle/>
+          <a:p>
+            <a:pPr lvl="1"/>
+            <a:r>
+              <a:rPr lang="en-US" dirty="0"/>
+              <a:t>This is well understood for electron recoils. </a:t>
+            </a:r>
+          </a:p>
+          <a:p>
+            <a:pPr lvl="2"/>
+            <a:r>
+              <a:rPr lang="en-US" dirty="0"/>
+              <a:t>F(silicon) = 0.13 , F(germanium) = 0.12</a:t>
+            </a:r>
+          </a:p>
+          <a:p>
+            <a:endParaRPr lang="en-US" dirty="0"/>
+          </a:p>
+        </p:txBody>
+      </p:sp>
+      <p:sp>
+        <p:nvSpPr>
+          <p:cNvPr id="4" name="Slide Number Placeholder 3"/>
+          <p:cNvSpPr>
+            <a:spLocks noGrp="1"/>
+          </p:cNvSpPr>
+          <p:nvPr>
+            <p:ph type="sldNum" sz="quarter" idx="5"/>
+          </p:nvPr>
+        </p:nvSpPr>
+        <p:spPr/>
+        <p:txBody>
+          <a:bodyPr/>
+          <a:lstStyle/>
+          <a:p>
+            <a:fld id="{C6AEA146-89B5-4A42-BEB6-D6A5BB50F046}" type="slidenum">
+              <a:rPr lang="en-US" smtClean="0"/>
+              <a:t>19</a:t>
+            </a:fld>
+            <a:endParaRPr lang="en-US"/>
+          </a:p>
+        </p:txBody>
+      </p:sp>
+    </p:spTree>
+    <p:extLst>
+      <p:ext uri="{BB962C8B-B14F-4D97-AF65-F5344CB8AC3E}">
+        <p14:creationId xmlns:p14="http://schemas.microsoft.com/office/powerpoint/2010/main" val="3362845903"/>
+      </p:ext>
+    </p:extLst>
+  </p:cSld>
+  <p:clrMapOvr>
+    <a:masterClrMapping/>
+  </p:clrMapOvr>
+</p:notes>
+</file>
+
+<file path=ppt/notesSlides/notesSlide17.xml><?xml version="1.0" encoding="utf-8"?>
+<p:notes xmlns:a="http://schemas.openxmlformats.org/drawingml/2006/main" xmlns:r="http://schemas.openxmlformats.org/officeDocument/2006/relationships" xmlns:p="http://schemas.openxmlformats.org/presentationml/2006/main">
+  <p:cSld>
+    <p:spTree>
+      <p:nvGrpSpPr>
+        <p:cNvPr id="1" name=""/>
+        <p:cNvGrpSpPr/>
+        <p:nvPr/>
+      </p:nvGrpSpPr>
+      <p:grpSpPr>
+        <a:xfrm>
+          <a:off x="0" y="0"/>
+          <a:ext cx="0" cy="0"/>
+          <a:chOff x="0" y="0"/>
+          <a:chExt cx="0" cy="0"/>
+        </a:xfrm>
+      </p:grpSpPr>
+      <p:sp>
+        <p:nvSpPr>
+          <p:cNvPr id="2" name="Slide Image Placeholder 1"/>
+          <p:cNvSpPr>
+            <a:spLocks noGrp="1" noRot="1" noChangeAspect="1"/>
+          </p:cNvSpPr>
+          <p:nvPr>
+            <p:ph type="sldImg"/>
+          </p:nvPr>
+        </p:nvSpPr>
+        <p:spPr/>
+      </p:sp>
+      <p:sp>
+        <p:nvSpPr>
+          <p:cNvPr id="3" name="Notes Placeholder 2"/>
+          <p:cNvSpPr>
+            <a:spLocks noGrp="1"/>
+          </p:cNvSpPr>
+          <p:nvPr>
+            <p:ph type="body" idx="1"/>
+          </p:nvPr>
+        </p:nvSpPr>
+        <p:spPr/>
+        <p:txBody>
+          <a:bodyPr/>
+          <a:lstStyle/>
+          <a:p>
+            <a:endParaRPr lang="en-US" dirty="0"/>
+          </a:p>
+        </p:txBody>
+      </p:sp>
+      <p:sp>
+        <p:nvSpPr>
+          <p:cNvPr id="4" name="Slide Number Placeholder 3"/>
+          <p:cNvSpPr>
+            <a:spLocks noGrp="1"/>
+          </p:cNvSpPr>
+          <p:nvPr>
+            <p:ph type="sldNum" sz="quarter" idx="5"/>
+          </p:nvPr>
+        </p:nvSpPr>
+        <p:spPr/>
+        <p:txBody>
+          <a:bodyPr/>
+          <a:lstStyle/>
+          <a:p>
+            <a:fld id="{C6AEA146-89B5-4A42-BEB6-D6A5BB50F046}" type="slidenum">
+              <a:rPr lang="en-US" smtClean="0"/>
+              <a:t>21</a:t>
+            </a:fld>
+            <a:endParaRPr lang="en-US"/>
+          </a:p>
+        </p:txBody>
+      </p:sp>
+    </p:spTree>
+    <p:extLst>
+      <p:ext uri="{BB962C8B-B14F-4D97-AF65-F5344CB8AC3E}">
+        <p14:creationId xmlns:p14="http://schemas.microsoft.com/office/powerpoint/2010/main" val="4152562515"/>
       </p:ext>
     </p:extLst>
   </p:cSld>
@@ -855,35 +1352,78 @@
           <a:bodyPr/>
           <a:lstStyle/>
           <a:p>
+            <a:pPr marL="0" marR="0" lvl="0" indent="0" algn="l" defTabSz="914400" rtl="0" eaLnBrk="1" fontAlgn="auto" latinLnBrk="0" hangingPunct="1">
+              <a:lnSpc>
+                <a:spcPct val="100000"/>
+              </a:lnSpc>
+              <a:spcBef>
+                <a:spcPts val="0"/>
+              </a:spcBef>
+              <a:spcAft>
+                <a:spcPts val="0"/>
+              </a:spcAft>
+              <a:buClrTx/>
+              <a:buSzTx/>
+              <a:buFontTx/>
+              <a:buNone/>
+              <a:tabLst/>
+              <a:defRPr/>
+            </a:pPr>
+            <a:r>
+              <a:rPr lang="en-US" sz="1200" dirty="0"/>
+              <a:t>Going to Focus on WIMPS only. </a:t>
+            </a:r>
+          </a:p>
+          <a:p>
+            <a:pPr marL="0" marR="0" lvl="0" indent="0" algn="l" defTabSz="914400" rtl="0" eaLnBrk="1" fontAlgn="auto" latinLnBrk="0" hangingPunct="1">
+              <a:lnSpc>
+                <a:spcPct val="100000"/>
+              </a:lnSpc>
+              <a:spcBef>
+                <a:spcPts val="0"/>
+              </a:spcBef>
+              <a:spcAft>
+                <a:spcPts val="0"/>
+              </a:spcAft>
+              <a:buClrTx/>
+              <a:buSzTx/>
+              <a:buFontTx/>
+              <a:buNone/>
+              <a:tabLst/>
+              <a:defRPr/>
+            </a:pPr>
+            <a:endParaRPr lang="en-US" sz="1200" dirty="0"/>
+          </a:p>
+          <a:p>
+            <a:pPr marL="0" marR="0" lvl="0" indent="0" algn="l" defTabSz="914400" rtl="0" eaLnBrk="1" fontAlgn="auto" latinLnBrk="0" hangingPunct="1">
+              <a:lnSpc>
+                <a:spcPct val="100000"/>
+              </a:lnSpc>
+              <a:spcBef>
+                <a:spcPts val="0"/>
+              </a:spcBef>
+              <a:spcAft>
+                <a:spcPts val="0"/>
+              </a:spcAft>
+              <a:buClrTx/>
+              <a:buSzTx/>
+              <a:buFontTx/>
+              <a:buNone/>
+              <a:tabLst/>
+              <a:defRPr/>
+            </a:pPr>
+            <a:r>
+              <a:rPr lang="en-US" sz="1200" dirty="0"/>
+              <a:t>Dark Matter experiments such as CDMS and CREST are trying to push down to lower thresholds. </a:t>
+            </a:r>
+          </a:p>
+          <a:p>
+            <a:endParaRPr lang="en-US" dirty="0"/>
+          </a:p>
+          <a:p>
             <a:r>
               <a:rPr lang="en-US" dirty="0"/>
-              <a:t>A WIMP comes in a hits the nuclei, initial phonons are produced and charge is liberated in some ratio. Current generation of lowest threshold detectors only count the number of produced electron hole pairs. We do not have a good nuclear recoil calibration standard. Therefore to extract the nuclear recoil energy we have to know the ratio of recoil energy that goes into the electronic system.  </a:t>
-            </a:r>
-          </a:p>
-          <a:p>
-            <a:endParaRPr lang="en-US" dirty="0"/>
-          </a:p>
-          <a:p>
-            <a:r>
-              <a:rPr lang="en-US" dirty="0"/>
-              <a:t>Variation in energy given to the electronic system exists because a single </a:t>
-            </a:r>
-            <a:r>
-              <a:rPr lang="en-US" dirty="0" err="1"/>
-              <a:t>E_r</a:t>
-            </a:r>
-            <a:r>
-              <a:rPr lang="en-US" dirty="0"/>
-              <a:t> can create a spectrum of a possible number of  electron hole pairs </a:t>
-            </a:r>
-          </a:p>
-          <a:p>
-            <a:endParaRPr lang="en-US" dirty="0"/>
-          </a:p>
-          <a:p>
-            <a:r>
-              <a:rPr lang="en-US" dirty="0"/>
-              <a:t>Solid State detector with a voltage across it. For the purpose of this talk. </a:t>
+              <a:t>The detects that are trying to do this are solid state detectors with some sort of voltage applied to them. They are essentially electron-hole pair counters. </a:t>
             </a:r>
           </a:p>
         </p:txBody>
@@ -914,7 +1454,7 @@
     </p:spTree>
     <p:extLst>
       <p:ext uri="{BB962C8B-B14F-4D97-AF65-F5344CB8AC3E}">
-        <p14:creationId xmlns:p14="http://schemas.microsoft.com/office/powerpoint/2010/main" val="1051823211"/>
+        <p14:creationId xmlns:p14="http://schemas.microsoft.com/office/powerpoint/2010/main" val="1234004632"/>
       </p:ext>
     </p:extLst>
   </p:cSld>
@@ -970,13 +1510,34 @@
           <a:p>
             <a:r>
               <a:rPr lang="en-US" dirty="0"/>
-              <a:t>Citation for </a:t>
+              <a:t>A WIMP comes in a hits the nuclei, initial phonons are produced and charge is liberated in some ratio. Current generation of lowest threshold detectors only count the number of produced electron hole pairs. We do not have a good nuclear recoil calibration standard. Therefore to extract the nuclear recoil energy we have to know the ratio of recoil energy that goes into the electronic system.  </a:t>
+            </a:r>
+          </a:p>
+          <a:p>
+            <a:endParaRPr lang="en-US" dirty="0"/>
+          </a:p>
+          <a:p>
+            <a:r>
+              <a:rPr lang="en-US" dirty="0"/>
+              <a:t>Variation in energy given to the electronic system exists because a single </a:t>
             </a:r>
             <a:r>
               <a:rPr lang="en-US" dirty="0" err="1"/>
-              <a:t>HVeV</a:t>
-            </a:r>
+              <a:t>E_r</a:t>
+            </a:r>
+            <a:r>
+              <a:rPr lang="en-US" dirty="0"/>
+              <a:t> can create a spectrum of a possible number of  electron hole pairs </a:t>
+            </a:r>
+          </a:p>
+          <a:p>
             <a:endParaRPr lang="en-US" dirty="0"/>
+          </a:p>
+          <a:p>
+            <a:r>
+              <a:rPr lang="en-US" dirty="0"/>
+              <a:t>Solid State detector with a voltage across it. For the purpose of this talk. </a:t>
+            </a:r>
           </a:p>
         </p:txBody>
       </p:sp>
@@ -1006,7 +1567,7 @@
     </p:spTree>
     <p:extLst>
       <p:ext uri="{BB962C8B-B14F-4D97-AF65-F5344CB8AC3E}">
-        <p14:creationId xmlns:p14="http://schemas.microsoft.com/office/powerpoint/2010/main" val="3501706498"/>
+        <p14:creationId xmlns:p14="http://schemas.microsoft.com/office/powerpoint/2010/main" val="1051823211"/>
       </p:ext>
     </p:extLst>
   </p:cSld>
@@ -1166,16 +1727,13 @@
           <a:p>
             <a:r>
               <a:rPr lang="en-US" dirty="0"/>
-              <a:t>There is a variant number of electron hole pairs exists for a given </a:t>
+              <a:t>Citation for </a:t>
             </a:r>
             <a:r>
               <a:rPr lang="en-US" dirty="0" err="1"/>
-              <a:t>Er</a:t>
-            </a:r>
-            <a:r>
-              <a:rPr lang="en-US" dirty="0"/>
-              <a:t> for both electron recoils and nuclear recoils. </a:t>
-            </a:r>
+              <a:t>HVeV</a:t>
+            </a:r>
+            <a:endParaRPr lang="en-US" dirty="0"/>
           </a:p>
         </p:txBody>
       </p:sp>
@@ -1205,7 +1763,7 @@
     </p:spTree>
     <p:extLst>
       <p:ext uri="{BB962C8B-B14F-4D97-AF65-F5344CB8AC3E}">
-        <p14:creationId xmlns:p14="http://schemas.microsoft.com/office/powerpoint/2010/main" val="2674662709"/>
+        <p14:creationId xmlns:p14="http://schemas.microsoft.com/office/powerpoint/2010/main" val="3501706498"/>
       </p:ext>
     </p:extLst>
   </p:cSld>
@@ -1261,7 +1819,15 @@
           <a:p>
             <a:r>
               <a:rPr lang="en-US" dirty="0"/>
-              <a:t>Will talk more about it. Less bullet points. </a:t>
+              <a:t>There is a variant number of electron hole pairs exists for a given </a:t>
+            </a:r>
+            <a:r>
+              <a:rPr lang="en-US" dirty="0" err="1"/>
+              <a:t>Er</a:t>
+            </a:r>
+            <a:r>
+              <a:rPr lang="en-US" dirty="0"/>
+              <a:t> for both electron recoils and nuclear recoils. </a:t>
             </a:r>
           </a:p>
         </p:txBody>
@@ -1292,7 +1858,7 @@
     </p:spTree>
     <p:extLst>
       <p:ext uri="{BB962C8B-B14F-4D97-AF65-F5344CB8AC3E}">
-        <p14:creationId xmlns:p14="http://schemas.microsoft.com/office/powerpoint/2010/main" val="1293990840"/>
+        <p14:creationId xmlns:p14="http://schemas.microsoft.com/office/powerpoint/2010/main" val="2674662709"/>
       </p:ext>
     </p:extLst>
   </p:cSld>
@@ -1379,7 +1945,7 @@
     </p:spTree>
     <p:extLst>
       <p:ext uri="{BB962C8B-B14F-4D97-AF65-F5344CB8AC3E}">
-        <p14:creationId xmlns:p14="http://schemas.microsoft.com/office/powerpoint/2010/main" val="3702715767"/>
+        <p14:creationId xmlns:p14="http://schemas.microsoft.com/office/powerpoint/2010/main" val="1293990840"/>
       </p:ext>
     </p:extLst>
   </p:cSld>
@@ -1435,14 +2001,8 @@
           <a:p>
             <a:r>
               <a:rPr lang="en-US" dirty="0"/>
-              <a:t>They can measure charge and phonons separately, this gives them a direct measure of the yield. </a:t>
-            </a:r>
-          </a:p>
-          <a:p>
-            <a:endParaRPr lang="en-US" dirty="0"/>
-          </a:p>
-          <a:p>
-            <a:endParaRPr lang="en-US" dirty="0"/>
+              <a:t>Will talk more about it. Less bullet points. </a:t>
+            </a:r>
           </a:p>
         </p:txBody>
       </p:sp>
@@ -1472,7 +2032,7 @@
     </p:spTree>
     <p:extLst>
       <p:ext uri="{BB962C8B-B14F-4D97-AF65-F5344CB8AC3E}">
-        <p14:creationId xmlns:p14="http://schemas.microsoft.com/office/powerpoint/2010/main" val="2530409236"/>
+        <p14:creationId xmlns:p14="http://schemas.microsoft.com/office/powerpoint/2010/main" val="3702715767"/>
       </p:ext>
     </p:extLst>
   </p:cSld>
@@ -1565,7 +2125,7 @@
     </p:spTree>
     <p:extLst>
       <p:ext uri="{BB962C8B-B14F-4D97-AF65-F5344CB8AC3E}">
-        <p14:creationId xmlns:p14="http://schemas.microsoft.com/office/powerpoint/2010/main" val="286871158"/>
+        <p14:creationId xmlns:p14="http://schemas.microsoft.com/office/powerpoint/2010/main" val="2530409236"/>
       </p:ext>
     </p:extLst>
   </p:cSld>
@@ -1722,7 +2282,7 @@
           <a:p>
             <a:fld id="{4C4FE5A6-B042-234F-87BB-EE608B65FD71}" type="datetime1">
               <a:rPr lang="en-US" smtClean="0"/>
-              <a:t>10/25/18</a:t>
+              <a:t>11/23/18</a:t>
             </a:fld>
             <a:endParaRPr lang="en-US"/>
           </a:p>
@@ -1920,7 +2480,7 @@
           <a:p>
             <a:fld id="{896964B4-7059-1241-B7F7-CC759A8715E3}" type="datetime1">
               <a:rPr lang="en-US" smtClean="0"/>
-              <a:t>10/25/18</a:t>
+              <a:t>11/23/18</a:t>
             </a:fld>
             <a:endParaRPr lang="en-US"/>
           </a:p>
@@ -2128,7 +2688,7 @@
           <a:p>
             <a:fld id="{2BB15EFC-989A-504F-A26D-C47609D34B5F}" type="datetime1">
               <a:rPr lang="en-US" smtClean="0"/>
-              <a:t>10/25/18</a:t>
+              <a:t>11/23/18</a:t>
             </a:fld>
             <a:endParaRPr lang="en-US"/>
           </a:p>
@@ -2326,7 +2886,7 @@
           <a:p>
             <a:fld id="{878B0B07-2815-5A40-BA13-144E9203A1A1}" type="datetime1">
               <a:rPr lang="en-US" smtClean="0"/>
-              <a:t>10/25/18</a:t>
+              <a:t>11/23/18</a:t>
             </a:fld>
             <a:endParaRPr lang="en-US"/>
           </a:p>
@@ -2601,7 +3161,7 @@
           <a:p>
             <a:fld id="{BEFA5980-D336-5242-9389-BFB74FFD9D7A}" type="datetime1">
               <a:rPr lang="en-US" smtClean="0"/>
-              <a:t>10/25/18</a:t>
+              <a:t>11/23/18</a:t>
             </a:fld>
             <a:endParaRPr lang="en-US"/>
           </a:p>
@@ -2866,7 +3426,7 @@
           <a:p>
             <a:fld id="{9A639845-AF02-6444-8914-745C5B843963}" type="datetime1">
               <a:rPr lang="en-US" smtClean="0"/>
-              <a:t>10/25/18</a:t>
+              <a:t>11/23/18</a:t>
             </a:fld>
             <a:endParaRPr lang="en-US"/>
           </a:p>
@@ -3278,7 +3838,7 @@
           <a:p>
             <a:fld id="{0F2F0F5A-6752-E241-B405-243254C949FE}" type="datetime1">
               <a:rPr lang="en-US" smtClean="0"/>
-              <a:t>10/25/18</a:t>
+              <a:t>11/23/18</a:t>
             </a:fld>
             <a:endParaRPr lang="en-US"/>
           </a:p>
@@ -3419,7 +3979,7 @@
           <a:p>
             <a:fld id="{B83D80F1-84FB-C64D-897C-E07C36349253}" type="datetime1">
               <a:rPr lang="en-US" smtClean="0"/>
-              <a:t>10/25/18</a:t>
+              <a:t>11/23/18</a:t>
             </a:fld>
             <a:endParaRPr lang="en-US"/>
           </a:p>
@@ -3532,7 +4092,7 @@
           <a:p>
             <a:fld id="{31D310E7-727F-F848-8E1F-A84AE0965461}" type="datetime1">
               <a:rPr lang="en-US" smtClean="0"/>
-              <a:t>10/25/18</a:t>
+              <a:t>11/23/18</a:t>
             </a:fld>
             <a:endParaRPr lang="en-US"/>
           </a:p>
@@ -3843,7 +4403,7 @@
           <a:p>
             <a:fld id="{3DEAACE5-D900-B941-9691-B5A70076832D}" type="datetime1">
               <a:rPr lang="en-US" smtClean="0"/>
-              <a:t>10/25/18</a:t>
+              <a:t>11/23/18</a:t>
             </a:fld>
             <a:endParaRPr lang="en-US"/>
           </a:p>
@@ -4131,7 +4691,7 @@
           <a:p>
             <a:fld id="{3B5943A7-FE33-B04F-95DA-1C0FFE2A1D14}" type="datetime1">
               <a:rPr lang="en-US" smtClean="0"/>
-              <a:t>10/25/18</a:t>
+              <a:t>11/23/18</a:t>
             </a:fld>
             <a:endParaRPr lang="en-US"/>
           </a:p>
@@ -4372,7 +4932,7 @@
           <a:p>
             <a:fld id="{DDEB6CB8-30E9-7642-9D44-7B1E342777B2}" type="datetime1">
               <a:rPr lang="en-US" smtClean="0"/>
-              <a:t>10/25/18</a:t>
+              <a:t>11/23/18</a:t>
             </a:fld>
             <a:endParaRPr lang="en-US"/>
           </a:p>
@@ -4968,6 +5528,59 @@
       </p:sp>
       <p:sp>
         <p:nvSpPr>
+          <p:cNvPr id="9" name="Content Placeholder 8">
+            <a:extLst>
+              <a:ext uri="{FF2B5EF4-FFF2-40B4-BE49-F238E27FC236}">
+                <a16:creationId xmlns:a16="http://schemas.microsoft.com/office/drawing/2014/main" id="{64E94FD4-7193-134C-8BE7-18D70D086E45}"/>
+              </a:ext>
+            </a:extLst>
+          </p:cNvPr>
+          <p:cNvSpPr>
+            <a:spLocks noGrp="1"/>
+          </p:cNvSpPr>
+          <p:nvPr>
+            <p:ph idx="1"/>
+          </p:nvPr>
+        </p:nvSpPr>
+        <p:spPr>
+          <a:xfrm>
+            <a:off x="838200" y="1825625"/>
+            <a:ext cx="5618096" cy="4351338"/>
+          </a:xfrm>
+        </p:spPr>
+        <p:txBody>
+          <a:bodyPr>
+            <a:normAutofit/>
+          </a:bodyPr>
+          <a:lstStyle/>
+          <a:p>
+            <a:r>
+              <a:rPr lang="en-US" sz="1800" dirty="0"/>
+              <a:t>Ability to directly to measure charge and phonons separately. Allowing for a direct measurement of the ionization efficiency. </a:t>
+            </a:r>
+          </a:p>
+          <a:p>
+            <a:endParaRPr lang="en-US" sz="1800" dirty="0"/>
+          </a:p>
+          <a:p>
+            <a:r>
+              <a:rPr lang="en-US" sz="1800" dirty="0"/>
+              <a:t>Should be able to extract the width of the nuclear recoil band.</a:t>
+            </a:r>
+          </a:p>
+          <a:p>
+            <a:endParaRPr lang="en-US" sz="1800" dirty="0"/>
+          </a:p>
+          <a:p>
+            <a:r>
+              <a:rPr lang="en-US" sz="1800" dirty="0"/>
+              <a:t>Allows quantify the variation in electron hole pair production. </a:t>
+            </a:r>
+          </a:p>
+        </p:txBody>
+      </p:sp>
+      <p:sp>
+        <p:nvSpPr>
           <p:cNvPr id="4" name="Slide Number Placeholder 3">
             <a:extLst>
               <a:ext uri="{FF2B5EF4-FFF2-40B4-BE49-F238E27FC236}">
@@ -5025,52 +5638,22 @@
           </a:prstGeom>
         </p:spPr>
       </p:pic>
-      <p:pic>
-        <p:nvPicPr>
-          <p:cNvPr id="9" name="Picture 8">
-            <a:extLst>
-              <a:ext uri="{FF2B5EF4-FFF2-40B4-BE49-F238E27FC236}">
-                <a16:creationId xmlns:a16="http://schemas.microsoft.com/office/drawing/2014/main" id="{123F1548-E147-4140-B9EC-E49ACBFA8E7F}"/>
-              </a:ext>
-            </a:extLst>
-          </p:cNvPr>
-          <p:cNvPicPr>
-            <a:picLocks noChangeAspect="1"/>
-          </p:cNvPicPr>
+      <p:sp>
+        <p:nvSpPr>
+          <p:cNvPr id="2" name="TextBox 1">
+            <a:extLst>
+              <a:ext uri="{FF2B5EF4-FFF2-40B4-BE49-F238E27FC236}">
+                <a16:creationId xmlns:a16="http://schemas.microsoft.com/office/drawing/2014/main" id="{3A2733A5-9A6F-C04B-B0B4-30BF2F429201}"/>
+              </a:ext>
+            </a:extLst>
+          </p:cNvPr>
+          <p:cNvSpPr txBox="1"/>
           <p:nvPr/>
-        </p:nvPicPr>
-        <p:blipFill>
-          <a:blip r:embed="rId4"/>
-          <a:stretch>
-            <a:fillRect/>
-          </a:stretch>
-        </p:blipFill>
+        </p:nvSpPr>
         <p:spPr>
           <a:xfrm>
-            <a:off x="0" y="1288305"/>
-            <a:ext cx="6265907" cy="5569695"/>
-          </a:xfrm>
-          <a:prstGeom prst="rect">
-            <a:avLst/>
-          </a:prstGeom>
-        </p:spPr>
-      </p:pic>
-      <p:sp>
-        <p:nvSpPr>
-          <p:cNvPr id="10" name="TextBox 9">
-            <a:extLst>
-              <a:ext uri="{FF2B5EF4-FFF2-40B4-BE49-F238E27FC236}">
-                <a16:creationId xmlns:a16="http://schemas.microsoft.com/office/drawing/2014/main" id="{E41053B8-5368-5247-A012-0A750790282C}"/>
-              </a:ext>
-            </a:extLst>
-          </p:cNvPr>
-          <p:cNvSpPr txBox="1"/>
-          <p:nvPr/>
-        </p:nvSpPr>
-        <p:spPr>
-          <a:xfrm>
-            <a:off x="3143250" y="2200275"/>
-            <a:ext cx="1395703" cy="400110"/>
+            <a:off x="9510818" y="6535265"/>
+            <a:ext cx="2571538" cy="307777"/>
           </a:xfrm>
           <a:prstGeom prst="rect">
             <a:avLst/>
@@ -5084,12 +5667,8 @@
           <a:lstStyle/>
           <a:p>
             <a:r>
-              <a:rPr lang="en-US" sz="2000" dirty="0">
-                <a:solidFill>
-                  <a:srgbClr val="FF0000"/>
-                </a:solidFill>
-              </a:rPr>
-              <a:t>SIMULATED</a:t>
+              <a:rPr lang="en-US" sz="1400" dirty="0"/>
+              <a:t>DOI 10.1016/j.nima.2004.04.218</a:t>
             </a:r>
           </a:p>
         </p:txBody>
@@ -5097,7 +5676,7 @@
     </p:spTree>
     <p:extLst>
       <p:ext uri="{BB962C8B-B14F-4D97-AF65-F5344CB8AC3E}">
-        <p14:creationId xmlns:p14="http://schemas.microsoft.com/office/powerpoint/2010/main" val="3140351148"/>
+        <p14:creationId xmlns:p14="http://schemas.microsoft.com/office/powerpoint/2010/main" val="4115652011"/>
       </p:ext>
     </p:extLst>
   </p:cSld>
@@ -5124,82 +5703,12 @@
           <a:chExt cx="0" cy="0"/>
         </a:xfrm>
       </p:grpSpPr>
-      <p:sp>
-        <p:nvSpPr>
-          <p:cNvPr id="3" name="Title 2">
-            <a:extLst>
-              <a:ext uri="{FF2B5EF4-FFF2-40B4-BE49-F238E27FC236}">
-                <a16:creationId xmlns:a16="http://schemas.microsoft.com/office/drawing/2014/main" id="{7B230F94-B493-CE43-929A-2A41F3FEB4EF}"/>
-              </a:ext>
-            </a:extLst>
-          </p:cNvPr>
-          <p:cNvSpPr>
-            <a:spLocks noGrp="1"/>
-          </p:cNvSpPr>
-          <p:nvPr>
-            <p:ph type="title"/>
-          </p:nvPr>
-        </p:nvSpPr>
-        <p:spPr/>
-        <p:txBody>
-          <a:bodyPr>
-            <a:normAutofit fontScale="90000"/>
-          </a:bodyPr>
-          <a:lstStyle/>
-          <a:p>
-            <a:br>
-              <a:rPr lang="en-US" dirty="0"/>
-            </a:br>
-            <a:r>
-              <a:rPr lang="en-US" sz="4900" dirty="0"/>
-              <a:t>Quantifying</a:t>
-            </a:r>
-            <a:r>
-              <a:rPr lang="en-US" dirty="0"/>
-              <a:t> Ionization Variance </a:t>
-            </a:r>
-            <a:br>
-              <a:rPr lang="en-US" dirty="0"/>
-            </a:br>
-            <a:endParaRPr lang="en-US" dirty="0"/>
-          </a:p>
-        </p:txBody>
-      </p:sp>
-      <p:sp>
-        <p:nvSpPr>
-          <p:cNvPr id="4" name="Slide Number Placeholder 3">
-            <a:extLst>
-              <a:ext uri="{FF2B5EF4-FFF2-40B4-BE49-F238E27FC236}">
-                <a16:creationId xmlns:a16="http://schemas.microsoft.com/office/drawing/2014/main" id="{3BB79DFF-2B30-6C4A-B3BC-8451CDEEBBAD}"/>
-              </a:ext>
-            </a:extLst>
-          </p:cNvPr>
-          <p:cNvSpPr>
-            <a:spLocks noGrp="1"/>
-          </p:cNvSpPr>
-          <p:nvPr>
-            <p:ph type="sldNum" sz="quarter" idx="12"/>
-          </p:nvPr>
-        </p:nvSpPr>
-        <p:spPr/>
-        <p:txBody>
-          <a:bodyPr/>
-          <a:lstStyle/>
-          <a:p>
-            <a:fld id="{035DBD62-E6E0-484E-AB64-E286A6B85B65}" type="slidenum">
-              <a:rPr lang="en-US" smtClean="0"/>
-              <a:t>11</a:t>
-            </a:fld>
-            <a:endParaRPr lang="en-US"/>
-          </a:p>
-        </p:txBody>
-      </p:sp>
       <p:pic>
         <p:nvPicPr>
-          <p:cNvPr id="13" name="Picture 12">
-            <a:extLst>
-              <a:ext uri="{FF2B5EF4-FFF2-40B4-BE49-F238E27FC236}">
-                <a16:creationId xmlns:a16="http://schemas.microsoft.com/office/drawing/2014/main" id="{C6CC82BA-8986-654D-9749-C1F34B36D70B}"/>
+          <p:cNvPr id="7" name="Picture 6">
+            <a:extLst>
+              <a:ext uri="{FF2B5EF4-FFF2-40B4-BE49-F238E27FC236}">
+                <a16:creationId xmlns:a16="http://schemas.microsoft.com/office/drawing/2014/main" id="{FDB5DC79-EE8E-8B45-8817-8E9CBD6C2756}"/>
               </a:ext>
             </a:extLst>
           </p:cNvPr>
@@ -5210,6 +5719,106 @@
         </p:nvPicPr>
         <p:blipFill>
           <a:blip r:embed="rId3"/>
+          <a:stretch>
+            <a:fillRect/>
+          </a:stretch>
+        </p:blipFill>
+        <p:spPr>
+          <a:xfrm>
+            <a:off x="91215" y="1200150"/>
+            <a:ext cx="6365081" cy="5657850"/>
+          </a:xfrm>
+          <a:prstGeom prst="rect">
+            <a:avLst/>
+          </a:prstGeom>
+        </p:spPr>
+      </p:pic>
+      <p:sp>
+        <p:nvSpPr>
+          <p:cNvPr id="3" name="Title 2">
+            <a:extLst>
+              <a:ext uri="{FF2B5EF4-FFF2-40B4-BE49-F238E27FC236}">
+                <a16:creationId xmlns:a16="http://schemas.microsoft.com/office/drawing/2014/main" id="{7B230F94-B493-CE43-929A-2A41F3FEB4EF}"/>
+              </a:ext>
+            </a:extLst>
+          </p:cNvPr>
+          <p:cNvSpPr>
+            <a:spLocks noGrp="1"/>
+          </p:cNvSpPr>
+          <p:nvPr>
+            <p:ph type="title"/>
+          </p:nvPr>
+        </p:nvSpPr>
+        <p:spPr/>
+        <p:txBody>
+          <a:bodyPr>
+            <a:normAutofit fontScale="90000"/>
+          </a:bodyPr>
+          <a:lstStyle/>
+          <a:p>
+            <a:br>
+              <a:rPr lang="en-US" dirty="0"/>
+            </a:br>
+            <a:r>
+              <a:rPr lang="en-US" sz="4900" dirty="0"/>
+              <a:t>Quantifying</a:t>
+            </a:r>
+            <a:r>
+              <a:rPr lang="en-US" dirty="0"/>
+              <a:t> Ionization Variance </a:t>
+            </a:r>
+            <a:br>
+              <a:rPr lang="en-US" dirty="0"/>
+            </a:br>
+            <a:endParaRPr lang="en-US" dirty="0"/>
+          </a:p>
+        </p:txBody>
+      </p:sp>
+      <p:sp>
+        <p:nvSpPr>
+          <p:cNvPr id="4" name="Slide Number Placeholder 3">
+            <a:extLst>
+              <a:ext uri="{FF2B5EF4-FFF2-40B4-BE49-F238E27FC236}">
+                <a16:creationId xmlns:a16="http://schemas.microsoft.com/office/drawing/2014/main" id="{3BB79DFF-2B30-6C4A-B3BC-8451CDEEBBAD}"/>
+              </a:ext>
+            </a:extLst>
+          </p:cNvPr>
+          <p:cNvSpPr>
+            <a:spLocks noGrp="1"/>
+          </p:cNvSpPr>
+          <p:nvPr>
+            <p:ph type="sldNum" sz="quarter" idx="12"/>
+          </p:nvPr>
+        </p:nvSpPr>
+        <p:spPr/>
+        <p:txBody>
+          <a:bodyPr/>
+          <a:lstStyle/>
+          <a:p>
+            <a:fld id="{035DBD62-E6E0-484E-AB64-E286A6B85B65}" type="slidenum">
+              <a:rPr lang="en-US" smtClean="0"/>
+              <a:t>11</a:t>
+            </a:fld>
+            <a:endParaRPr lang="en-US"/>
+          </a:p>
+        </p:txBody>
+      </p:sp>
+      <p:pic>
+        <p:nvPicPr>
+          <p:cNvPr id="13" name="Picture 12">
+            <a:extLst>
+              <a:ext uri="{FF2B5EF4-FFF2-40B4-BE49-F238E27FC236}">
+                <a16:creationId xmlns:a16="http://schemas.microsoft.com/office/drawing/2014/main" id="{C6CC82BA-8986-654D-9749-C1F34B36D70B}"/>
+              </a:ext>
+            </a:extLst>
+          </p:cNvPr>
+          <p:cNvPicPr>
+            <a:picLocks noChangeAspect="1"/>
+          </p:cNvPicPr>
+          <p:nvPr/>
+        </p:nvPicPr>
+        <p:blipFill>
+          <a:blip r:embed="rId4"/>
           <a:stretch>
             <a:fillRect/>
           </a:stretch>
@@ -5224,59 +5833,30 @@
           </a:prstGeom>
         </p:spPr>
       </p:pic>
-      <p:pic>
-        <p:nvPicPr>
-          <p:cNvPr id="6" name="Picture 5">
-            <a:extLst>
-              <a:ext uri="{FF2B5EF4-FFF2-40B4-BE49-F238E27FC236}">
-                <a16:creationId xmlns:a16="http://schemas.microsoft.com/office/drawing/2014/main" id="{30F594F2-BF70-5941-8ECC-F90E0FC385EC}"/>
-              </a:ext>
-            </a:extLst>
-          </p:cNvPr>
-          <p:cNvPicPr>
-            <a:picLocks noChangeAspect="1"/>
-          </p:cNvPicPr>
+      <p:sp>
+        <p:nvSpPr>
+          <p:cNvPr id="10" name="TextBox 9">
+            <a:extLst>
+              <a:ext uri="{FF2B5EF4-FFF2-40B4-BE49-F238E27FC236}">
+                <a16:creationId xmlns:a16="http://schemas.microsoft.com/office/drawing/2014/main" id="{E41053B8-5368-5247-A012-0A750790282C}"/>
+              </a:ext>
+            </a:extLst>
+          </p:cNvPr>
+          <p:cNvSpPr txBox="1"/>
           <p:nvPr/>
-        </p:nvPicPr>
-        <p:blipFill>
-          <a:blip r:embed="rId4"/>
-          <a:stretch>
-            <a:fillRect/>
-          </a:stretch>
-        </p:blipFill>
+        </p:nvSpPr>
         <p:spPr>
           <a:xfrm>
-            <a:off x="0" y="1288306"/>
-            <a:ext cx="6265906" cy="5569694"/>
-          </a:xfrm>
-          <a:prstGeom prst="rect">
-            <a:avLst/>
-          </a:prstGeom>
-        </p:spPr>
-      </p:pic>
-      <p:sp>
-        <p:nvSpPr>
-          <p:cNvPr id="7" name="Rectangle 6">
-            <a:extLst>
-              <a:ext uri="{FF2B5EF4-FFF2-40B4-BE49-F238E27FC236}">
-                <a16:creationId xmlns:a16="http://schemas.microsoft.com/office/drawing/2014/main" id="{75F14CEE-E020-5645-8AB5-379EBEABAB2F}"/>
-              </a:ext>
-            </a:extLst>
-          </p:cNvPr>
-          <p:cNvSpPr/>
-          <p:nvPr/>
-        </p:nvSpPr>
-        <p:spPr>
-          <a:xfrm>
-            <a:off x="3132953" y="2213759"/>
+            <a:off x="3143250" y="2200275"/>
             <a:ext cx="1395703" cy="400110"/>
           </a:xfrm>
           <a:prstGeom prst="rect">
             <a:avLst/>
           </a:prstGeom>
+          <a:noFill/>
         </p:spPr>
         <p:txBody>
-          <a:bodyPr wrap="none">
+          <a:bodyPr wrap="none" rtlCol="0">
             <a:spAutoFit/>
           </a:bodyPr>
           <a:lstStyle/>
@@ -5289,14 +5869,13 @@
               </a:rPr>
               <a:t>SIMULATED</a:t>
             </a:r>
-            <a:endParaRPr lang="en-US" sz="2000" dirty="0"/>
           </a:p>
         </p:txBody>
       </p:sp>
     </p:spTree>
     <p:extLst>
       <p:ext uri="{BB962C8B-B14F-4D97-AF65-F5344CB8AC3E}">
-        <p14:creationId xmlns:p14="http://schemas.microsoft.com/office/powerpoint/2010/main" val="1341497285"/>
+        <p14:creationId xmlns:p14="http://schemas.microsoft.com/office/powerpoint/2010/main" val="1446514868"/>
       </p:ext>
     </p:extLst>
   </p:cSld>
@@ -5323,6 +5902,205 @@
           <a:chExt cx="0" cy="0"/>
         </a:xfrm>
       </p:grpSpPr>
+      <p:pic>
+        <p:nvPicPr>
+          <p:cNvPr id="11" name="Picture 10">
+            <a:extLst>
+              <a:ext uri="{FF2B5EF4-FFF2-40B4-BE49-F238E27FC236}">
+                <a16:creationId xmlns:a16="http://schemas.microsoft.com/office/drawing/2014/main" id="{DC00B10F-3051-E542-B3A1-DE0A3A981586}"/>
+              </a:ext>
+            </a:extLst>
+          </p:cNvPr>
+          <p:cNvPicPr>
+            <a:picLocks noChangeAspect="1"/>
+          </p:cNvPicPr>
+          <p:nvPr/>
+        </p:nvPicPr>
+        <p:blipFill>
+          <a:blip r:embed="rId3"/>
+          <a:stretch>
+            <a:fillRect/>
+          </a:stretch>
+        </p:blipFill>
+        <p:spPr>
+          <a:xfrm>
+            <a:off x="84072" y="1193801"/>
+            <a:ext cx="6372224" cy="5664199"/>
+          </a:xfrm>
+          <a:prstGeom prst="rect">
+            <a:avLst/>
+          </a:prstGeom>
+        </p:spPr>
+      </p:pic>
+      <p:sp>
+        <p:nvSpPr>
+          <p:cNvPr id="3" name="Title 2">
+            <a:extLst>
+              <a:ext uri="{FF2B5EF4-FFF2-40B4-BE49-F238E27FC236}">
+                <a16:creationId xmlns:a16="http://schemas.microsoft.com/office/drawing/2014/main" id="{7B230F94-B493-CE43-929A-2A41F3FEB4EF}"/>
+              </a:ext>
+            </a:extLst>
+          </p:cNvPr>
+          <p:cNvSpPr>
+            <a:spLocks noGrp="1"/>
+          </p:cNvSpPr>
+          <p:nvPr>
+            <p:ph type="title"/>
+          </p:nvPr>
+        </p:nvSpPr>
+        <p:spPr/>
+        <p:txBody>
+          <a:bodyPr>
+            <a:normAutofit fontScale="90000"/>
+          </a:bodyPr>
+          <a:lstStyle/>
+          <a:p>
+            <a:br>
+              <a:rPr lang="en-US" dirty="0"/>
+            </a:br>
+            <a:r>
+              <a:rPr lang="en-US" sz="4900" dirty="0"/>
+              <a:t>Quantifying</a:t>
+            </a:r>
+            <a:r>
+              <a:rPr lang="en-US" dirty="0"/>
+              <a:t> Ionization Variance </a:t>
+            </a:r>
+            <a:br>
+              <a:rPr lang="en-US" dirty="0"/>
+            </a:br>
+            <a:endParaRPr lang="en-US" dirty="0"/>
+          </a:p>
+        </p:txBody>
+      </p:sp>
+      <p:sp>
+        <p:nvSpPr>
+          <p:cNvPr id="4" name="Slide Number Placeholder 3">
+            <a:extLst>
+              <a:ext uri="{FF2B5EF4-FFF2-40B4-BE49-F238E27FC236}">
+                <a16:creationId xmlns:a16="http://schemas.microsoft.com/office/drawing/2014/main" id="{3BB79DFF-2B30-6C4A-B3BC-8451CDEEBBAD}"/>
+              </a:ext>
+            </a:extLst>
+          </p:cNvPr>
+          <p:cNvSpPr>
+            <a:spLocks noGrp="1"/>
+          </p:cNvSpPr>
+          <p:nvPr>
+            <p:ph type="sldNum" sz="quarter" idx="12"/>
+          </p:nvPr>
+        </p:nvSpPr>
+        <p:spPr/>
+        <p:txBody>
+          <a:bodyPr/>
+          <a:lstStyle/>
+          <a:p>
+            <a:fld id="{035DBD62-E6E0-484E-AB64-E286A6B85B65}" type="slidenum">
+              <a:rPr lang="en-US" smtClean="0"/>
+              <a:t>12</a:t>
+            </a:fld>
+            <a:endParaRPr lang="en-US"/>
+          </a:p>
+        </p:txBody>
+      </p:sp>
+      <p:pic>
+        <p:nvPicPr>
+          <p:cNvPr id="13" name="Picture 12">
+            <a:extLst>
+              <a:ext uri="{FF2B5EF4-FFF2-40B4-BE49-F238E27FC236}">
+                <a16:creationId xmlns:a16="http://schemas.microsoft.com/office/drawing/2014/main" id="{C6CC82BA-8986-654D-9749-C1F34B36D70B}"/>
+              </a:ext>
+            </a:extLst>
+          </p:cNvPr>
+          <p:cNvPicPr>
+            <a:picLocks noChangeAspect="1"/>
+          </p:cNvPicPr>
+          <p:nvPr/>
+        </p:nvPicPr>
+        <p:blipFill>
+          <a:blip r:embed="rId4"/>
+          <a:stretch>
+            <a:fillRect/>
+          </a:stretch>
+        </p:blipFill>
+        <p:spPr>
+          <a:xfrm>
+            <a:off x="6456296" y="1806670"/>
+            <a:ext cx="4897504" cy="4920390"/>
+          </a:xfrm>
+          <a:prstGeom prst="rect">
+            <a:avLst/>
+          </a:prstGeom>
+        </p:spPr>
+      </p:pic>
+      <p:sp>
+        <p:nvSpPr>
+          <p:cNvPr id="7" name="Rectangle 6">
+            <a:extLst>
+              <a:ext uri="{FF2B5EF4-FFF2-40B4-BE49-F238E27FC236}">
+                <a16:creationId xmlns:a16="http://schemas.microsoft.com/office/drawing/2014/main" id="{75F14CEE-E020-5645-8AB5-379EBEABAB2F}"/>
+              </a:ext>
+            </a:extLst>
+          </p:cNvPr>
+          <p:cNvSpPr/>
+          <p:nvPr/>
+        </p:nvSpPr>
+        <p:spPr>
+          <a:xfrm>
+            <a:off x="3132953" y="2199471"/>
+            <a:ext cx="1395703" cy="400110"/>
+          </a:xfrm>
+          <a:prstGeom prst="rect">
+            <a:avLst/>
+          </a:prstGeom>
+        </p:spPr>
+        <p:txBody>
+          <a:bodyPr wrap="none">
+            <a:spAutoFit/>
+          </a:bodyPr>
+          <a:lstStyle/>
+          <a:p>
+            <a:r>
+              <a:rPr lang="en-US" sz="2000" dirty="0">
+                <a:solidFill>
+                  <a:srgbClr val="FF0000"/>
+                </a:solidFill>
+              </a:rPr>
+              <a:t>SIMULATED</a:t>
+            </a:r>
+            <a:endParaRPr lang="en-US" sz="2000" dirty="0"/>
+          </a:p>
+        </p:txBody>
+      </p:sp>
+    </p:spTree>
+    <p:extLst>
+      <p:ext uri="{BB962C8B-B14F-4D97-AF65-F5344CB8AC3E}">
+        <p14:creationId xmlns:p14="http://schemas.microsoft.com/office/powerpoint/2010/main" val="1341497285"/>
+      </p:ext>
+    </p:extLst>
+  </p:cSld>
+  <p:clrMapOvr>
+    <a:masterClrMapping/>
+  </p:clrMapOvr>
+</p:sld>
+</file>
+
+<file path=ppt/slides/slide13.xml><?xml version="1.0" encoding="utf-8"?>
+<p:sld xmlns:a="http://schemas.openxmlformats.org/drawingml/2006/main" xmlns:r="http://schemas.openxmlformats.org/officeDocument/2006/relationships" xmlns:p="http://schemas.openxmlformats.org/presentationml/2006/main">
+  <p:cSld>
+    <p:spTree>
+      <p:nvGrpSpPr>
+        <p:cNvPr id="1" name=""/>
+        <p:cNvGrpSpPr/>
+        <p:nvPr/>
+      </p:nvGrpSpPr>
+      <p:grpSpPr>
+        <a:xfrm>
+          <a:off x="0" y="0"/>
+          <a:ext cx="0" cy="0"/>
+          <a:chOff x="0" y="0"/>
+          <a:chExt cx="0" cy="0"/>
+        </a:xfrm>
+      </p:grpSpPr>
       <p:sp>
         <p:nvSpPr>
           <p:cNvPr id="2" name="Title 1">
@@ -5381,7 +6159,7 @@
           <a:p>
             <a:r>
               <a:rPr lang="en-US" sz="1800" dirty="0"/>
-              <a:t>Our work is searching literature for constraints for the variance in electron hole pair creation at different energies. </a:t>
+              <a:t>There exists a variance in the number of electron hole pairs created for a single nuclear recoil energy. </a:t>
             </a:r>
           </a:p>
           <a:p>
@@ -5390,7 +6168,7 @@
           <a:p>
             <a:r>
               <a:rPr lang="en-US" sz="1800" dirty="0"/>
-              <a:t>Edelweiss and CDMS give us good information for high recoils energies. </a:t>
+              <a:t>This variance is well understood (due to linearity) for the electron recoil band. </a:t>
             </a:r>
           </a:p>
           <a:p>
@@ -5399,25 +6177,38 @@
           <a:p>
             <a:r>
               <a:rPr lang="en-US" sz="1800" dirty="0"/>
-              <a:t>We are going to need to make our own measurements for energies relevant for low mass WIMP searches (@ and below 1 </a:t>
-            </a:r>
-            <a:r>
-              <a:rPr lang="en-US" sz="1800" dirty="0" err="1"/>
-              <a:t>Gev</a:t>
-            </a:r>
+              <a:t>This variance in e-h production for a nuclear recoil can dramatically effect the energy reconstruction of a WIMP (or any other particle) when it interacts with a detector. </a:t>
+            </a:r>
+          </a:p>
+          <a:p>
+            <a:endParaRPr lang="en-US" sz="1800" dirty="0"/>
+          </a:p>
+          <a:p>
             <a:r>
               <a:rPr lang="en-US" sz="1800" dirty="0"/>
-              <a:t>) </a:t>
+              <a:t>Currently working on how to validate the model with data for nuclear recoils. Will then look into other possible explanations for this variance… i.e. multiple scattering, atomic binding energy, etc. </a:t>
             </a:r>
           </a:p>
           <a:p>
             <a:endParaRPr lang="en-US" sz="1800" dirty="0"/>
           </a:p>
           <a:p>
-            <a:r>
-              <a:rPr lang="en-US" sz="1800" dirty="0"/>
-              <a:t>Understanding the distribution of the number of electron hole pairs created is crucial to understand these measurements. </a:t>
-            </a:r>
+            <a:endParaRPr lang="en-US" sz="1800" dirty="0"/>
+          </a:p>
+          <a:p>
+            <a:pPr marL="0" indent="0">
+              <a:buNone/>
+            </a:pPr>
+            <a:endParaRPr lang="en-US" sz="1800" dirty="0"/>
+          </a:p>
+          <a:p>
+            <a:endParaRPr lang="en-US" sz="1800" dirty="0"/>
+          </a:p>
+          <a:p>
+            <a:pPr marL="0" indent="0">
+              <a:buNone/>
+            </a:pPr>
+            <a:endParaRPr lang="en-US" sz="1800" dirty="0"/>
           </a:p>
         </p:txBody>
       </p:sp>
@@ -5444,7 +6235,7 @@
           <a:p>
             <a:fld id="{035DBD62-E6E0-484E-AB64-E286A6B85B65}" type="slidenum">
               <a:rPr lang="en-US" smtClean="0"/>
-              <a:t>12</a:t>
+              <a:t>13</a:t>
             </a:fld>
             <a:endParaRPr lang="en-US"/>
           </a:p>
@@ -5454,6 +6245,1069 @@
     <p:extLst>
       <p:ext uri="{BB962C8B-B14F-4D97-AF65-F5344CB8AC3E}">
         <p14:creationId xmlns:p14="http://schemas.microsoft.com/office/powerpoint/2010/main" val="1769617012"/>
+      </p:ext>
+    </p:extLst>
+  </p:cSld>
+  <p:clrMapOvr>
+    <a:masterClrMapping/>
+  </p:clrMapOvr>
+</p:sld>
+</file>
+
+<file path=ppt/slides/slide14.xml><?xml version="1.0" encoding="utf-8"?>
+<p:sld xmlns:a="http://schemas.openxmlformats.org/drawingml/2006/main" xmlns:r="http://schemas.openxmlformats.org/officeDocument/2006/relationships" xmlns:p="http://schemas.openxmlformats.org/presentationml/2006/main">
+  <p:cSld>
+    <p:spTree>
+      <p:nvGrpSpPr>
+        <p:cNvPr id="1" name=""/>
+        <p:cNvGrpSpPr/>
+        <p:nvPr/>
+      </p:nvGrpSpPr>
+      <p:grpSpPr>
+        <a:xfrm>
+          <a:off x="0" y="0"/>
+          <a:ext cx="0" cy="0"/>
+          <a:chOff x="0" y="0"/>
+          <a:chExt cx="0" cy="0"/>
+        </a:xfrm>
+      </p:grpSpPr>
+      <p:sp>
+        <p:nvSpPr>
+          <p:cNvPr id="2" name="Title 1">
+            <a:extLst>
+              <a:ext uri="{FF2B5EF4-FFF2-40B4-BE49-F238E27FC236}">
+                <a16:creationId xmlns:a16="http://schemas.microsoft.com/office/drawing/2014/main" id="{0394CFAA-C5B1-0A4A-9BF8-42E62BAD6CEB}"/>
+              </a:ext>
+            </a:extLst>
+          </p:cNvPr>
+          <p:cNvSpPr>
+            <a:spLocks noGrp="1"/>
+          </p:cNvSpPr>
+          <p:nvPr>
+            <p:ph type="title"/>
+          </p:nvPr>
+        </p:nvSpPr>
+        <p:spPr/>
+        <p:txBody>
+          <a:bodyPr/>
+          <a:lstStyle/>
+          <a:p>
+            <a:r>
+              <a:rPr lang="en-US" dirty="0"/>
+              <a:t>Back Up Slides </a:t>
+            </a:r>
+          </a:p>
+        </p:txBody>
+      </p:sp>
+      <p:sp>
+        <p:nvSpPr>
+          <p:cNvPr id="3" name="Content Placeholder 2">
+            <a:extLst>
+              <a:ext uri="{FF2B5EF4-FFF2-40B4-BE49-F238E27FC236}">
+                <a16:creationId xmlns:a16="http://schemas.microsoft.com/office/drawing/2014/main" id="{4E35247C-31D1-2B4D-A412-4D370F8942F0}"/>
+              </a:ext>
+            </a:extLst>
+          </p:cNvPr>
+          <p:cNvSpPr>
+            <a:spLocks noGrp="1"/>
+          </p:cNvSpPr>
+          <p:nvPr>
+            <p:ph idx="1"/>
+          </p:nvPr>
+        </p:nvSpPr>
+        <p:spPr/>
+        <p:txBody>
+          <a:bodyPr/>
+          <a:lstStyle/>
+          <a:p>
+            <a:endParaRPr lang="en-US"/>
+          </a:p>
+        </p:txBody>
+      </p:sp>
+      <p:sp>
+        <p:nvSpPr>
+          <p:cNvPr id="4" name="Slide Number Placeholder 3">
+            <a:extLst>
+              <a:ext uri="{FF2B5EF4-FFF2-40B4-BE49-F238E27FC236}">
+                <a16:creationId xmlns:a16="http://schemas.microsoft.com/office/drawing/2014/main" id="{160EB591-4734-5144-A5C0-2FD4AEC238CF}"/>
+              </a:ext>
+            </a:extLst>
+          </p:cNvPr>
+          <p:cNvSpPr>
+            <a:spLocks noGrp="1"/>
+          </p:cNvSpPr>
+          <p:nvPr>
+            <p:ph type="sldNum" sz="quarter" idx="12"/>
+          </p:nvPr>
+        </p:nvSpPr>
+        <p:spPr/>
+        <p:txBody>
+          <a:bodyPr/>
+          <a:lstStyle/>
+          <a:p>
+            <a:fld id="{035DBD62-E6E0-484E-AB64-E286A6B85B65}" type="slidenum">
+              <a:rPr lang="en-US" smtClean="0"/>
+              <a:t>14</a:t>
+            </a:fld>
+            <a:endParaRPr lang="en-US"/>
+          </a:p>
+        </p:txBody>
+      </p:sp>
+    </p:spTree>
+    <p:extLst>
+      <p:ext uri="{BB962C8B-B14F-4D97-AF65-F5344CB8AC3E}">
+        <p14:creationId xmlns:p14="http://schemas.microsoft.com/office/powerpoint/2010/main" val="1102595808"/>
+      </p:ext>
+    </p:extLst>
+  </p:cSld>
+  <p:clrMapOvr>
+    <a:masterClrMapping/>
+  </p:clrMapOvr>
+</p:sld>
+</file>
+
+<file path=ppt/slides/slide15.xml><?xml version="1.0" encoding="utf-8"?>
+<p:sld xmlns:a="http://schemas.openxmlformats.org/drawingml/2006/main" xmlns:r="http://schemas.openxmlformats.org/officeDocument/2006/relationships" xmlns:p="http://schemas.openxmlformats.org/presentationml/2006/main">
+  <p:cSld>
+    <p:spTree>
+      <p:nvGrpSpPr>
+        <p:cNvPr id="1" name=""/>
+        <p:cNvGrpSpPr/>
+        <p:nvPr/>
+      </p:nvGrpSpPr>
+      <p:grpSpPr>
+        <a:xfrm>
+          <a:off x="0" y="0"/>
+          <a:ext cx="0" cy="0"/>
+          <a:chOff x="0" y="0"/>
+          <a:chExt cx="0" cy="0"/>
+        </a:xfrm>
+      </p:grpSpPr>
+      <p:sp>
+        <p:nvSpPr>
+          <p:cNvPr id="2" name="Title 1">
+            <a:extLst>
+              <a:ext uri="{FF2B5EF4-FFF2-40B4-BE49-F238E27FC236}">
+                <a16:creationId xmlns:a16="http://schemas.microsoft.com/office/drawing/2014/main" id="{925E94A2-464A-6945-A11B-246C17609B40}"/>
+              </a:ext>
+            </a:extLst>
+          </p:cNvPr>
+          <p:cNvSpPr>
+            <a:spLocks noGrp="1"/>
+          </p:cNvSpPr>
+          <p:nvPr>
+            <p:ph type="title"/>
+          </p:nvPr>
+        </p:nvSpPr>
+        <p:spPr/>
+        <p:txBody>
+          <a:bodyPr/>
+          <a:lstStyle/>
+          <a:p>
+            <a:r>
+              <a:rPr lang="en-US" dirty="0" err="1"/>
+              <a:t>Lindhard</a:t>
+            </a:r>
+            <a:r>
+              <a:rPr lang="en-US" dirty="0"/>
+              <a:t> Model </a:t>
+            </a:r>
+          </a:p>
+        </p:txBody>
+      </p:sp>
+      <p:pic>
+        <p:nvPicPr>
+          <p:cNvPr id="6" name="Content Placeholder 5">
+            <a:extLst>
+              <a:ext uri="{FF2B5EF4-FFF2-40B4-BE49-F238E27FC236}">
+                <a16:creationId xmlns:a16="http://schemas.microsoft.com/office/drawing/2014/main" id="{E7CF9C6A-D6A7-2141-A58B-B4418E5929C7}"/>
+              </a:ext>
+            </a:extLst>
+          </p:cNvPr>
+          <p:cNvPicPr>
+            <a:picLocks noGrp="1" noChangeAspect="1"/>
+          </p:cNvPicPr>
+          <p:nvPr>
+            <p:ph idx="1"/>
+          </p:nvPr>
+        </p:nvPicPr>
+        <p:blipFill>
+          <a:blip r:embed="rId2"/>
+          <a:stretch>
+            <a:fillRect/>
+          </a:stretch>
+        </p:blipFill>
+        <p:spPr>
+          <a:xfrm>
+            <a:off x="1174486" y="1974056"/>
+            <a:ext cx="9345876" cy="1454944"/>
+          </a:xfrm>
+        </p:spPr>
+      </p:pic>
+      <p:sp>
+        <p:nvSpPr>
+          <p:cNvPr id="4" name="Slide Number Placeholder 3">
+            <a:extLst>
+              <a:ext uri="{FF2B5EF4-FFF2-40B4-BE49-F238E27FC236}">
+                <a16:creationId xmlns:a16="http://schemas.microsoft.com/office/drawing/2014/main" id="{CEB61FAE-F204-3348-9FE5-6006E48E8374}"/>
+              </a:ext>
+            </a:extLst>
+          </p:cNvPr>
+          <p:cNvSpPr>
+            <a:spLocks noGrp="1"/>
+          </p:cNvSpPr>
+          <p:nvPr>
+            <p:ph type="sldNum" sz="quarter" idx="12"/>
+          </p:nvPr>
+        </p:nvSpPr>
+        <p:spPr/>
+        <p:txBody>
+          <a:bodyPr/>
+          <a:lstStyle/>
+          <a:p>
+            <a:fld id="{035DBD62-E6E0-484E-AB64-E286A6B85B65}" type="slidenum">
+              <a:rPr lang="en-US" smtClean="0"/>
+              <a:t>15</a:t>
+            </a:fld>
+            <a:endParaRPr lang="en-US"/>
+          </a:p>
+        </p:txBody>
+      </p:sp>
+      <p:pic>
+        <p:nvPicPr>
+          <p:cNvPr id="8" name="Picture 7">
+            <a:extLst>
+              <a:ext uri="{FF2B5EF4-FFF2-40B4-BE49-F238E27FC236}">
+                <a16:creationId xmlns:a16="http://schemas.microsoft.com/office/drawing/2014/main" id="{B7822440-213F-EA40-85C8-0F75D0B39195}"/>
+              </a:ext>
+            </a:extLst>
+          </p:cNvPr>
+          <p:cNvPicPr>
+            <a:picLocks noChangeAspect="1"/>
+          </p:cNvPicPr>
+          <p:nvPr/>
+        </p:nvPicPr>
+        <p:blipFill>
+          <a:blip r:embed="rId3"/>
+          <a:stretch>
+            <a:fillRect/>
+          </a:stretch>
+        </p:blipFill>
+        <p:spPr>
+          <a:xfrm>
+            <a:off x="974724" y="3860800"/>
+            <a:ext cx="10112375" cy="2390198"/>
+          </a:xfrm>
+          <a:prstGeom prst="rect">
+            <a:avLst/>
+          </a:prstGeom>
+        </p:spPr>
+      </p:pic>
+    </p:spTree>
+    <p:extLst>
+      <p:ext uri="{BB962C8B-B14F-4D97-AF65-F5344CB8AC3E}">
+        <p14:creationId xmlns:p14="http://schemas.microsoft.com/office/powerpoint/2010/main" val="4098237208"/>
+      </p:ext>
+    </p:extLst>
+  </p:cSld>
+  <p:clrMapOvr>
+    <a:masterClrMapping/>
+  </p:clrMapOvr>
+</p:sld>
+</file>
+
+<file path=ppt/slides/slide16.xml><?xml version="1.0" encoding="utf-8"?>
+<p:sld xmlns:a="http://schemas.openxmlformats.org/drawingml/2006/main" xmlns:r="http://schemas.openxmlformats.org/officeDocument/2006/relationships" xmlns:p="http://schemas.openxmlformats.org/presentationml/2006/main">
+  <p:cSld>
+    <p:spTree>
+      <p:nvGrpSpPr>
+        <p:cNvPr id="1" name=""/>
+        <p:cNvGrpSpPr/>
+        <p:nvPr/>
+      </p:nvGrpSpPr>
+      <p:grpSpPr>
+        <a:xfrm>
+          <a:off x="0" y="0"/>
+          <a:ext cx="0" cy="0"/>
+          <a:chOff x="0" y="0"/>
+          <a:chExt cx="0" cy="0"/>
+        </a:xfrm>
+      </p:grpSpPr>
+      <p:sp>
+        <p:nvSpPr>
+          <p:cNvPr id="2" name="Title 1">
+            <a:extLst>
+              <a:ext uri="{FF2B5EF4-FFF2-40B4-BE49-F238E27FC236}">
+                <a16:creationId xmlns:a16="http://schemas.microsoft.com/office/drawing/2014/main" id="{4D345AE9-5EFC-924A-A905-4F6F44C1DF92}"/>
+              </a:ext>
+            </a:extLst>
+          </p:cNvPr>
+          <p:cNvSpPr>
+            <a:spLocks noGrp="1"/>
+          </p:cNvSpPr>
+          <p:nvPr>
+            <p:ph type="title"/>
+          </p:nvPr>
+        </p:nvSpPr>
+        <p:spPr/>
+        <p:txBody>
+          <a:bodyPr/>
+          <a:lstStyle/>
+          <a:p>
+            <a:r>
+              <a:rPr lang="en-US" dirty="0" err="1"/>
+              <a:t>Lindhard</a:t>
+            </a:r>
+            <a:r>
+              <a:rPr lang="en-US" dirty="0"/>
+              <a:t> Model and Ionization Yield </a:t>
+            </a:r>
+          </a:p>
+        </p:txBody>
+      </p:sp>
+      <p:sp>
+        <p:nvSpPr>
+          <p:cNvPr id="4" name="Slide Number Placeholder 3">
+            <a:extLst>
+              <a:ext uri="{FF2B5EF4-FFF2-40B4-BE49-F238E27FC236}">
+                <a16:creationId xmlns:a16="http://schemas.microsoft.com/office/drawing/2014/main" id="{E0A4FEED-526A-B24E-B978-83FE007971A8}"/>
+              </a:ext>
+            </a:extLst>
+          </p:cNvPr>
+          <p:cNvSpPr>
+            <a:spLocks noGrp="1"/>
+          </p:cNvSpPr>
+          <p:nvPr>
+            <p:ph type="sldNum" sz="quarter" idx="12"/>
+          </p:nvPr>
+        </p:nvSpPr>
+        <p:spPr/>
+        <p:txBody>
+          <a:bodyPr/>
+          <a:lstStyle/>
+          <a:p>
+            <a:fld id="{035DBD62-E6E0-484E-AB64-E286A6B85B65}" type="slidenum">
+              <a:rPr lang="en-US" smtClean="0"/>
+              <a:t>16</a:t>
+            </a:fld>
+            <a:endParaRPr lang="en-US"/>
+          </a:p>
+        </p:txBody>
+      </p:sp>
+      <p:pic>
+        <p:nvPicPr>
+          <p:cNvPr id="8" name="Picture 7">
+            <a:extLst>
+              <a:ext uri="{FF2B5EF4-FFF2-40B4-BE49-F238E27FC236}">
+                <a16:creationId xmlns:a16="http://schemas.microsoft.com/office/drawing/2014/main" id="{56FA4C31-D7C4-D644-9CA5-71475E38F220}"/>
+              </a:ext>
+            </a:extLst>
+          </p:cNvPr>
+          <p:cNvPicPr>
+            <a:picLocks noChangeAspect="1"/>
+          </p:cNvPicPr>
+          <p:nvPr/>
+        </p:nvPicPr>
+        <p:blipFill>
+          <a:blip r:embed="rId3"/>
+          <a:stretch>
+            <a:fillRect/>
+          </a:stretch>
+        </p:blipFill>
+        <p:spPr>
+          <a:xfrm>
+            <a:off x="1709747" y="3756819"/>
+            <a:ext cx="2590800" cy="876300"/>
+          </a:xfrm>
+          <a:prstGeom prst="rect">
+            <a:avLst/>
+          </a:prstGeom>
+        </p:spPr>
+      </p:pic>
+      <p:pic>
+        <p:nvPicPr>
+          <p:cNvPr id="10" name="Picture 9">
+            <a:extLst>
+              <a:ext uri="{FF2B5EF4-FFF2-40B4-BE49-F238E27FC236}">
+                <a16:creationId xmlns:a16="http://schemas.microsoft.com/office/drawing/2014/main" id="{0F8E4651-7FEB-1E4A-97D6-0347F61E6607}"/>
+              </a:ext>
+            </a:extLst>
+          </p:cNvPr>
+          <p:cNvPicPr>
+            <a:picLocks noChangeAspect="1"/>
+          </p:cNvPicPr>
+          <p:nvPr/>
+        </p:nvPicPr>
+        <p:blipFill>
+          <a:blip r:embed="rId4"/>
+          <a:stretch>
+            <a:fillRect/>
+          </a:stretch>
+        </p:blipFill>
+        <p:spPr>
+          <a:xfrm>
+            <a:off x="1700222" y="5272087"/>
+            <a:ext cx="1803400" cy="736600"/>
+          </a:xfrm>
+          <a:prstGeom prst="rect">
+            <a:avLst/>
+          </a:prstGeom>
+        </p:spPr>
+      </p:pic>
+      <p:pic>
+        <p:nvPicPr>
+          <p:cNvPr id="12" name="Picture 11">
+            <a:extLst>
+              <a:ext uri="{FF2B5EF4-FFF2-40B4-BE49-F238E27FC236}">
+                <a16:creationId xmlns:a16="http://schemas.microsoft.com/office/drawing/2014/main" id="{B26C1319-1B87-AE46-A368-9CC4B9E279BE}"/>
+              </a:ext>
+            </a:extLst>
+          </p:cNvPr>
+          <p:cNvPicPr>
+            <a:picLocks noChangeAspect="1"/>
+          </p:cNvPicPr>
+          <p:nvPr/>
+        </p:nvPicPr>
+        <p:blipFill>
+          <a:blip r:embed="rId5"/>
+          <a:stretch>
+            <a:fillRect/>
+          </a:stretch>
+        </p:blipFill>
+        <p:spPr>
+          <a:xfrm>
+            <a:off x="1626424" y="4590255"/>
+            <a:ext cx="3733800" cy="723900"/>
+          </a:xfrm>
+          <a:prstGeom prst="rect">
+            <a:avLst/>
+          </a:prstGeom>
+        </p:spPr>
+      </p:pic>
+      <p:pic>
+        <p:nvPicPr>
+          <p:cNvPr id="16" name="Picture 15">
+            <a:extLst>
+              <a:ext uri="{FF2B5EF4-FFF2-40B4-BE49-F238E27FC236}">
+                <a16:creationId xmlns:a16="http://schemas.microsoft.com/office/drawing/2014/main" id="{00B49031-FA7A-4C43-8F19-FF57CFA2EA49}"/>
+              </a:ext>
+            </a:extLst>
+          </p:cNvPr>
+          <p:cNvPicPr>
+            <a:picLocks noChangeAspect="1"/>
+          </p:cNvPicPr>
+          <p:nvPr/>
+        </p:nvPicPr>
+        <p:blipFill>
+          <a:blip r:embed="rId6"/>
+          <a:stretch>
+            <a:fillRect/>
+          </a:stretch>
+        </p:blipFill>
+        <p:spPr>
+          <a:xfrm>
+            <a:off x="5778799" y="1269999"/>
+            <a:ext cx="5750945" cy="5086351"/>
+          </a:xfrm>
+          <a:prstGeom prst="rect">
+            <a:avLst/>
+          </a:prstGeom>
+        </p:spPr>
+      </p:pic>
+      <p:sp>
+        <p:nvSpPr>
+          <p:cNvPr id="17" name="TextBox 16">
+            <a:extLst>
+              <a:ext uri="{FF2B5EF4-FFF2-40B4-BE49-F238E27FC236}">
+                <a16:creationId xmlns:a16="http://schemas.microsoft.com/office/drawing/2014/main" id="{7ADC9AE8-9691-3E41-93C3-772A6ED6AB58}"/>
+              </a:ext>
+            </a:extLst>
+          </p:cNvPr>
+          <p:cNvSpPr txBox="1"/>
+          <p:nvPr/>
+        </p:nvSpPr>
+        <p:spPr>
+          <a:xfrm>
+            <a:off x="823912" y="1839446"/>
+            <a:ext cx="4643437" cy="1754326"/>
+          </a:xfrm>
+          <a:prstGeom prst="rect">
+            <a:avLst/>
+          </a:prstGeom>
+          <a:noFill/>
+        </p:spPr>
+        <p:txBody>
+          <a:bodyPr wrap="square" rtlCol="0">
+            <a:spAutoFit/>
+          </a:bodyPr>
+          <a:lstStyle/>
+          <a:p>
+            <a:pPr marL="285750" indent="-285750">
+              <a:buFont typeface="Arial" panose="020B0604020202020204" pitchFamily="34" charset="0"/>
+              <a:buChar char="•"/>
+            </a:pPr>
+            <a:r>
+              <a:rPr lang="en-US" dirty="0"/>
+              <a:t>The amount of energy given to the electronic system. </a:t>
+            </a:r>
+          </a:p>
+          <a:p>
+            <a:pPr marL="285750" indent="-285750">
+              <a:buFont typeface="Arial" panose="020B0604020202020204" pitchFamily="34" charset="0"/>
+              <a:buChar char="•"/>
+            </a:pPr>
+            <a:endParaRPr lang="en-US" dirty="0"/>
+          </a:p>
+          <a:p>
+            <a:pPr marL="285750" indent="-285750">
+              <a:buFont typeface="Arial" panose="020B0604020202020204" pitchFamily="34" charset="0"/>
+              <a:buChar char="•"/>
+            </a:pPr>
+            <a:r>
+              <a:rPr lang="en-US" dirty="0"/>
+              <a:t>A measurement has been made for silicon and germanium. </a:t>
+            </a:r>
+          </a:p>
+          <a:p>
+            <a:pPr marL="285750" indent="-285750">
+              <a:buFont typeface="Arial" panose="020B0604020202020204" pitchFamily="34" charset="0"/>
+              <a:buChar char="•"/>
+            </a:pPr>
+            <a:endParaRPr lang="en-US" dirty="0"/>
+          </a:p>
+        </p:txBody>
+      </p:sp>
+    </p:spTree>
+    <p:extLst>
+      <p:ext uri="{BB962C8B-B14F-4D97-AF65-F5344CB8AC3E}">
+        <p14:creationId xmlns:p14="http://schemas.microsoft.com/office/powerpoint/2010/main" val="1206624913"/>
+      </p:ext>
+    </p:extLst>
+  </p:cSld>
+  <p:clrMapOvr>
+    <a:masterClrMapping/>
+  </p:clrMapOvr>
+</p:sld>
+</file>
+
+<file path=ppt/slides/slide17.xml><?xml version="1.0" encoding="utf-8"?>
+<p:sld xmlns:a="http://schemas.openxmlformats.org/drawingml/2006/main" xmlns:r="http://schemas.openxmlformats.org/officeDocument/2006/relationships" xmlns:p="http://schemas.openxmlformats.org/presentationml/2006/main">
+  <p:cSld>
+    <p:spTree>
+      <p:nvGrpSpPr>
+        <p:cNvPr id="1" name=""/>
+        <p:cNvGrpSpPr/>
+        <p:nvPr/>
+      </p:nvGrpSpPr>
+      <p:grpSpPr>
+        <a:xfrm>
+          <a:off x="0" y="0"/>
+          <a:ext cx="0" cy="0"/>
+          <a:chOff x="0" y="0"/>
+          <a:chExt cx="0" cy="0"/>
+        </a:xfrm>
+      </p:grpSpPr>
+      <p:sp>
+        <p:nvSpPr>
+          <p:cNvPr id="2" name="Title 1">
+            <a:extLst>
+              <a:ext uri="{FF2B5EF4-FFF2-40B4-BE49-F238E27FC236}">
+                <a16:creationId xmlns:a16="http://schemas.microsoft.com/office/drawing/2014/main" id="{4BA1EC71-1526-1D41-9B10-4113EAB50476}"/>
+              </a:ext>
+            </a:extLst>
+          </p:cNvPr>
+          <p:cNvSpPr>
+            <a:spLocks noGrp="1"/>
+          </p:cNvSpPr>
+          <p:nvPr>
+            <p:ph type="title"/>
+          </p:nvPr>
+        </p:nvSpPr>
+        <p:spPr/>
+        <p:txBody>
+          <a:bodyPr/>
+          <a:lstStyle/>
+          <a:p>
+            <a:r>
+              <a:rPr lang="en-US" dirty="0" err="1"/>
+              <a:t>Whats</a:t>
+            </a:r>
+            <a:r>
+              <a:rPr lang="en-US" dirty="0"/>
+              <a:t> Wrong with </a:t>
+            </a:r>
+            <a:r>
+              <a:rPr lang="en-US" dirty="0" err="1"/>
+              <a:t>Lindhard</a:t>
+            </a:r>
+            <a:r>
+              <a:rPr lang="en-US" dirty="0"/>
+              <a:t>? </a:t>
+            </a:r>
+          </a:p>
+        </p:txBody>
+      </p:sp>
+      <p:sp>
+        <p:nvSpPr>
+          <p:cNvPr id="3" name="Content Placeholder 2">
+            <a:extLst>
+              <a:ext uri="{FF2B5EF4-FFF2-40B4-BE49-F238E27FC236}">
+                <a16:creationId xmlns:a16="http://schemas.microsoft.com/office/drawing/2014/main" id="{B221E5EF-0AD7-8649-BC68-5BD446E44A80}"/>
+              </a:ext>
+            </a:extLst>
+          </p:cNvPr>
+          <p:cNvSpPr>
+            <a:spLocks noGrp="1"/>
+          </p:cNvSpPr>
+          <p:nvPr>
+            <p:ph idx="1"/>
+          </p:nvPr>
+        </p:nvSpPr>
+        <p:spPr>
+          <a:xfrm>
+            <a:off x="838200" y="1575594"/>
+            <a:ext cx="10048875" cy="5282406"/>
+          </a:xfrm>
+        </p:spPr>
+        <p:txBody>
+          <a:bodyPr>
+            <a:noAutofit/>
+          </a:bodyPr>
+          <a:lstStyle/>
+          <a:p>
+            <a:r>
+              <a:rPr lang="en-US" sz="1800" dirty="0" err="1"/>
+              <a:t>Lindhard</a:t>
+            </a:r>
+            <a:r>
+              <a:rPr lang="en-US" sz="1800" dirty="0"/>
+              <a:t> makes a few assumptions in his model:</a:t>
+            </a:r>
+          </a:p>
+          <a:p>
+            <a:pPr lvl="1"/>
+            <a:r>
+              <a:rPr lang="en-US" sz="1800" dirty="0"/>
+              <a:t>Ionized electrons do not produce recoil atoms of appreciable energy</a:t>
+            </a:r>
+          </a:p>
+          <a:p>
+            <a:pPr lvl="1"/>
+            <a:r>
+              <a:rPr lang="en-US" sz="1800" dirty="0"/>
+              <a:t>The energy given to the atomic binding energy is negligible.</a:t>
+            </a:r>
+          </a:p>
+          <a:p>
+            <a:pPr marL="457200" lvl="1" indent="0">
+              <a:buNone/>
+            </a:pPr>
+            <a:endParaRPr lang="en-US" sz="1800" dirty="0"/>
+          </a:p>
+          <a:p>
+            <a:r>
+              <a:rPr lang="en-US" sz="1800" dirty="0"/>
+              <a:t>Variation in the number of electron hole pairs produced is not accounted for. (</a:t>
+            </a:r>
+            <a:r>
+              <a:rPr lang="en-US" sz="1800" b="1" dirty="0"/>
+              <a:t>What I will focus on) </a:t>
+            </a:r>
+            <a:endParaRPr lang="en-US" sz="1800" dirty="0"/>
+          </a:p>
+          <a:p>
+            <a:pPr lvl="1"/>
+            <a:r>
+              <a:rPr lang="en-US" sz="1800" dirty="0"/>
+              <a:t>Could be a constant term, but is more than likely energy dependent. </a:t>
+            </a:r>
+          </a:p>
+          <a:p>
+            <a:pPr marL="0" indent="0">
+              <a:buNone/>
+            </a:pPr>
+            <a:endParaRPr lang="en-US" sz="1800" dirty="0"/>
+          </a:p>
+          <a:p>
+            <a:r>
+              <a:rPr lang="en-US" sz="1800" dirty="0"/>
+              <a:t>Charge trapping (</a:t>
+            </a:r>
+            <a:r>
+              <a:rPr lang="en-US" sz="1800" b="1" dirty="0"/>
+              <a:t>Looking into, really cool E/m problem) </a:t>
+            </a:r>
+            <a:endParaRPr lang="en-US" sz="1800" dirty="0"/>
+          </a:p>
+          <a:p>
+            <a:pPr lvl="1"/>
+            <a:r>
+              <a:rPr lang="en-US" sz="1800" dirty="0"/>
+              <a:t>Low energy nuclear recoils may create a “Cloud” of charge. This effectively cancels out the applied voltage and doesn’t allow the freed charge to traverse the detector and be collected. (</a:t>
+            </a:r>
+            <a:r>
+              <a:rPr lang="en-US" sz="1800" dirty="0" err="1"/>
+              <a:t>i.e</a:t>
+            </a:r>
+            <a:r>
+              <a:rPr lang="en-US" sz="1800" dirty="0"/>
+              <a:t> e-h pairs recombine) </a:t>
+            </a:r>
+          </a:p>
+          <a:p>
+            <a:pPr marL="0" indent="0">
+              <a:buNone/>
+            </a:pPr>
+            <a:endParaRPr lang="en-US" sz="1800" dirty="0"/>
+          </a:p>
+          <a:p>
+            <a:r>
+              <a:rPr lang="en-US" sz="1800" dirty="0"/>
+              <a:t>Effects due to multiple scattering not accounted for. (</a:t>
+            </a:r>
+            <a:r>
+              <a:rPr lang="en-US" sz="1800" b="1" dirty="0"/>
+              <a:t>Beginning to look into) </a:t>
+            </a:r>
+            <a:endParaRPr lang="en-US" sz="1800" dirty="0"/>
+          </a:p>
+          <a:p>
+            <a:pPr lvl="1"/>
+            <a:r>
+              <a:rPr lang="en-US" sz="1800" dirty="0"/>
+              <a:t>WIMP scattering </a:t>
+            </a:r>
+          </a:p>
+          <a:p>
+            <a:pPr lvl="1"/>
+            <a:r>
+              <a:rPr lang="en-US" sz="1800" dirty="0"/>
+              <a:t>Phonon Scattering </a:t>
+            </a:r>
+          </a:p>
+          <a:p>
+            <a:pPr marL="457200" lvl="1" indent="0">
+              <a:buNone/>
+            </a:pPr>
+            <a:endParaRPr lang="en-US" dirty="0"/>
+          </a:p>
+          <a:p>
+            <a:pPr marL="0" indent="0">
+              <a:buNone/>
+            </a:pPr>
+            <a:r>
+              <a:rPr lang="en-US" dirty="0"/>
+              <a:t>	</a:t>
+            </a:r>
+          </a:p>
+        </p:txBody>
+      </p:sp>
+      <p:sp>
+        <p:nvSpPr>
+          <p:cNvPr id="4" name="Slide Number Placeholder 3">
+            <a:extLst>
+              <a:ext uri="{FF2B5EF4-FFF2-40B4-BE49-F238E27FC236}">
+                <a16:creationId xmlns:a16="http://schemas.microsoft.com/office/drawing/2014/main" id="{FB6CF580-6FF5-AE44-A004-818D98404C6B}"/>
+              </a:ext>
+            </a:extLst>
+          </p:cNvPr>
+          <p:cNvSpPr>
+            <a:spLocks noGrp="1"/>
+          </p:cNvSpPr>
+          <p:nvPr>
+            <p:ph type="sldNum" sz="quarter" idx="12"/>
+          </p:nvPr>
+        </p:nvSpPr>
+        <p:spPr/>
+        <p:txBody>
+          <a:bodyPr/>
+          <a:lstStyle/>
+          <a:p>
+            <a:fld id="{035DBD62-E6E0-484E-AB64-E286A6B85B65}" type="slidenum">
+              <a:rPr lang="en-US" smtClean="0"/>
+              <a:t>17</a:t>
+            </a:fld>
+            <a:endParaRPr lang="en-US"/>
+          </a:p>
+        </p:txBody>
+      </p:sp>
+    </p:spTree>
+    <p:extLst>
+      <p:ext uri="{BB962C8B-B14F-4D97-AF65-F5344CB8AC3E}">
+        <p14:creationId xmlns:p14="http://schemas.microsoft.com/office/powerpoint/2010/main" val="3262484198"/>
+      </p:ext>
+    </p:extLst>
+  </p:cSld>
+  <p:clrMapOvr>
+    <a:masterClrMapping/>
+  </p:clrMapOvr>
+</p:sld>
+</file>
+
+<file path=ppt/slides/slide18.xml><?xml version="1.0" encoding="utf-8"?>
+<p:sld xmlns:a="http://schemas.openxmlformats.org/drawingml/2006/main" xmlns:r="http://schemas.openxmlformats.org/officeDocument/2006/relationships" xmlns:p="http://schemas.openxmlformats.org/presentationml/2006/main">
+  <p:cSld>
+    <p:spTree>
+      <p:nvGrpSpPr>
+        <p:cNvPr id="1" name=""/>
+        <p:cNvGrpSpPr/>
+        <p:nvPr/>
+      </p:nvGrpSpPr>
+      <p:grpSpPr>
+        <a:xfrm>
+          <a:off x="0" y="0"/>
+          <a:ext cx="0" cy="0"/>
+          <a:chOff x="0" y="0"/>
+          <a:chExt cx="0" cy="0"/>
+        </a:xfrm>
+      </p:grpSpPr>
+      <p:sp>
+        <p:nvSpPr>
+          <p:cNvPr id="2" name="Title 1">
+            <a:extLst>
+              <a:ext uri="{FF2B5EF4-FFF2-40B4-BE49-F238E27FC236}">
+                <a16:creationId xmlns:a16="http://schemas.microsoft.com/office/drawing/2014/main" id="{1EFC502A-31F1-FD4A-AB69-84FCC8EDD48A}"/>
+              </a:ext>
+            </a:extLst>
+          </p:cNvPr>
+          <p:cNvSpPr>
+            <a:spLocks noGrp="1"/>
+          </p:cNvSpPr>
+          <p:nvPr>
+            <p:ph type="title"/>
+          </p:nvPr>
+        </p:nvSpPr>
+        <p:spPr/>
+        <p:txBody>
+          <a:bodyPr/>
+          <a:lstStyle/>
+          <a:p>
+            <a:r>
+              <a:rPr lang="en-US" dirty="0"/>
+              <a:t>Atomic Binding Energy Correction </a:t>
+            </a:r>
+          </a:p>
+        </p:txBody>
+      </p:sp>
+      <p:sp>
+        <p:nvSpPr>
+          <p:cNvPr id="4" name="Slide Number Placeholder 3">
+            <a:extLst>
+              <a:ext uri="{FF2B5EF4-FFF2-40B4-BE49-F238E27FC236}">
+                <a16:creationId xmlns:a16="http://schemas.microsoft.com/office/drawing/2014/main" id="{1DE06ED9-955E-5D4C-8DD2-6BE4F7B650AE}"/>
+              </a:ext>
+            </a:extLst>
+          </p:cNvPr>
+          <p:cNvSpPr>
+            <a:spLocks noGrp="1"/>
+          </p:cNvSpPr>
+          <p:nvPr>
+            <p:ph type="sldNum" sz="quarter" idx="12"/>
+          </p:nvPr>
+        </p:nvSpPr>
+        <p:spPr/>
+        <p:txBody>
+          <a:bodyPr/>
+          <a:lstStyle/>
+          <a:p>
+            <a:fld id="{035DBD62-E6E0-484E-AB64-E286A6B85B65}" type="slidenum">
+              <a:rPr lang="en-US" smtClean="0"/>
+              <a:t>18</a:t>
+            </a:fld>
+            <a:endParaRPr lang="en-US"/>
+          </a:p>
+        </p:txBody>
+      </p:sp>
+      <p:pic>
+        <p:nvPicPr>
+          <p:cNvPr id="6" name="Picture 5">
+            <a:extLst>
+              <a:ext uri="{FF2B5EF4-FFF2-40B4-BE49-F238E27FC236}">
+                <a16:creationId xmlns:a16="http://schemas.microsoft.com/office/drawing/2014/main" id="{9ACDC115-FB7E-354E-B0A2-B2DD4FF266C1}"/>
+              </a:ext>
+            </a:extLst>
+          </p:cNvPr>
+          <p:cNvPicPr>
+            <a:picLocks noChangeAspect="1"/>
+          </p:cNvPicPr>
+          <p:nvPr/>
+        </p:nvPicPr>
+        <p:blipFill>
+          <a:blip r:embed="rId3"/>
+          <a:stretch>
+            <a:fillRect/>
+          </a:stretch>
+        </p:blipFill>
+        <p:spPr>
+          <a:xfrm>
+            <a:off x="2795826" y="1609329"/>
+            <a:ext cx="6600347" cy="4828381"/>
+          </a:xfrm>
+          <a:prstGeom prst="rect">
+            <a:avLst/>
+          </a:prstGeom>
+        </p:spPr>
+      </p:pic>
+    </p:spTree>
+    <p:extLst>
+      <p:ext uri="{BB962C8B-B14F-4D97-AF65-F5344CB8AC3E}">
+        <p14:creationId xmlns:p14="http://schemas.microsoft.com/office/powerpoint/2010/main" val="1940338238"/>
+      </p:ext>
+    </p:extLst>
+  </p:cSld>
+  <p:clrMapOvr>
+    <a:masterClrMapping/>
+  </p:clrMapOvr>
+</p:sld>
+</file>
+
+<file path=ppt/slides/slide19.xml><?xml version="1.0" encoding="utf-8"?>
+<p:sld xmlns:a="http://schemas.openxmlformats.org/drawingml/2006/main" xmlns:r="http://schemas.openxmlformats.org/officeDocument/2006/relationships" xmlns:p="http://schemas.openxmlformats.org/presentationml/2006/main">
+  <p:cSld>
+    <p:spTree>
+      <p:nvGrpSpPr>
+        <p:cNvPr id="1" name=""/>
+        <p:cNvGrpSpPr/>
+        <p:nvPr/>
+      </p:nvGrpSpPr>
+      <p:grpSpPr>
+        <a:xfrm>
+          <a:off x="0" y="0"/>
+          <a:ext cx="0" cy="0"/>
+          <a:chOff x="0" y="0"/>
+          <a:chExt cx="0" cy="0"/>
+        </a:xfrm>
+      </p:grpSpPr>
+      <p:sp>
+        <p:nvSpPr>
+          <p:cNvPr id="2" name="Title 1">
+            <a:extLst>
+              <a:ext uri="{FF2B5EF4-FFF2-40B4-BE49-F238E27FC236}">
+                <a16:creationId xmlns:a16="http://schemas.microsoft.com/office/drawing/2014/main" id="{F8F764C4-8425-8A4E-B16B-CBFCB9B10F20}"/>
+              </a:ext>
+            </a:extLst>
+          </p:cNvPr>
+          <p:cNvSpPr>
+            <a:spLocks noGrp="1"/>
+          </p:cNvSpPr>
+          <p:nvPr>
+            <p:ph type="title"/>
+          </p:nvPr>
+        </p:nvSpPr>
+        <p:spPr/>
+        <p:txBody>
+          <a:bodyPr/>
+          <a:lstStyle/>
+          <a:p>
+            <a:r>
+              <a:rPr lang="en-US" dirty="0"/>
+              <a:t>Fano Factor </a:t>
+            </a:r>
+          </a:p>
+        </p:txBody>
+      </p:sp>
+      <p:sp>
+        <p:nvSpPr>
+          <p:cNvPr id="3" name="Content Placeholder 2">
+            <a:extLst>
+              <a:ext uri="{FF2B5EF4-FFF2-40B4-BE49-F238E27FC236}">
+                <a16:creationId xmlns:a16="http://schemas.microsoft.com/office/drawing/2014/main" id="{D4A9C9FC-EA4F-174F-8FD7-860D99EFFCC6}"/>
+              </a:ext>
+            </a:extLst>
+          </p:cNvPr>
+          <p:cNvSpPr>
+            <a:spLocks noGrp="1"/>
+          </p:cNvSpPr>
+          <p:nvPr>
+            <p:ph idx="1"/>
+          </p:nvPr>
+        </p:nvSpPr>
+        <p:spPr/>
+        <p:txBody>
+          <a:bodyPr>
+            <a:normAutofit/>
+          </a:bodyPr>
+          <a:lstStyle/>
+          <a:p>
+            <a:r>
+              <a:rPr lang="en-US" sz="1800" dirty="0"/>
+              <a:t>Variation in the number of electron-hold pairs produced given a single recoil energy. </a:t>
+            </a:r>
+          </a:p>
+          <a:p>
+            <a:pPr lvl="1"/>
+            <a:r>
+              <a:rPr lang="en-US" sz="1800" dirty="0"/>
+              <a:t>This is well understood for electron recoils. </a:t>
+            </a:r>
+          </a:p>
+          <a:p>
+            <a:pPr lvl="2"/>
+            <a:r>
+              <a:rPr lang="en-US" sz="1800" dirty="0"/>
+              <a:t>F(silicon) = 0.13 , F(germanium) = 0.12</a:t>
+            </a:r>
+          </a:p>
+          <a:p>
+            <a:pPr marL="457200" lvl="1" indent="0">
+              <a:buNone/>
+            </a:pPr>
+            <a:endParaRPr lang="en-US" sz="1800" dirty="0"/>
+          </a:p>
+          <a:p>
+            <a:r>
+              <a:rPr lang="en-US" sz="1800" dirty="0"/>
+              <a:t>This is not understood for nuclear recoils. </a:t>
+            </a:r>
+          </a:p>
+          <a:p>
+            <a:endParaRPr lang="en-US" sz="1800" dirty="0"/>
+          </a:p>
+          <a:p>
+            <a:r>
+              <a:rPr lang="en-US" sz="1800" dirty="0" err="1"/>
+              <a:t>Lindhard</a:t>
+            </a:r>
+            <a:r>
+              <a:rPr lang="en-US" sz="1800" dirty="0"/>
+              <a:t> does make a prediction for this quantity, but has very little effect for recoil energies above 10keV and therefore has been neglected. </a:t>
+            </a:r>
+          </a:p>
+        </p:txBody>
+      </p:sp>
+      <p:sp>
+        <p:nvSpPr>
+          <p:cNvPr id="4" name="Slide Number Placeholder 3">
+            <a:extLst>
+              <a:ext uri="{FF2B5EF4-FFF2-40B4-BE49-F238E27FC236}">
+                <a16:creationId xmlns:a16="http://schemas.microsoft.com/office/drawing/2014/main" id="{2DF355FA-1BE5-5943-99D7-44C75C98F139}"/>
+              </a:ext>
+            </a:extLst>
+          </p:cNvPr>
+          <p:cNvSpPr>
+            <a:spLocks noGrp="1"/>
+          </p:cNvSpPr>
+          <p:nvPr>
+            <p:ph type="sldNum" sz="quarter" idx="12"/>
+          </p:nvPr>
+        </p:nvSpPr>
+        <p:spPr/>
+        <p:txBody>
+          <a:bodyPr/>
+          <a:lstStyle/>
+          <a:p>
+            <a:fld id="{035DBD62-E6E0-484E-AB64-E286A6B85B65}" type="slidenum">
+              <a:rPr lang="en-US" smtClean="0"/>
+              <a:t>19</a:t>
+            </a:fld>
+            <a:endParaRPr lang="en-US"/>
+          </a:p>
+        </p:txBody>
+      </p:sp>
+    </p:spTree>
+    <p:extLst>
+      <p:ext uri="{BB962C8B-B14F-4D97-AF65-F5344CB8AC3E}">
+        <p14:creationId xmlns:p14="http://schemas.microsoft.com/office/powerpoint/2010/main" val="2584047169"/>
       </p:ext>
     </p:extLst>
   </p:cSld>
@@ -5485,6 +7339,675 @@
           <p:cNvPr id="2" name="Title 1">
             <a:extLst>
               <a:ext uri="{FF2B5EF4-FFF2-40B4-BE49-F238E27FC236}">
+                <a16:creationId xmlns:a16="http://schemas.microsoft.com/office/drawing/2014/main" id="{2E5B07F6-65A4-7E4F-A38A-B969043EC936}"/>
+              </a:ext>
+            </a:extLst>
+          </p:cNvPr>
+          <p:cNvSpPr>
+            <a:spLocks noGrp="1"/>
+          </p:cNvSpPr>
+          <p:nvPr>
+            <p:ph type="title"/>
+          </p:nvPr>
+        </p:nvSpPr>
+        <p:spPr/>
+        <p:txBody>
+          <a:bodyPr/>
+          <a:lstStyle/>
+          <a:p>
+            <a:r>
+              <a:rPr lang="en-US" dirty="0"/>
+              <a:t>Prior Work: Superconducting Electronics Lab</a:t>
+            </a:r>
+          </a:p>
+        </p:txBody>
+      </p:sp>
+      <p:sp>
+        <p:nvSpPr>
+          <p:cNvPr id="3" name="Content Placeholder 2">
+            <a:extLst>
+              <a:ext uri="{FF2B5EF4-FFF2-40B4-BE49-F238E27FC236}">
+                <a16:creationId xmlns:a16="http://schemas.microsoft.com/office/drawing/2014/main" id="{17CAD064-1CBF-B640-A430-3BFE75C65D1A}"/>
+              </a:ext>
+            </a:extLst>
+          </p:cNvPr>
+          <p:cNvSpPr>
+            <a:spLocks noGrp="1"/>
+          </p:cNvSpPr>
+          <p:nvPr>
+            <p:ph idx="1"/>
+          </p:nvPr>
+        </p:nvSpPr>
+        <p:spPr/>
+        <p:txBody>
+          <a:bodyPr>
+            <a:normAutofit/>
+          </a:bodyPr>
+          <a:lstStyle/>
+          <a:p>
+            <a:r>
+              <a:rPr lang="en-US" sz="1800" dirty="0"/>
+              <a:t>Nano-SQUID (Undergrad) </a:t>
+            </a:r>
+          </a:p>
+          <a:p>
+            <a:pPr lvl="1"/>
+            <a:r>
+              <a:rPr lang="en-US" sz="1800" dirty="0"/>
+              <a:t>Systems integration </a:t>
+            </a:r>
+          </a:p>
+          <a:p>
+            <a:pPr lvl="1"/>
+            <a:r>
+              <a:rPr lang="en-US" sz="1800" dirty="0"/>
+              <a:t>Probe design via fusion 360 / CAD</a:t>
+            </a:r>
+          </a:p>
+          <a:p>
+            <a:pPr marL="0" indent="0">
+              <a:buNone/>
+            </a:pPr>
+            <a:endParaRPr lang="en-US" sz="1800" dirty="0"/>
+          </a:p>
+          <a:p>
+            <a:r>
+              <a:rPr lang="en-US" sz="1800" dirty="0"/>
+              <a:t>Cryogenic Dark Matter Survey (CDMS) </a:t>
+            </a:r>
+          </a:p>
+          <a:p>
+            <a:pPr lvl="1"/>
+            <a:r>
+              <a:rPr lang="en-US" sz="1800" dirty="0"/>
+              <a:t>Lab Management </a:t>
+            </a:r>
+          </a:p>
+          <a:p>
+            <a:pPr lvl="1"/>
+            <a:r>
+              <a:rPr lang="en-US" sz="1800" dirty="0"/>
+              <a:t>Testing and characterization of superconducting quantum interference devices. </a:t>
+            </a:r>
+          </a:p>
+          <a:p>
+            <a:pPr lvl="1"/>
+            <a:r>
+              <a:rPr lang="en-US" sz="1800" dirty="0"/>
+              <a:t>Data acquisition system (DAQ) analysis / troubleshooting </a:t>
+            </a:r>
+          </a:p>
+          <a:p>
+            <a:pPr lvl="2"/>
+            <a:r>
+              <a:rPr lang="en-US" sz="1800" dirty="0"/>
+              <a:t>Magnetic field sensitivity measurements. </a:t>
+            </a:r>
+          </a:p>
+          <a:p>
+            <a:pPr marL="457200" lvl="1" indent="0">
+              <a:buNone/>
+            </a:pPr>
+            <a:endParaRPr lang="en-US" dirty="0"/>
+          </a:p>
+          <a:p>
+            <a:pPr lvl="1"/>
+            <a:endParaRPr lang="en-US" dirty="0"/>
+          </a:p>
+          <a:p>
+            <a:pPr lvl="1"/>
+            <a:endParaRPr lang="en-US" dirty="0"/>
+          </a:p>
+        </p:txBody>
+      </p:sp>
+      <p:sp>
+        <p:nvSpPr>
+          <p:cNvPr id="4" name="Slide Number Placeholder 3">
+            <a:extLst>
+              <a:ext uri="{FF2B5EF4-FFF2-40B4-BE49-F238E27FC236}">
+                <a16:creationId xmlns:a16="http://schemas.microsoft.com/office/drawing/2014/main" id="{5C467EA8-A744-134C-BFA7-916450729851}"/>
+              </a:ext>
+            </a:extLst>
+          </p:cNvPr>
+          <p:cNvSpPr>
+            <a:spLocks noGrp="1"/>
+          </p:cNvSpPr>
+          <p:nvPr>
+            <p:ph type="sldNum" sz="quarter" idx="12"/>
+          </p:nvPr>
+        </p:nvSpPr>
+        <p:spPr/>
+        <p:txBody>
+          <a:bodyPr/>
+          <a:lstStyle/>
+          <a:p>
+            <a:fld id="{035DBD62-E6E0-484E-AB64-E286A6B85B65}" type="slidenum">
+              <a:rPr lang="en-US" smtClean="0"/>
+              <a:t>2</a:t>
+            </a:fld>
+            <a:endParaRPr lang="en-US"/>
+          </a:p>
+        </p:txBody>
+      </p:sp>
+    </p:spTree>
+    <p:extLst>
+      <p:ext uri="{BB962C8B-B14F-4D97-AF65-F5344CB8AC3E}">
+        <p14:creationId xmlns:p14="http://schemas.microsoft.com/office/powerpoint/2010/main" val="2316287058"/>
+      </p:ext>
+    </p:extLst>
+  </p:cSld>
+  <p:clrMapOvr>
+    <a:masterClrMapping/>
+  </p:clrMapOvr>
+</p:sld>
+</file>
+
+<file path=ppt/slides/slide20.xml><?xml version="1.0" encoding="utf-8"?>
+<p:sld xmlns:a="http://schemas.openxmlformats.org/drawingml/2006/main" xmlns:r="http://schemas.openxmlformats.org/officeDocument/2006/relationships" xmlns:p="http://schemas.openxmlformats.org/presentationml/2006/main">
+  <p:cSld>
+    <p:spTree>
+      <p:nvGrpSpPr>
+        <p:cNvPr id="1" name=""/>
+        <p:cNvGrpSpPr/>
+        <p:nvPr/>
+      </p:nvGrpSpPr>
+      <p:grpSpPr>
+        <a:xfrm>
+          <a:off x="0" y="0"/>
+          <a:ext cx="0" cy="0"/>
+          <a:chOff x="0" y="0"/>
+          <a:chExt cx="0" cy="0"/>
+        </a:xfrm>
+      </p:grpSpPr>
+      <p:sp>
+        <p:nvSpPr>
+          <p:cNvPr id="2" name="Title 1">
+            <a:extLst>
+              <a:ext uri="{FF2B5EF4-FFF2-40B4-BE49-F238E27FC236}">
+                <a16:creationId xmlns:a16="http://schemas.microsoft.com/office/drawing/2014/main" id="{889980C3-62DE-9846-8E4E-6F65870FB831}"/>
+              </a:ext>
+            </a:extLst>
+          </p:cNvPr>
+          <p:cNvSpPr>
+            <a:spLocks noGrp="1"/>
+          </p:cNvSpPr>
+          <p:nvPr>
+            <p:ph type="title"/>
+          </p:nvPr>
+        </p:nvSpPr>
+        <p:spPr/>
+        <p:txBody>
+          <a:bodyPr/>
+          <a:lstStyle/>
+          <a:p>
+            <a:r>
+              <a:rPr lang="en-US" dirty="0" err="1"/>
+              <a:t>Lindhard</a:t>
+            </a:r>
+            <a:r>
+              <a:rPr lang="en-US" dirty="0"/>
+              <a:t> Fano Factor </a:t>
+            </a:r>
+          </a:p>
+        </p:txBody>
+      </p:sp>
+      <p:sp>
+        <p:nvSpPr>
+          <p:cNvPr id="4" name="Slide Number Placeholder 3">
+            <a:extLst>
+              <a:ext uri="{FF2B5EF4-FFF2-40B4-BE49-F238E27FC236}">
+                <a16:creationId xmlns:a16="http://schemas.microsoft.com/office/drawing/2014/main" id="{AB3BD47F-C63E-9644-B7C5-5AD5CCEB0B9C}"/>
+              </a:ext>
+            </a:extLst>
+          </p:cNvPr>
+          <p:cNvSpPr>
+            <a:spLocks noGrp="1"/>
+          </p:cNvSpPr>
+          <p:nvPr>
+            <p:ph type="sldNum" sz="quarter" idx="12"/>
+          </p:nvPr>
+        </p:nvSpPr>
+        <p:spPr/>
+        <p:txBody>
+          <a:bodyPr/>
+          <a:lstStyle/>
+          <a:p>
+            <a:fld id="{035DBD62-E6E0-484E-AB64-E286A6B85B65}" type="slidenum">
+              <a:rPr lang="en-US" smtClean="0"/>
+              <a:t>20</a:t>
+            </a:fld>
+            <a:endParaRPr lang="en-US"/>
+          </a:p>
+        </p:txBody>
+      </p:sp>
+      <p:pic>
+        <p:nvPicPr>
+          <p:cNvPr id="6" name="Picture 5">
+            <a:extLst>
+              <a:ext uri="{FF2B5EF4-FFF2-40B4-BE49-F238E27FC236}">
+                <a16:creationId xmlns:a16="http://schemas.microsoft.com/office/drawing/2014/main" id="{AE5C6118-3B77-E845-9921-B814449B0ECE}"/>
+              </a:ext>
+            </a:extLst>
+          </p:cNvPr>
+          <p:cNvPicPr>
+            <a:picLocks noChangeAspect="1"/>
+          </p:cNvPicPr>
+          <p:nvPr/>
+        </p:nvPicPr>
+        <p:blipFill>
+          <a:blip r:embed="rId2"/>
+          <a:stretch>
+            <a:fillRect/>
+          </a:stretch>
+        </p:blipFill>
+        <p:spPr>
+          <a:xfrm>
+            <a:off x="2064967" y="1276350"/>
+            <a:ext cx="8062065" cy="5080000"/>
+          </a:xfrm>
+          <a:prstGeom prst="rect">
+            <a:avLst/>
+          </a:prstGeom>
+        </p:spPr>
+      </p:pic>
+    </p:spTree>
+    <p:extLst>
+      <p:ext uri="{BB962C8B-B14F-4D97-AF65-F5344CB8AC3E}">
+        <p14:creationId xmlns:p14="http://schemas.microsoft.com/office/powerpoint/2010/main" val="3808786968"/>
+      </p:ext>
+    </p:extLst>
+  </p:cSld>
+  <p:clrMapOvr>
+    <a:masterClrMapping/>
+  </p:clrMapOvr>
+</p:sld>
+</file>
+
+<file path=ppt/slides/slide21.xml><?xml version="1.0" encoding="utf-8"?>
+<p:sld xmlns:a="http://schemas.openxmlformats.org/drawingml/2006/main" xmlns:r="http://schemas.openxmlformats.org/officeDocument/2006/relationships" xmlns:p="http://schemas.openxmlformats.org/presentationml/2006/main">
+  <p:cSld>
+    <p:spTree>
+      <p:nvGrpSpPr>
+        <p:cNvPr id="1" name=""/>
+        <p:cNvGrpSpPr/>
+        <p:nvPr/>
+      </p:nvGrpSpPr>
+      <p:grpSpPr>
+        <a:xfrm>
+          <a:off x="0" y="0"/>
+          <a:ext cx="0" cy="0"/>
+          <a:chOff x="0" y="0"/>
+          <a:chExt cx="0" cy="0"/>
+        </a:xfrm>
+      </p:grpSpPr>
+      <p:sp>
+        <p:nvSpPr>
+          <p:cNvPr id="2" name="Title 1">
+            <a:extLst>
+              <a:ext uri="{FF2B5EF4-FFF2-40B4-BE49-F238E27FC236}">
+                <a16:creationId xmlns:a16="http://schemas.microsoft.com/office/drawing/2014/main" id="{DFB89DD7-8BBB-CB40-AFC8-9E5F7541CB11}"/>
+              </a:ext>
+            </a:extLst>
+          </p:cNvPr>
+          <p:cNvSpPr>
+            <a:spLocks noGrp="1"/>
+          </p:cNvSpPr>
+          <p:nvPr>
+            <p:ph type="title"/>
+          </p:nvPr>
+        </p:nvSpPr>
+        <p:spPr/>
+        <p:txBody>
+          <a:bodyPr/>
+          <a:lstStyle/>
+          <a:p>
+            <a:r>
+              <a:rPr lang="en-US" dirty="0"/>
+              <a:t>Model Validation (Electron Recoil Band)  </a:t>
+            </a:r>
+          </a:p>
+        </p:txBody>
+      </p:sp>
+      <p:sp>
+        <p:nvSpPr>
+          <p:cNvPr id="3" name="Content Placeholder 2">
+            <a:extLst>
+              <a:ext uri="{FF2B5EF4-FFF2-40B4-BE49-F238E27FC236}">
+                <a16:creationId xmlns:a16="http://schemas.microsoft.com/office/drawing/2014/main" id="{62E353B8-DDA0-E743-8E78-182D56768CC1}"/>
+              </a:ext>
+            </a:extLst>
+          </p:cNvPr>
+          <p:cNvSpPr>
+            <a:spLocks noGrp="1"/>
+          </p:cNvSpPr>
+          <p:nvPr>
+            <p:ph idx="1"/>
+          </p:nvPr>
+        </p:nvSpPr>
+        <p:spPr>
+          <a:xfrm>
+            <a:off x="838200" y="1825625"/>
+            <a:ext cx="10515600" cy="1031875"/>
+          </a:xfrm>
+        </p:spPr>
+        <p:txBody>
+          <a:bodyPr>
+            <a:normAutofit/>
+          </a:bodyPr>
+          <a:lstStyle/>
+          <a:p>
+            <a:r>
+              <a:rPr lang="en-US" sz="1800" dirty="0"/>
+              <a:t>A fitted energy distribution fit exists for calibration data. </a:t>
+            </a:r>
+          </a:p>
+          <a:p>
+            <a:pPr lvl="1"/>
+            <a:r>
+              <a:rPr lang="en-US" sz="1800" dirty="0"/>
+              <a:t>Data is expected to be normally distributed in each energy bin with a slight skew in the higher energy bins. </a:t>
+            </a:r>
+          </a:p>
+        </p:txBody>
+      </p:sp>
+      <p:sp>
+        <p:nvSpPr>
+          <p:cNvPr id="4" name="Slide Number Placeholder 3">
+            <a:extLst>
+              <a:ext uri="{FF2B5EF4-FFF2-40B4-BE49-F238E27FC236}">
+                <a16:creationId xmlns:a16="http://schemas.microsoft.com/office/drawing/2014/main" id="{3E8EB9D6-AECE-8D4B-9119-782D81CD9AEC}"/>
+              </a:ext>
+            </a:extLst>
+          </p:cNvPr>
+          <p:cNvSpPr>
+            <a:spLocks noGrp="1"/>
+          </p:cNvSpPr>
+          <p:nvPr>
+            <p:ph type="sldNum" sz="quarter" idx="12"/>
+          </p:nvPr>
+        </p:nvSpPr>
+        <p:spPr/>
+        <p:txBody>
+          <a:bodyPr/>
+          <a:lstStyle/>
+          <a:p>
+            <a:fld id="{035DBD62-E6E0-484E-AB64-E286A6B85B65}" type="slidenum">
+              <a:rPr lang="en-US" smtClean="0"/>
+              <a:t>21</a:t>
+            </a:fld>
+            <a:endParaRPr lang="en-US"/>
+          </a:p>
+        </p:txBody>
+      </p:sp>
+      <p:pic>
+        <p:nvPicPr>
+          <p:cNvPr id="6" name="Picture 5">
+            <a:extLst>
+              <a:ext uri="{FF2B5EF4-FFF2-40B4-BE49-F238E27FC236}">
+                <a16:creationId xmlns:a16="http://schemas.microsoft.com/office/drawing/2014/main" id="{F766E7F9-E85F-3248-A4E7-EE000CE8EF9B}"/>
+              </a:ext>
+            </a:extLst>
+          </p:cNvPr>
+          <p:cNvPicPr>
+            <a:picLocks noChangeAspect="1"/>
+          </p:cNvPicPr>
+          <p:nvPr/>
+        </p:nvPicPr>
+        <p:blipFill>
+          <a:blip r:embed="rId3"/>
+          <a:stretch>
+            <a:fillRect/>
+          </a:stretch>
+        </p:blipFill>
+        <p:spPr>
+          <a:xfrm>
+            <a:off x="5882311" y="2592387"/>
+            <a:ext cx="5833439" cy="4303813"/>
+          </a:xfrm>
+          <a:prstGeom prst="rect">
+            <a:avLst/>
+          </a:prstGeom>
+        </p:spPr>
+      </p:pic>
+      <p:pic>
+        <p:nvPicPr>
+          <p:cNvPr id="10" name="Picture 9">
+            <a:extLst>
+              <a:ext uri="{FF2B5EF4-FFF2-40B4-BE49-F238E27FC236}">
+                <a16:creationId xmlns:a16="http://schemas.microsoft.com/office/drawing/2014/main" id="{6BBD5595-7D4E-CB4C-BDB2-06DD68F97A4A}"/>
+              </a:ext>
+            </a:extLst>
+          </p:cNvPr>
+          <p:cNvPicPr>
+            <a:picLocks noChangeAspect="1"/>
+          </p:cNvPicPr>
+          <p:nvPr/>
+        </p:nvPicPr>
+        <p:blipFill>
+          <a:blip r:embed="rId4"/>
+          <a:stretch>
+            <a:fillRect/>
+          </a:stretch>
+        </p:blipFill>
+        <p:spPr>
+          <a:xfrm>
+            <a:off x="-35255" y="2720975"/>
+            <a:ext cx="5618152" cy="4000500"/>
+          </a:xfrm>
+          <a:prstGeom prst="rect">
+            <a:avLst/>
+          </a:prstGeom>
+        </p:spPr>
+      </p:pic>
+    </p:spTree>
+    <p:extLst>
+      <p:ext uri="{BB962C8B-B14F-4D97-AF65-F5344CB8AC3E}">
+        <p14:creationId xmlns:p14="http://schemas.microsoft.com/office/powerpoint/2010/main" val="2267119596"/>
+      </p:ext>
+    </p:extLst>
+  </p:cSld>
+  <p:clrMapOvr>
+    <a:masterClrMapping/>
+  </p:clrMapOvr>
+</p:sld>
+</file>
+
+<file path=ppt/slides/slide22.xml><?xml version="1.0" encoding="utf-8"?>
+<p:sld xmlns:a="http://schemas.openxmlformats.org/drawingml/2006/main" xmlns:r="http://schemas.openxmlformats.org/officeDocument/2006/relationships" xmlns:p="http://schemas.openxmlformats.org/presentationml/2006/main">
+  <p:cSld>
+    <p:spTree>
+      <p:nvGrpSpPr>
+        <p:cNvPr id="1" name=""/>
+        <p:cNvGrpSpPr/>
+        <p:nvPr/>
+      </p:nvGrpSpPr>
+      <p:grpSpPr>
+        <a:xfrm>
+          <a:off x="0" y="0"/>
+          <a:ext cx="0" cy="0"/>
+          <a:chOff x="0" y="0"/>
+          <a:chExt cx="0" cy="0"/>
+        </a:xfrm>
+      </p:grpSpPr>
+      <p:sp>
+        <p:nvSpPr>
+          <p:cNvPr id="2" name="Title 1">
+            <a:extLst>
+              <a:ext uri="{FF2B5EF4-FFF2-40B4-BE49-F238E27FC236}">
+                <a16:creationId xmlns:a16="http://schemas.microsoft.com/office/drawing/2014/main" id="{9C82CAA4-E56A-8A43-A8E5-D0F006FE124D}"/>
+              </a:ext>
+            </a:extLst>
+          </p:cNvPr>
+          <p:cNvSpPr>
+            <a:spLocks noGrp="1"/>
+          </p:cNvSpPr>
+          <p:nvPr>
+            <p:ph type="title"/>
+          </p:nvPr>
+        </p:nvSpPr>
+        <p:spPr/>
+        <p:txBody>
+          <a:bodyPr/>
+          <a:lstStyle/>
+          <a:p>
+            <a:r>
+              <a:rPr lang="en-US" dirty="0"/>
+              <a:t>Model Validation (Nuclear Recoil Band) </a:t>
+            </a:r>
+          </a:p>
+        </p:txBody>
+      </p:sp>
+      <p:sp>
+        <p:nvSpPr>
+          <p:cNvPr id="3" name="Content Placeholder 2">
+            <a:extLst>
+              <a:ext uri="{FF2B5EF4-FFF2-40B4-BE49-F238E27FC236}">
+                <a16:creationId xmlns:a16="http://schemas.microsoft.com/office/drawing/2014/main" id="{2D0D12F2-2BBA-DE4D-8A87-DC95236C9EAE}"/>
+              </a:ext>
+            </a:extLst>
+          </p:cNvPr>
+          <p:cNvSpPr>
+            <a:spLocks noGrp="1"/>
+          </p:cNvSpPr>
+          <p:nvPr>
+            <p:ph idx="1"/>
+          </p:nvPr>
+        </p:nvSpPr>
+        <p:spPr>
+          <a:xfrm>
+            <a:off x="838200" y="1825625"/>
+            <a:ext cx="10515600" cy="1603375"/>
+          </a:xfrm>
+        </p:spPr>
+        <p:txBody>
+          <a:bodyPr>
+            <a:normAutofit/>
+          </a:bodyPr>
+          <a:lstStyle/>
+          <a:p>
+            <a:r>
+              <a:rPr lang="en-US" sz="1800" dirty="0"/>
+              <a:t>According to data the nuclear recoil band should be normally distributed through the range of possible recoil energies. </a:t>
+            </a:r>
+          </a:p>
+          <a:p>
+            <a:r>
+              <a:rPr lang="en-US" sz="1800" dirty="0"/>
+              <a:t>This is much harder to show due to the nonlinearity of the </a:t>
+            </a:r>
+            <a:r>
+              <a:rPr lang="en-US" sz="1800" dirty="0" err="1"/>
+              <a:t>fano</a:t>
+            </a:r>
+            <a:r>
+              <a:rPr lang="en-US" sz="1800" dirty="0"/>
+              <a:t> factor. As the initial yield model is not normally distributed. (Cauchy(</a:t>
+            </a:r>
+            <a:r>
+              <a:rPr lang="en-US" sz="1800" dirty="0" err="1"/>
+              <a:t>ish</a:t>
+            </a:r>
+            <a:r>
+              <a:rPr lang="en-US" sz="1800" dirty="0"/>
+              <a:t>)-Distribution)  </a:t>
+            </a:r>
+          </a:p>
+        </p:txBody>
+      </p:sp>
+      <p:sp>
+        <p:nvSpPr>
+          <p:cNvPr id="4" name="Slide Number Placeholder 3">
+            <a:extLst>
+              <a:ext uri="{FF2B5EF4-FFF2-40B4-BE49-F238E27FC236}">
+                <a16:creationId xmlns:a16="http://schemas.microsoft.com/office/drawing/2014/main" id="{0D337697-882B-AC4B-AB79-0A4F0AEC556B}"/>
+              </a:ext>
+            </a:extLst>
+          </p:cNvPr>
+          <p:cNvSpPr>
+            <a:spLocks noGrp="1"/>
+          </p:cNvSpPr>
+          <p:nvPr>
+            <p:ph type="sldNum" sz="quarter" idx="12"/>
+          </p:nvPr>
+        </p:nvSpPr>
+        <p:spPr/>
+        <p:txBody>
+          <a:bodyPr/>
+          <a:lstStyle/>
+          <a:p>
+            <a:fld id="{035DBD62-E6E0-484E-AB64-E286A6B85B65}" type="slidenum">
+              <a:rPr lang="en-US" smtClean="0"/>
+              <a:t>22</a:t>
+            </a:fld>
+            <a:endParaRPr lang="en-US"/>
+          </a:p>
+        </p:txBody>
+      </p:sp>
+      <p:pic>
+        <p:nvPicPr>
+          <p:cNvPr id="6" name="Picture 5">
+            <a:extLst>
+              <a:ext uri="{FF2B5EF4-FFF2-40B4-BE49-F238E27FC236}">
+                <a16:creationId xmlns:a16="http://schemas.microsoft.com/office/drawing/2014/main" id="{240CD69D-4AF8-234C-9840-06CB47D4D1B6}"/>
+              </a:ext>
+            </a:extLst>
+          </p:cNvPr>
+          <p:cNvPicPr>
+            <a:picLocks noChangeAspect="1"/>
+          </p:cNvPicPr>
+          <p:nvPr/>
+        </p:nvPicPr>
+        <p:blipFill>
+          <a:blip r:embed="rId2"/>
+          <a:stretch>
+            <a:fillRect/>
+          </a:stretch>
+        </p:blipFill>
+        <p:spPr>
+          <a:xfrm>
+            <a:off x="2077152" y="3819525"/>
+            <a:ext cx="7489123" cy="1917700"/>
+          </a:xfrm>
+          <a:prstGeom prst="rect">
+            <a:avLst/>
+          </a:prstGeom>
+        </p:spPr>
+      </p:pic>
+    </p:spTree>
+    <p:extLst>
+      <p:ext uri="{BB962C8B-B14F-4D97-AF65-F5344CB8AC3E}">
+        <p14:creationId xmlns:p14="http://schemas.microsoft.com/office/powerpoint/2010/main" val="2923852302"/>
+      </p:ext>
+    </p:extLst>
+  </p:cSld>
+  <p:clrMapOvr>
+    <a:masterClrMapping/>
+  </p:clrMapOvr>
+</p:sld>
+</file>
+
+<file path=ppt/slides/slide3.xml><?xml version="1.0" encoding="utf-8"?>
+<p:sld xmlns:a="http://schemas.openxmlformats.org/drawingml/2006/main" xmlns:r="http://schemas.openxmlformats.org/officeDocument/2006/relationships" xmlns:p="http://schemas.openxmlformats.org/presentationml/2006/main">
+  <p:cSld>
+    <p:spTree>
+      <p:nvGrpSpPr>
+        <p:cNvPr id="1" name=""/>
+        <p:cNvGrpSpPr/>
+        <p:nvPr/>
+      </p:nvGrpSpPr>
+      <p:grpSpPr>
+        <a:xfrm>
+          <a:off x="0" y="0"/>
+          <a:ext cx="0" cy="0"/>
+          <a:chOff x="0" y="0"/>
+          <a:chExt cx="0" cy="0"/>
+        </a:xfrm>
+      </p:grpSpPr>
+      <p:sp>
+        <p:nvSpPr>
+          <p:cNvPr id="2" name="Title 1">
+            <a:extLst>
+              <a:ext uri="{FF2B5EF4-FFF2-40B4-BE49-F238E27FC236}">
                 <a16:creationId xmlns:a16="http://schemas.microsoft.com/office/drawing/2014/main" id="{C5891617-D777-D044-8414-7012C9CF0423}"/>
               </a:ext>
             </a:extLst>
@@ -5587,10 +8110,10 @@
             <a:endParaRPr lang="en-US" sz="1800" dirty="0"/>
           </a:p>
           <a:p>
-            <a:r>
-              <a:rPr lang="en-US" sz="1800" dirty="0"/>
-              <a:t>Currently, detectors that count electron-hole pairs have good sensitivity to low-mass WIMPs</a:t>
-            </a:r>
+            <a:pPr marL="0" indent="0">
+              <a:buNone/>
+            </a:pPr>
+            <a:endParaRPr lang="en-US" sz="1800" dirty="0"/>
           </a:p>
         </p:txBody>
       </p:sp>
@@ -5617,7 +8140,7 @@
           <a:p>
             <a:fld id="{035DBD62-E6E0-484E-AB64-E286A6B85B65}" type="slidenum">
               <a:rPr lang="en-US" smtClean="0"/>
-              <a:t>2</a:t>
+              <a:t>3</a:t>
             </a:fld>
             <a:endParaRPr lang="en-US" dirty="0"/>
           </a:p>
@@ -6014,7 +8537,7 @@
 </p:sld>
 </file>
 
-<file path=ppt/slides/slide3.xml><?xml version="1.0" encoding="utf-8"?>
+<file path=ppt/slides/slide4.xml><?xml version="1.0" encoding="utf-8"?>
 <p:sld xmlns:a="http://schemas.openxmlformats.org/drawingml/2006/main" xmlns:r="http://schemas.openxmlformats.org/officeDocument/2006/relationships" xmlns:p="http://schemas.openxmlformats.org/presentationml/2006/main">
   <p:cSld>
     <p:spTree>
@@ -6054,7 +8577,15 @@
           <a:p>
             <a:r>
               <a:rPr lang="en-US" dirty="0"/>
-              <a:t>Charge Creation in Solids </a:t>
+              <a:t>Charge Creation and Detection in </a:t>
+            </a:r>
+            <a:r>
+              <a:rPr lang="en-US" dirty="0" err="1"/>
+              <a:t>CDMSlite</a:t>
+            </a:r>
+            <a:r>
+              <a:rPr lang="en-US" dirty="0"/>
+              <a:t>  </a:t>
             </a:r>
           </a:p>
         </p:txBody>
@@ -6111,7 +8642,7 @@
           <a:p>
             <a:fld id="{035DBD62-E6E0-484E-AB64-E286A6B85B65}" type="slidenum">
               <a:rPr lang="en-US" smtClean="0"/>
-              <a:t>3</a:t>
+              <a:t>4</a:t>
             </a:fld>
             <a:endParaRPr lang="en-US"/>
           </a:p>
@@ -6163,7 +8694,7 @@
         </p:nvSpPr>
         <p:spPr>
           <a:xfrm>
-            <a:off x="838200" y="2480974"/>
+            <a:off x="838200" y="1737598"/>
             <a:ext cx="4930346" cy="4524315"/>
           </a:xfrm>
           <a:prstGeom prst="rect">
@@ -6183,15 +8714,7 @@
             </a:pPr>
             <a:r>
               <a:rPr lang="en-US" dirty="0"/>
-              <a:t>When dark matter hits a </a:t>
-            </a:r>
-            <a:r>
-              <a:rPr lang="en-US" dirty="0" err="1"/>
-              <a:t>nucleous</a:t>
-            </a:r>
-            <a:r>
-              <a:rPr lang="en-US" dirty="0"/>
-              <a:t>, charge is liberated. </a:t>
+              <a:t>Electron-Hole pairs and Prompt Phonons are liberated when particle interacts with the nuclei in the detector. (Silicon or Germanium) </a:t>
             </a:r>
           </a:p>
           <a:p>
@@ -6208,8 +8731,22 @@
             </a:pPr>
             <a:r>
               <a:rPr lang="en-US" dirty="0"/>
-              <a:t>Current generation of low threshold detectors  count number of charge carriers produced. </a:t>
-            </a:r>
+              <a:t>These detectors measure total phonon energy. Which make them really good electron-hole pair counters due to the Luke-</a:t>
+            </a:r>
+            <a:r>
+              <a:rPr lang="en-US" dirty="0" err="1"/>
+              <a:t>Neganov</a:t>
+            </a:r>
+            <a:r>
+              <a:rPr lang="en-US" dirty="0"/>
+              <a:t> effect.</a:t>
+            </a:r>
+          </a:p>
+          <a:p>
+            <a:endParaRPr lang="en-US" dirty="0"/>
+          </a:p>
+          <a:p>
+            <a:endParaRPr lang="en-US" dirty="0"/>
           </a:p>
           <a:p>
             <a:pPr marL="285750" indent="-285750">
@@ -6219,15 +8756,6 @@
             <a:endParaRPr lang="en-US" dirty="0"/>
           </a:p>
           <a:p>
-            <a:endParaRPr lang="en-US" dirty="0"/>
-          </a:p>
-          <a:p>
-            <a:endParaRPr lang="en-US" dirty="0"/>
-          </a:p>
-          <a:p>
-            <a:endParaRPr lang="en-US" dirty="0"/>
-          </a:p>
-          <a:p>
             <a:pPr marL="285750" indent="-285750">
               <a:buFont typeface="Arial" panose="020B0604020202020204" pitchFamily="34" charset="0"/>
               <a:buChar char="•"/>
@@ -6269,13 +8797,6 @@
             </a:pPr>
             <a:endParaRPr lang="en-US" dirty="0"/>
           </a:p>
-          <a:p>
-            <a:pPr marL="285750" indent="-285750">
-              <a:buFont typeface="Arial" panose="020B0604020202020204" pitchFamily="34" charset="0"/>
-              <a:buChar char="•"/>
-            </a:pPr>
-            <a:endParaRPr lang="en-US" dirty="0"/>
-          </a:p>
         </p:txBody>
       </p:sp>
       <p:grpSp>
@@ -6292,9 +8813,9 @@
         </p:nvGrpSpPr>
         <p:grpSpPr>
           <a:xfrm>
-            <a:off x="1886429" y="4743131"/>
+            <a:off x="1886429" y="4920879"/>
             <a:ext cx="2833888" cy="932233"/>
-            <a:chOff x="6634777" y="4844048"/>
+            <a:chOff x="6606201" y="4844048"/>
             <a:chExt cx="2833888" cy="932233"/>
           </a:xfrm>
         </p:grpSpPr>
@@ -6320,7 +8841,7 @@
           </p:blipFill>
           <p:spPr>
             <a:xfrm>
-              <a:off x="6634777" y="5250230"/>
+              <a:off x="6606201" y="5250230"/>
               <a:ext cx="2833888" cy="526051"/>
             </a:xfrm>
             <a:prstGeom prst="rect">
@@ -6372,7 +8893,7 @@
 </p:sld>
 </file>
 
-<file path=ppt/slides/slide4.xml><?xml version="1.0" encoding="utf-8"?>
+<file path=ppt/slides/slide5.xml><?xml version="1.0" encoding="utf-8"?>
 <p:sld xmlns:a="http://schemas.openxmlformats.org/drawingml/2006/main" xmlns:r="http://schemas.openxmlformats.org/officeDocument/2006/relationships" xmlns:p="http://schemas.openxmlformats.org/presentationml/2006/main">
   <p:cSld>
     <p:spTree>
@@ -6394,6 +8915,433 @@
           <p:cNvPr id="2" name="Title 1">
             <a:extLst>
               <a:ext uri="{FF2B5EF4-FFF2-40B4-BE49-F238E27FC236}">
+                <a16:creationId xmlns:a16="http://schemas.microsoft.com/office/drawing/2014/main" id="{24B7DF4A-1926-FD4C-94CA-990D4B267C66}"/>
+              </a:ext>
+            </a:extLst>
+          </p:cNvPr>
+          <p:cNvSpPr>
+            <a:spLocks noGrp="1"/>
+          </p:cNvSpPr>
+          <p:nvPr>
+            <p:ph type="title"/>
+          </p:nvPr>
+        </p:nvSpPr>
+        <p:spPr/>
+        <p:txBody>
+          <a:bodyPr/>
+          <a:lstStyle/>
+          <a:p>
+            <a:r>
+              <a:rPr lang="en-US" dirty="0"/>
+              <a:t>Electron – Hole Pair Creation </a:t>
+            </a:r>
+          </a:p>
+        </p:txBody>
+      </p:sp>
+      <p:sp>
+        <p:nvSpPr>
+          <p:cNvPr id="3" name="Slide Number Placeholder 2">
+            <a:extLst>
+              <a:ext uri="{FF2B5EF4-FFF2-40B4-BE49-F238E27FC236}">
+                <a16:creationId xmlns:a16="http://schemas.microsoft.com/office/drawing/2014/main" id="{3EE1539B-7753-2A46-99F3-9F1D56504805}"/>
+              </a:ext>
+            </a:extLst>
+          </p:cNvPr>
+          <p:cNvSpPr>
+            <a:spLocks noGrp="1"/>
+          </p:cNvSpPr>
+          <p:nvPr>
+            <p:ph type="sldNum" sz="quarter" idx="12"/>
+          </p:nvPr>
+        </p:nvSpPr>
+        <p:spPr/>
+        <p:txBody>
+          <a:bodyPr/>
+          <a:lstStyle/>
+          <a:p>
+            <a:fld id="{035DBD62-E6E0-484E-AB64-E286A6B85B65}" type="slidenum">
+              <a:rPr lang="en-US" smtClean="0"/>
+              <a:t>5</a:t>
+            </a:fld>
+            <a:endParaRPr lang="en-US" dirty="0"/>
+          </a:p>
+        </p:txBody>
+      </p:sp>
+      <p:sp>
+        <p:nvSpPr>
+          <p:cNvPr id="4" name="TextBox 3">
+            <a:extLst>
+              <a:ext uri="{FF2B5EF4-FFF2-40B4-BE49-F238E27FC236}">
+                <a16:creationId xmlns:a16="http://schemas.microsoft.com/office/drawing/2014/main" id="{F7891556-283B-394C-AF9F-1957E51B2D4B}"/>
+              </a:ext>
+            </a:extLst>
+          </p:cNvPr>
+          <p:cNvSpPr txBox="1"/>
+          <p:nvPr/>
+        </p:nvSpPr>
+        <p:spPr>
+          <a:xfrm>
+            <a:off x="2792627" y="2681416"/>
+            <a:ext cx="184731" cy="369332"/>
+          </a:xfrm>
+          <a:prstGeom prst="rect">
+            <a:avLst/>
+          </a:prstGeom>
+          <a:noFill/>
+        </p:spPr>
+        <p:txBody>
+          <a:bodyPr wrap="none" rtlCol="0">
+            <a:spAutoFit/>
+          </a:bodyPr>
+          <a:lstStyle/>
+          <a:p>
+            <a:endParaRPr lang="en-US" dirty="0"/>
+          </a:p>
+        </p:txBody>
+      </p:sp>
+      <p:sp>
+        <p:nvSpPr>
+          <p:cNvPr id="6" name="TextBox 5">
+            <a:extLst>
+              <a:ext uri="{FF2B5EF4-FFF2-40B4-BE49-F238E27FC236}">
+                <a16:creationId xmlns:a16="http://schemas.microsoft.com/office/drawing/2014/main" id="{48197547-3408-3D43-843B-FBD677241214}"/>
+              </a:ext>
+            </a:extLst>
+          </p:cNvPr>
+          <p:cNvSpPr txBox="1"/>
+          <p:nvPr/>
+        </p:nvSpPr>
+        <p:spPr>
+          <a:xfrm>
+            <a:off x="825843" y="1649978"/>
+            <a:ext cx="4930346" cy="5632311"/>
+          </a:xfrm>
+          <a:prstGeom prst="rect">
+            <a:avLst/>
+          </a:prstGeom>
+          <a:noFill/>
+        </p:spPr>
+        <p:txBody>
+          <a:bodyPr wrap="square" rtlCol="0">
+            <a:spAutoFit/>
+          </a:bodyPr>
+          <a:lstStyle/>
+          <a:p>
+            <a:pPr marL="285750" indent="-285750">
+              <a:buFont typeface="Arial" panose="020B0604020202020204" pitchFamily="34" charset="0"/>
+              <a:buChar char="•"/>
+            </a:pPr>
+            <a:r>
+              <a:rPr lang="en-US" dirty="0"/>
+              <a:t>The ionization yield Y converts from recoil energy </a:t>
+            </a:r>
+            <a:r>
+              <a:rPr lang="en-US" dirty="0" err="1"/>
+              <a:t>Er</a:t>
+            </a:r>
+            <a:r>
+              <a:rPr lang="en-US" dirty="0"/>
+              <a:t> to the average number of electron-hole pairs produced &lt;</a:t>
+            </a:r>
+            <a:r>
+              <a:rPr lang="en-US" dirty="0" err="1"/>
+              <a:t>Neh</a:t>
+            </a:r>
+            <a:r>
+              <a:rPr lang="en-US" dirty="0"/>
+              <a:t>&gt;</a:t>
+            </a:r>
+          </a:p>
+          <a:p>
+            <a:pPr marL="285750" indent="-285750">
+              <a:buFont typeface="Arial" panose="020B0604020202020204" pitchFamily="34" charset="0"/>
+              <a:buChar char="•"/>
+            </a:pPr>
+            <a:endParaRPr lang="en-US" dirty="0"/>
+          </a:p>
+          <a:p>
+            <a:pPr marL="285750" indent="-285750">
+              <a:buFont typeface="Arial" panose="020B0604020202020204" pitchFamily="34" charset="0"/>
+              <a:buChar char="•"/>
+            </a:pPr>
+            <a:r>
+              <a:rPr lang="en-US" dirty="0"/>
+              <a:t>The mean number of electron hole pairs produced varies greatly for electron recoils and nuclear recoils. </a:t>
+            </a:r>
+          </a:p>
+          <a:p>
+            <a:pPr marL="285750" indent="-285750">
+              <a:buFont typeface="Arial" panose="020B0604020202020204" pitchFamily="34" charset="0"/>
+              <a:buChar char="•"/>
+            </a:pPr>
+            <a:endParaRPr lang="en-US" dirty="0"/>
+          </a:p>
+          <a:p>
+            <a:pPr marL="285750" indent="-285750">
+              <a:buFont typeface="Arial" panose="020B0604020202020204" pitchFamily="34" charset="0"/>
+              <a:buChar char="•"/>
+            </a:pPr>
+            <a:r>
+              <a:rPr lang="en-US" dirty="0"/>
+              <a:t>Measurements of charge and phonon would mean great discrimination between electron and nuclear recoils (far better than PSD and liquid scintillators)</a:t>
+            </a:r>
+          </a:p>
+          <a:p>
+            <a:pPr marL="285750" indent="-285750">
+              <a:buFont typeface="Arial" panose="020B0604020202020204" pitchFamily="34" charset="0"/>
+              <a:buChar char="•"/>
+            </a:pPr>
+            <a:endParaRPr lang="en-US" dirty="0"/>
+          </a:p>
+          <a:p>
+            <a:endParaRPr lang="en-US" dirty="0"/>
+          </a:p>
+          <a:p>
+            <a:pPr marL="285750" indent="-285750">
+              <a:buFont typeface="Arial" panose="020B0604020202020204" pitchFamily="34" charset="0"/>
+              <a:buChar char="•"/>
+            </a:pPr>
+            <a:endParaRPr lang="en-US" dirty="0"/>
+          </a:p>
+          <a:p>
+            <a:pPr marL="285750" indent="-285750">
+              <a:buFont typeface="Arial" panose="020B0604020202020204" pitchFamily="34" charset="0"/>
+              <a:buChar char="•"/>
+            </a:pPr>
+            <a:endParaRPr lang="en-US" dirty="0"/>
+          </a:p>
+          <a:p>
+            <a:endParaRPr lang="en-US" dirty="0"/>
+          </a:p>
+          <a:p>
+            <a:pPr marL="285750" indent="-285750">
+              <a:buFont typeface="Arial" panose="020B0604020202020204" pitchFamily="34" charset="0"/>
+              <a:buChar char="•"/>
+            </a:pPr>
+            <a:endParaRPr lang="en-US" dirty="0"/>
+          </a:p>
+          <a:p>
+            <a:pPr marL="285750" indent="-285750">
+              <a:buFont typeface="Arial" panose="020B0604020202020204" pitchFamily="34" charset="0"/>
+              <a:buChar char="•"/>
+            </a:pPr>
+            <a:endParaRPr lang="en-US" dirty="0"/>
+          </a:p>
+          <a:p>
+            <a:pPr marL="285750" indent="-285750">
+              <a:buFont typeface="Arial" panose="020B0604020202020204" pitchFamily="34" charset="0"/>
+              <a:buChar char="•"/>
+            </a:pPr>
+            <a:endParaRPr lang="en-US" dirty="0"/>
+          </a:p>
+        </p:txBody>
+      </p:sp>
+      <p:pic>
+        <p:nvPicPr>
+          <p:cNvPr id="12" name="Picture 11">
+            <a:extLst>
+              <a:ext uri="{FF2B5EF4-FFF2-40B4-BE49-F238E27FC236}">
+                <a16:creationId xmlns:a16="http://schemas.microsoft.com/office/drawing/2014/main" id="{779EE5C9-A9BC-A147-8E03-1E7C53D9CB2F}"/>
+              </a:ext>
+            </a:extLst>
+          </p:cNvPr>
+          <p:cNvPicPr>
+            <a:picLocks noChangeAspect="1"/>
+          </p:cNvPicPr>
+          <p:nvPr/>
+        </p:nvPicPr>
+        <p:blipFill>
+          <a:blip r:embed="rId3"/>
+          <a:stretch>
+            <a:fillRect/>
+          </a:stretch>
+        </p:blipFill>
+        <p:spPr>
+          <a:xfrm>
+            <a:off x="7076482" y="1649978"/>
+            <a:ext cx="2957025" cy="1325563"/>
+          </a:xfrm>
+          <a:prstGeom prst="rect">
+            <a:avLst/>
+          </a:prstGeom>
+        </p:spPr>
+      </p:pic>
+      <p:pic>
+        <p:nvPicPr>
+          <p:cNvPr id="14" name="Picture 13">
+            <a:extLst>
+              <a:ext uri="{FF2B5EF4-FFF2-40B4-BE49-F238E27FC236}">
+                <a16:creationId xmlns:a16="http://schemas.microsoft.com/office/drawing/2014/main" id="{DA36B9B5-C651-054C-907F-D0D076CE3416}"/>
+              </a:ext>
+            </a:extLst>
+          </p:cNvPr>
+          <p:cNvPicPr>
+            <a:picLocks noChangeAspect="1"/>
+          </p:cNvPicPr>
+          <p:nvPr/>
+        </p:nvPicPr>
+        <p:blipFill>
+          <a:blip r:embed="rId4"/>
+          <a:stretch>
+            <a:fillRect/>
+          </a:stretch>
+        </p:blipFill>
+        <p:spPr>
+          <a:xfrm>
+            <a:off x="7076482" y="3429000"/>
+            <a:ext cx="4145852" cy="1447758"/>
+          </a:xfrm>
+          <a:prstGeom prst="rect">
+            <a:avLst/>
+          </a:prstGeom>
+        </p:spPr>
+      </p:pic>
+      <p:sp>
+        <p:nvSpPr>
+          <p:cNvPr id="15" name="TextBox 14">
+            <a:extLst>
+              <a:ext uri="{FF2B5EF4-FFF2-40B4-BE49-F238E27FC236}">
+                <a16:creationId xmlns:a16="http://schemas.microsoft.com/office/drawing/2014/main" id="{99D16253-3686-624B-8260-EABEC28458A3}"/>
+              </a:ext>
+            </a:extLst>
+          </p:cNvPr>
+          <p:cNvSpPr txBox="1"/>
+          <p:nvPr/>
+        </p:nvSpPr>
+        <p:spPr>
+          <a:xfrm>
+            <a:off x="7760043" y="1297459"/>
+            <a:ext cx="1715470" cy="369332"/>
+          </a:xfrm>
+          <a:prstGeom prst="rect">
+            <a:avLst/>
+          </a:prstGeom>
+          <a:noFill/>
+        </p:spPr>
+        <p:txBody>
+          <a:bodyPr wrap="none" rtlCol="0">
+            <a:spAutoFit/>
+          </a:bodyPr>
+          <a:lstStyle/>
+          <a:p>
+            <a:r>
+              <a:rPr lang="en-US" u="sng" dirty="0"/>
+              <a:t>Electron Recoils </a:t>
+            </a:r>
+          </a:p>
+        </p:txBody>
+      </p:sp>
+      <p:sp>
+        <p:nvSpPr>
+          <p:cNvPr id="16" name="TextBox 15">
+            <a:extLst>
+              <a:ext uri="{FF2B5EF4-FFF2-40B4-BE49-F238E27FC236}">
+                <a16:creationId xmlns:a16="http://schemas.microsoft.com/office/drawing/2014/main" id="{B7FA9A01-1822-8E42-AB0B-B9C582331989}"/>
+              </a:ext>
+            </a:extLst>
+          </p:cNvPr>
+          <p:cNvSpPr txBox="1"/>
+          <p:nvPr/>
+        </p:nvSpPr>
+        <p:spPr>
+          <a:xfrm>
+            <a:off x="7726242" y="3059668"/>
+            <a:ext cx="1667892" cy="369332"/>
+          </a:xfrm>
+          <a:prstGeom prst="rect">
+            <a:avLst/>
+          </a:prstGeom>
+          <a:noFill/>
+        </p:spPr>
+        <p:txBody>
+          <a:bodyPr wrap="none" rtlCol="0">
+            <a:spAutoFit/>
+          </a:bodyPr>
+          <a:lstStyle/>
+          <a:p>
+            <a:r>
+              <a:rPr lang="en-US" u="sng" dirty="0"/>
+              <a:t>Nuclear Recoils </a:t>
+            </a:r>
+          </a:p>
+        </p:txBody>
+      </p:sp>
+      <p:sp>
+        <p:nvSpPr>
+          <p:cNvPr id="17" name="TextBox 16">
+            <a:extLst>
+              <a:ext uri="{FF2B5EF4-FFF2-40B4-BE49-F238E27FC236}">
+                <a16:creationId xmlns:a16="http://schemas.microsoft.com/office/drawing/2014/main" id="{4AF3D352-2684-D049-94CF-88052F779D55}"/>
+              </a:ext>
+            </a:extLst>
+          </p:cNvPr>
+          <p:cNvSpPr txBox="1"/>
+          <p:nvPr/>
+        </p:nvSpPr>
+        <p:spPr>
+          <a:xfrm>
+            <a:off x="7076482" y="5449329"/>
+            <a:ext cx="3918317" cy="646331"/>
+          </a:xfrm>
+          <a:prstGeom prst="rect">
+            <a:avLst/>
+          </a:prstGeom>
+          <a:noFill/>
+        </p:spPr>
+        <p:txBody>
+          <a:bodyPr wrap="none" rtlCol="0">
+            <a:spAutoFit/>
+          </a:bodyPr>
+          <a:lstStyle/>
+          <a:p>
+            <a:r>
+              <a:rPr lang="en-US" dirty="0"/>
+              <a:t>This makes the energy scale for nuclear </a:t>
+            </a:r>
+          </a:p>
+          <a:p>
+            <a:r>
+              <a:rPr lang="en-US" dirty="0"/>
+              <a:t>recoils nonlinear. </a:t>
+            </a:r>
+          </a:p>
+        </p:txBody>
+      </p:sp>
+    </p:spTree>
+    <p:extLst>
+      <p:ext uri="{BB962C8B-B14F-4D97-AF65-F5344CB8AC3E}">
+        <p14:creationId xmlns:p14="http://schemas.microsoft.com/office/powerpoint/2010/main" val="4234354266"/>
+      </p:ext>
+    </p:extLst>
+  </p:cSld>
+  <p:clrMapOvr>
+    <a:masterClrMapping/>
+  </p:clrMapOvr>
+</p:sld>
+</file>
+
+<file path=ppt/slides/slide6.xml><?xml version="1.0" encoding="utf-8"?>
+<p:sld xmlns:a="http://schemas.openxmlformats.org/drawingml/2006/main" xmlns:r="http://schemas.openxmlformats.org/officeDocument/2006/relationships" xmlns:p="http://schemas.openxmlformats.org/presentationml/2006/main">
+  <p:cSld>
+    <p:spTree>
+      <p:nvGrpSpPr>
+        <p:cNvPr id="1" name=""/>
+        <p:cNvGrpSpPr/>
+        <p:nvPr/>
+      </p:nvGrpSpPr>
+      <p:grpSpPr>
+        <a:xfrm>
+          <a:off x="0" y="0"/>
+          <a:ext cx="0" cy="0"/>
+          <a:chOff x="0" y="0"/>
+          <a:chExt cx="0" cy="0"/>
+        </a:xfrm>
+      </p:grpSpPr>
+      <p:sp>
+        <p:nvSpPr>
+          <p:cNvPr id="2" name="Title 1">
+            <a:extLst>
+              <a:ext uri="{FF2B5EF4-FFF2-40B4-BE49-F238E27FC236}">
                 <a16:creationId xmlns:a16="http://schemas.microsoft.com/office/drawing/2014/main" id="{029CC9B3-EA40-584D-92A7-B27B260E40EE}"/>
               </a:ext>
             </a:extLst>
@@ -6549,7 +9497,7 @@
           <a:p>
             <a:fld id="{035DBD62-E6E0-484E-AB64-E286A6B85B65}" type="slidenum">
               <a:rPr lang="en-US" smtClean="0"/>
-              <a:t>4</a:t>
+              <a:t>6</a:t>
             </a:fld>
             <a:endParaRPr lang="en-US"/>
           </a:p>
@@ -6628,7 +9576,7 @@
 </p:sld>
 </file>
 
-<file path=ppt/slides/slide5.xml><?xml version="1.0" encoding="utf-8"?>
+<file path=ppt/slides/slide7.xml><?xml version="1.0" encoding="utf-8"?>
 <p:sld xmlns:a="http://schemas.openxmlformats.org/drawingml/2006/main" xmlns:r="http://schemas.openxmlformats.org/officeDocument/2006/relationships" xmlns:p="http://schemas.openxmlformats.org/presentationml/2006/main">
   <p:cSld>
     <p:spTree>
@@ -6650,433 +9598,6 @@
           <p:cNvPr id="2" name="Title 1">
             <a:extLst>
               <a:ext uri="{FF2B5EF4-FFF2-40B4-BE49-F238E27FC236}">
-                <a16:creationId xmlns:a16="http://schemas.microsoft.com/office/drawing/2014/main" id="{24B7DF4A-1926-FD4C-94CA-990D4B267C66}"/>
-              </a:ext>
-            </a:extLst>
-          </p:cNvPr>
-          <p:cNvSpPr>
-            <a:spLocks noGrp="1"/>
-          </p:cNvSpPr>
-          <p:nvPr>
-            <p:ph type="title"/>
-          </p:nvPr>
-        </p:nvSpPr>
-        <p:spPr/>
-        <p:txBody>
-          <a:bodyPr/>
-          <a:lstStyle/>
-          <a:p>
-            <a:r>
-              <a:rPr lang="en-US" dirty="0"/>
-              <a:t>Ionization Yield </a:t>
-            </a:r>
-          </a:p>
-        </p:txBody>
-      </p:sp>
-      <p:sp>
-        <p:nvSpPr>
-          <p:cNvPr id="3" name="Slide Number Placeholder 2">
-            <a:extLst>
-              <a:ext uri="{FF2B5EF4-FFF2-40B4-BE49-F238E27FC236}">
-                <a16:creationId xmlns:a16="http://schemas.microsoft.com/office/drawing/2014/main" id="{3EE1539B-7753-2A46-99F3-9F1D56504805}"/>
-              </a:ext>
-            </a:extLst>
-          </p:cNvPr>
-          <p:cNvSpPr>
-            <a:spLocks noGrp="1"/>
-          </p:cNvSpPr>
-          <p:nvPr>
-            <p:ph type="sldNum" sz="quarter" idx="12"/>
-          </p:nvPr>
-        </p:nvSpPr>
-        <p:spPr/>
-        <p:txBody>
-          <a:bodyPr/>
-          <a:lstStyle/>
-          <a:p>
-            <a:fld id="{035DBD62-E6E0-484E-AB64-E286A6B85B65}" type="slidenum">
-              <a:rPr lang="en-US" smtClean="0"/>
-              <a:t>5</a:t>
-            </a:fld>
-            <a:endParaRPr lang="en-US" dirty="0"/>
-          </a:p>
-        </p:txBody>
-      </p:sp>
-      <p:sp>
-        <p:nvSpPr>
-          <p:cNvPr id="4" name="TextBox 3">
-            <a:extLst>
-              <a:ext uri="{FF2B5EF4-FFF2-40B4-BE49-F238E27FC236}">
-                <a16:creationId xmlns:a16="http://schemas.microsoft.com/office/drawing/2014/main" id="{F7891556-283B-394C-AF9F-1957E51B2D4B}"/>
-              </a:ext>
-            </a:extLst>
-          </p:cNvPr>
-          <p:cNvSpPr txBox="1"/>
-          <p:nvPr/>
-        </p:nvSpPr>
-        <p:spPr>
-          <a:xfrm>
-            <a:off x="2792627" y="2681416"/>
-            <a:ext cx="184731" cy="369332"/>
-          </a:xfrm>
-          <a:prstGeom prst="rect">
-            <a:avLst/>
-          </a:prstGeom>
-          <a:noFill/>
-        </p:spPr>
-        <p:txBody>
-          <a:bodyPr wrap="none" rtlCol="0">
-            <a:spAutoFit/>
-          </a:bodyPr>
-          <a:lstStyle/>
-          <a:p>
-            <a:endParaRPr lang="en-US" dirty="0"/>
-          </a:p>
-        </p:txBody>
-      </p:sp>
-      <p:sp>
-        <p:nvSpPr>
-          <p:cNvPr id="6" name="TextBox 5">
-            <a:extLst>
-              <a:ext uri="{FF2B5EF4-FFF2-40B4-BE49-F238E27FC236}">
-                <a16:creationId xmlns:a16="http://schemas.microsoft.com/office/drawing/2014/main" id="{48197547-3408-3D43-843B-FBD677241214}"/>
-              </a:ext>
-            </a:extLst>
-          </p:cNvPr>
-          <p:cNvSpPr txBox="1"/>
-          <p:nvPr/>
-        </p:nvSpPr>
-        <p:spPr>
-          <a:xfrm>
-            <a:off x="825843" y="1649978"/>
-            <a:ext cx="4930346" cy="5632311"/>
-          </a:xfrm>
-          <a:prstGeom prst="rect">
-            <a:avLst/>
-          </a:prstGeom>
-          <a:noFill/>
-        </p:spPr>
-        <p:txBody>
-          <a:bodyPr wrap="square" rtlCol="0">
-            <a:spAutoFit/>
-          </a:bodyPr>
-          <a:lstStyle/>
-          <a:p>
-            <a:pPr marL="285750" indent="-285750">
-              <a:buFont typeface="Arial" panose="020B0604020202020204" pitchFamily="34" charset="0"/>
-              <a:buChar char="•"/>
-            </a:pPr>
-            <a:r>
-              <a:rPr lang="en-US" dirty="0"/>
-              <a:t>The ionization yield Y converts from recoil energy </a:t>
-            </a:r>
-            <a:r>
-              <a:rPr lang="en-US" dirty="0" err="1"/>
-              <a:t>Er</a:t>
-            </a:r>
-            <a:r>
-              <a:rPr lang="en-US" dirty="0"/>
-              <a:t> to the average number of electron-hole pairs produced &lt;</a:t>
-            </a:r>
-            <a:r>
-              <a:rPr lang="en-US" dirty="0" err="1"/>
-              <a:t>Neh</a:t>
-            </a:r>
-            <a:r>
-              <a:rPr lang="en-US" dirty="0"/>
-              <a:t>&gt;</a:t>
-            </a:r>
-          </a:p>
-          <a:p>
-            <a:pPr marL="285750" indent="-285750">
-              <a:buFont typeface="Arial" panose="020B0604020202020204" pitchFamily="34" charset="0"/>
-              <a:buChar char="•"/>
-            </a:pPr>
-            <a:endParaRPr lang="en-US" dirty="0"/>
-          </a:p>
-          <a:p>
-            <a:pPr marL="285750" indent="-285750">
-              <a:buFont typeface="Arial" panose="020B0604020202020204" pitchFamily="34" charset="0"/>
-              <a:buChar char="•"/>
-            </a:pPr>
-            <a:r>
-              <a:rPr lang="en-US" dirty="0"/>
-              <a:t>The mean number of electron hole pairs produced varies greatly for electron recoils and nuclear recoils. </a:t>
-            </a:r>
-          </a:p>
-          <a:p>
-            <a:pPr marL="285750" indent="-285750">
-              <a:buFont typeface="Arial" panose="020B0604020202020204" pitchFamily="34" charset="0"/>
-              <a:buChar char="•"/>
-            </a:pPr>
-            <a:endParaRPr lang="en-US" dirty="0"/>
-          </a:p>
-          <a:p>
-            <a:pPr marL="285750" indent="-285750">
-              <a:buFont typeface="Arial" panose="020B0604020202020204" pitchFamily="34" charset="0"/>
-              <a:buChar char="•"/>
-            </a:pPr>
-            <a:r>
-              <a:rPr lang="en-US" dirty="0"/>
-              <a:t>Measurements of charge and phonon would mean great discrimination between electron and nuclear recoils (far better than PSD and liquid scintillators)</a:t>
-            </a:r>
-          </a:p>
-          <a:p>
-            <a:pPr marL="285750" indent="-285750">
-              <a:buFont typeface="Arial" panose="020B0604020202020204" pitchFamily="34" charset="0"/>
-              <a:buChar char="•"/>
-            </a:pPr>
-            <a:endParaRPr lang="en-US" dirty="0"/>
-          </a:p>
-          <a:p>
-            <a:endParaRPr lang="en-US" dirty="0"/>
-          </a:p>
-          <a:p>
-            <a:pPr marL="285750" indent="-285750">
-              <a:buFont typeface="Arial" panose="020B0604020202020204" pitchFamily="34" charset="0"/>
-              <a:buChar char="•"/>
-            </a:pPr>
-            <a:endParaRPr lang="en-US" dirty="0"/>
-          </a:p>
-          <a:p>
-            <a:pPr marL="285750" indent="-285750">
-              <a:buFont typeface="Arial" panose="020B0604020202020204" pitchFamily="34" charset="0"/>
-              <a:buChar char="•"/>
-            </a:pPr>
-            <a:endParaRPr lang="en-US" dirty="0"/>
-          </a:p>
-          <a:p>
-            <a:endParaRPr lang="en-US" dirty="0"/>
-          </a:p>
-          <a:p>
-            <a:pPr marL="285750" indent="-285750">
-              <a:buFont typeface="Arial" panose="020B0604020202020204" pitchFamily="34" charset="0"/>
-              <a:buChar char="•"/>
-            </a:pPr>
-            <a:endParaRPr lang="en-US" dirty="0"/>
-          </a:p>
-          <a:p>
-            <a:pPr marL="285750" indent="-285750">
-              <a:buFont typeface="Arial" panose="020B0604020202020204" pitchFamily="34" charset="0"/>
-              <a:buChar char="•"/>
-            </a:pPr>
-            <a:endParaRPr lang="en-US" dirty="0"/>
-          </a:p>
-          <a:p>
-            <a:pPr marL="285750" indent="-285750">
-              <a:buFont typeface="Arial" panose="020B0604020202020204" pitchFamily="34" charset="0"/>
-              <a:buChar char="•"/>
-            </a:pPr>
-            <a:endParaRPr lang="en-US" dirty="0"/>
-          </a:p>
-        </p:txBody>
-      </p:sp>
-      <p:pic>
-        <p:nvPicPr>
-          <p:cNvPr id="12" name="Picture 11">
-            <a:extLst>
-              <a:ext uri="{FF2B5EF4-FFF2-40B4-BE49-F238E27FC236}">
-                <a16:creationId xmlns:a16="http://schemas.microsoft.com/office/drawing/2014/main" id="{779EE5C9-A9BC-A147-8E03-1E7C53D9CB2F}"/>
-              </a:ext>
-            </a:extLst>
-          </p:cNvPr>
-          <p:cNvPicPr>
-            <a:picLocks noChangeAspect="1"/>
-          </p:cNvPicPr>
-          <p:nvPr/>
-        </p:nvPicPr>
-        <p:blipFill>
-          <a:blip r:embed="rId3"/>
-          <a:stretch>
-            <a:fillRect/>
-          </a:stretch>
-        </p:blipFill>
-        <p:spPr>
-          <a:xfrm>
-            <a:off x="7076482" y="1649978"/>
-            <a:ext cx="2957025" cy="1325563"/>
-          </a:xfrm>
-          <a:prstGeom prst="rect">
-            <a:avLst/>
-          </a:prstGeom>
-        </p:spPr>
-      </p:pic>
-      <p:pic>
-        <p:nvPicPr>
-          <p:cNvPr id="14" name="Picture 13">
-            <a:extLst>
-              <a:ext uri="{FF2B5EF4-FFF2-40B4-BE49-F238E27FC236}">
-                <a16:creationId xmlns:a16="http://schemas.microsoft.com/office/drawing/2014/main" id="{DA36B9B5-C651-054C-907F-D0D076CE3416}"/>
-              </a:ext>
-            </a:extLst>
-          </p:cNvPr>
-          <p:cNvPicPr>
-            <a:picLocks noChangeAspect="1"/>
-          </p:cNvPicPr>
-          <p:nvPr/>
-        </p:nvPicPr>
-        <p:blipFill>
-          <a:blip r:embed="rId4"/>
-          <a:stretch>
-            <a:fillRect/>
-          </a:stretch>
-        </p:blipFill>
-        <p:spPr>
-          <a:xfrm>
-            <a:off x="7076482" y="3429000"/>
-            <a:ext cx="4145852" cy="1447758"/>
-          </a:xfrm>
-          <a:prstGeom prst="rect">
-            <a:avLst/>
-          </a:prstGeom>
-        </p:spPr>
-      </p:pic>
-      <p:sp>
-        <p:nvSpPr>
-          <p:cNvPr id="15" name="TextBox 14">
-            <a:extLst>
-              <a:ext uri="{FF2B5EF4-FFF2-40B4-BE49-F238E27FC236}">
-                <a16:creationId xmlns:a16="http://schemas.microsoft.com/office/drawing/2014/main" id="{99D16253-3686-624B-8260-EABEC28458A3}"/>
-              </a:ext>
-            </a:extLst>
-          </p:cNvPr>
-          <p:cNvSpPr txBox="1"/>
-          <p:nvPr/>
-        </p:nvSpPr>
-        <p:spPr>
-          <a:xfrm>
-            <a:off x="7760043" y="1297459"/>
-            <a:ext cx="1715470" cy="369332"/>
-          </a:xfrm>
-          <a:prstGeom prst="rect">
-            <a:avLst/>
-          </a:prstGeom>
-          <a:noFill/>
-        </p:spPr>
-        <p:txBody>
-          <a:bodyPr wrap="none" rtlCol="0">
-            <a:spAutoFit/>
-          </a:bodyPr>
-          <a:lstStyle/>
-          <a:p>
-            <a:r>
-              <a:rPr lang="en-US" u="sng" dirty="0"/>
-              <a:t>Electron Recoils </a:t>
-            </a:r>
-          </a:p>
-        </p:txBody>
-      </p:sp>
-      <p:sp>
-        <p:nvSpPr>
-          <p:cNvPr id="16" name="TextBox 15">
-            <a:extLst>
-              <a:ext uri="{FF2B5EF4-FFF2-40B4-BE49-F238E27FC236}">
-                <a16:creationId xmlns:a16="http://schemas.microsoft.com/office/drawing/2014/main" id="{B7FA9A01-1822-8E42-AB0B-B9C582331989}"/>
-              </a:ext>
-            </a:extLst>
-          </p:cNvPr>
-          <p:cNvSpPr txBox="1"/>
-          <p:nvPr/>
-        </p:nvSpPr>
-        <p:spPr>
-          <a:xfrm>
-            <a:off x="7726242" y="3059668"/>
-            <a:ext cx="1667892" cy="369332"/>
-          </a:xfrm>
-          <a:prstGeom prst="rect">
-            <a:avLst/>
-          </a:prstGeom>
-          <a:noFill/>
-        </p:spPr>
-        <p:txBody>
-          <a:bodyPr wrap="none" rtlCol="0">
-            <a:spAutoFit/>
-          </a:bodyPr>
-          <a:lstStyle/>
-          <a:p>
-            <a:r>
-              <a:rPr lang="en-US" u="sng" dirty="0"/>
-              <a:t>Nuclear Recoils </a:t>
-            </a:r>
-          </a:p>
-        </p:txBody>
-      </p:sp>
-      <p:sp>
-        <p:nvSpPr>
-          <p:cNvPr id="17" name="TextBox 16">
-            <a:extLst>
-              <a:ext uri="{FF2B5EF4-FFF2-40B4-BE49-F238E27FC236}">
-                <a16:creationId xmlns:a16="http://schemas.microsoft.com/office/drawing/2014/main" id="{4AF3D352-2684-D049-94CF-88052F779D55}"/>
-              </a:ext>
-            </a:extLst>
-          </p:cNvPr>
-          <p:cNvSpPr txBox="1"/>
-          <p:nvPr/>
-        </p:nvSpPr>
-        <p:spPr>
-          <a:xfrm>
-            <a:off x="7076482" y="5449329"/>
-            <a:ext cx="3918317" cy="646331"/>
-          </a:xfrm>
-          <a:prstGeom prst="rect">
-            <a:avLst/>
-          </a:prstGeom>
-          <a:noFill/>
-        </p:spPr>
-        <p:txBody>
-          <a:bodyPr wrap="none" rtlCol="0">
-            <a:spAutoFit/>
-          </a:bodyPr>
-          <a:lstStyle/>
-          <a:p>
-            <a:r>
-              <a:rPr lang="en-US" dirty="0"/>
-              <a:t>This makes the energy scale for nuclear </a:t>
-            </a:r>
-          </a:p>
-          <a:p>
-            <a:r>
-              <a:rPr lang="en-US" dirty="0"/>
-              <a:t>recoils nonlinear. </a:t>
-            </a:r>
-          </a:p>
-        </p:txBody>
-      </p:sp>
-    </p:spTree>
-    <p:extLst>
-      <p:ext uri="{BB962C8B-B14F-4D97-AF65-F5344CB8AC3E}">
-        <p14:creationId xmlns:p14="http://schemas.microsoft.com/office/powerpoint/2010/main" val="4234354266"/>
-      </p:ext>
-    </p:extLst>
-  </p:cSld>
-  <p:clrMapOvr>
-    <a:masterClrMapping/>
-  </p:clrMapOvr>
-</p:sld>
-</file>
-
-<file path=ppt/slides/slide6.xml><?xml version="1.0" encoding="utf-8"?>
-<p:sld xmlns:a="http://schemas.openxmlformats.org/drawingml/2006/main" xmlns:r="http://schemas.openxmlformats.org/officeDocument/2006/relationships" xmlns:p="http://schemas.openxmlformats.org/presentationml/2006/main">
-  <p:cSld>
-    <p:spTree>
-      <p:nvGrpSpPr>
-        <p:cNvPr id="1" name=""/>
-        <p:cNvGrpSpPr/>
-        <p:nvPr/>
-      </p:nvGrpSpPr>
-      <p:grpSpPr>
-        <a:xfrm>
-          <a:off x="0" y="0"/>
-          <a:ext cx="0" cy="0"/>
-          <a:chOff x="0" y="0"/>
-          <a:chExt cx="0" cy="0"/>
-        </a:xfrm>
-      </p:grpSpPr>
-      <p:sp>
-        <p:nvSpPr>
-          <p:cNvPr id="2" name="Title 1">
-            <a:extLst>
-              <a:ext uri="{FF2B5EF4-FFF2-40B4-BE49-F238E27FC236}">
                 <a16:creationId xmlns:a16="http://schemas.microsoft.com/office/drawing/2014/main" id="{19447540-A80A-E148-9B2F-9EFA205801D4}"/>
               </a:ext>
             </a:extLst>
@@ -7209,7 +9730,7 @@
           <a:p>
             <a:fld id="{035DBD62-E6E0-484E-AB64-E286A6B85B65}" type="slidenum">
               <a:rPr lang="en-US" smtClean="0"/>
-              <a:t>6</a:t>
+              <a:t>7</a:t>
             </a:fld>
             <a:endParaRPr lang="en-US"/>
           </a:p>
@@ -7258,7 +9779,7 @@
 </p:sld>
 </file>
 
-<file path=ppt/slides/slide7.xml><?xml version="1.0" encoding="utf-8"?>
+<file path=ppt/slides/slide8.xml><?xml version="1.0" encoding="utf-8"?>
 <p:sld xmlns:a="http://schemas.openxmlformats.org/drawingml/2006/main" xmlns:r="http://schemas.openxmlformats.org/officeDocument/2006/relationships" xmlns:p="http://schemas.openxmlformats.org/presentationml/2006/main">
   <p:cSld>
     <p:spTree>
@@ -7393,7 +9914,7 @@
           <a:p>
             <a:fld id="{035DBD62-E6E0-484E-AB64-E286A6B85B65}" type="slidenum">
               <a:rPr lang="en-US" smtClean="0"/>
-              <a:t>7</a:t>
+              <a:t>8</a:t>
             </a:fld>
             <a:endParaRPr lang="en-US"/>
           </a:p>
@@ -7442,7 +9963,7 @@
 </p:sld>
 </file>
 
-<file path=ppt/slides/slide8.xml><?xml version="1.0" encoding="utf-8"?>
+<file path=ppt/slides/slide9.xml><?xml version="1.0" encoding="utf-8"?>
 <p:sld xmlns:a="http://schemas.openxmlformats.org/drawingml/2006/main" xmlns:r="http://schemas.openxmlformats.org/officeDocument/2006/relationships" xmlns:p="http://schemas.openxmlformats.org/presentationml/2006/main">
   <p:cSld>
     <p:spTree>
@@ -7514,7 +10035,7 @@
           <a:p>
             <a:fld id="{035DBD62-E6E0-484E-AB64-E286A6B85B65}" type="slidenum">
               <a:rPr lang="en-US" smtClean="0"/>
-              <a:t>8</a:t>
+              <a:t>9</a:t>
             </a:fld>
             <a:endParaRPr lang="en-US"/>
           </a:p>
@@ -7690,224 +10211,6 @@
     <p:extLst>
       <p:ext uri="{BB962C8B-B14F-4D97-AF65-F5344CB8AC3E}">
         <p14:creationId xmlns:p14="http://schemas.microsoft.com/office/powerpoint/2010/main" val="2699634194"/>
-      </p:ext>
-    </p:extLst>
-  </p:cSld>
-  <p:clrMapOvr>
-    <a:masterClrMapping/>
-  </p:clrMapOvr>
-</p:sld>
-</file>
-
-<file path=ppt/slides/slide9.xml><?xml version="1.0" encoding="utf-8"?>
-<p:sld xmlns:a="http://schemas.openxmlformats.org/drawingml/2006/main" xmlns:r="http://schemas.openxmlformats.org/officeDocument/2006/relationships" xmlns:p="http://schemas.openxmlformats.org/presentationml/2006/main">
-  <p:cSld>
-    <p:spTree>
-      <p:nvGrpSpPr>
-        <p:cNvPr id="1" name=""/>
-        <p:cNvGrpSpPr/>
-        <p:nvPr/>
-      </p:nvGrpSpPr>
-      <p:grpSpPr>
-        <a:xfrm>
-          <a:off x="0" y="0"/>
-          <a:ext cx="0" cy="0"/>
-          <a:chOff x="0" y="0"/>
-          <a:chExt cx="0" cy="0"/>
-        </a:xfrm>
-      </p:grpSpPr>
-      <p:sp>
-        <p:nvSpPr>
-          <p:cNvPr id="3" name="Title 2">
-            <a:extLst>
-              <a:ext uri="{FF2B5EF4-FFF2-40B4-BE49-F238E27FC236}">
-                <a16:creationId xmlns:a16="http://schemas.microsoft.com/office/drawing/2014/main" id="{7B230F94-B493-CE43-929A-2A41F3FEB4EF}"/>
-              </a:ext>
-            </a:extLst>
-          </p:cNvPr>
-          <p:cNvSpPr>
-            <a:spLocks noGrp="1"/>
-          </p:cNvSpPr>
-          <p:nvPr>
-            <p:ph type="title"/>
-          </p:nvPr>
-        </p:nvSpPr>
-        <p:spPr/>
-        <p:txBody>
-          <a:bodyPr>
-            <a:normAutofit fontScale="90000"/>
-          </a:bodyPr>
-          <a:lstStyle/>
-          <a:p>
-            <a:br>
-              <a:rPr lang="en-US" dirty="0"/>
-            </a:br>
-            <a:r>
-              <a:rPr lang="en-US" sz="4900" dirty="0"/>
-              <a:t>Quantifying</a:t>
-            </a:r>
-            <a:r>
-              <a:rPr lang="en-US" dirty="0"/>
-              <a:t> Ionization Variance </a:t>
-            </a:r>
-            <a:br>
-              <a:rPr lang="en-US" dirty="0"/>
-            </a:br>
-            <a:endParaRPr lang="en-US" dirty="0"/>
-          </a:p>
-        </p:txBody>
-      </p:sp>
-      <p:sp>
-        <p:nvSpPr>
-          <p:cNvPr id="9" name="Content Placeholder 8">
-            <a:extLst>
-              <a:ext uri="{FF2B5EF4-FFF2-40B4-BE49-F238E27FC236}">
-                <a16:creationId xmlns:a16="http://schemas.microsoft.com/office/drawing/2014/main" id="{64E94FD4-7193-134C-8BE7-18D70D086E45}"/>
-              </a:ext>
-            </a:extLst>
-          </p:cNvPr>
-          <p:cNvSpPr>
-            <a:spLocks noGrp="1"/>
-          </p:cNvSpPr>
-          <p:nvPr>
-            <p:ph idx="1"/>
-          </p:nvPr>
-        </p:nvSpPr>
-        <p:spPr>
-          <a:xfrm>
-            <a:off x="838200" y="1825625"/>
-            <a:ext cx="5618096" cy="4351338"/>
-          </a:xfrm>
-        </p:spPr>
-        <p:txBody>
-          <a:bodyPr>
-            <a:normAutofit/>
-          </a:bodyPr>
-          <a:lstStyle/>
-          <a:p>
-            <a:r>
-              <a:rPr lang="en-US" sz="1800" dirty="0"/>
-              <a:t>Ability to directly to measure charge and phonons separately. Allowing for a direct measurement of the ionization efficiency. </a:t>
-            </a:r>
-          </a:p>
-          <a:p>
-            <a:endParaRPr lang="en-US" sz="1800" dirty="0"/>
-          </a:p>
-          <a:p>
-            <a:r>
-              <a:rPr lang="en-US" sz="1800" dirty="0"/>
-              <a:t>Should be able to extract the width of the nuclear recoil band.</a:t>
-            </a:r>
-          </a:p>
-          <a:p>
-            <a:endParaRPr lang="en-US" sz="1800" dirty="0"/>
-          </a:p>
-          <a:p>
-            <a:r>
-              <a:rPr lang="en-US" sz="1800" dirty="0"/>
-              <a:t>Allows quantify the variation in electron hole pair production. </a:t>
-            </a:r>
-          </a:p>
-        </p:txBody>
-      </p:sp>
-      <p:sp>
-        <p:nvSpPr>
-          <p:cNvPr id="4" name="Slide Number Placeholder 3">
-            <a:extLst>
-              <a:ext uri="{FF2B5EF4-FFF2-40B4-BE49-F238E27FC236}">
-                <a16:creationId xmlns:a16="http://schemas.microsoft.com/office/drawing/2014/main" id="{3BB79DFF-2B30-6C4A-B3BC-8451CDEEBBAD}"/>
-              </a:ext>
-            </a:extLst>
-          </p:cNvPr>
-          <p:cNvSpPr>
-            <a:spLocks noGrp="1"/>
-          </p:cNvSpPr>
-          <p:nvPr>
-            <p:ph type="sldNum" sz="quarter" idx="12"/>
-          </p:nvPr>
-        </p:nvSpPr>
-        <p:spPr/>
-        <p:txBody>
-          <a:bodyPr/>
-          <a:lstStyle/>
-          <a:p>
-            <a:fld id="{035DBD62-E6E0-484E-AB64-E286A6B85B65}" type="slidenum">
-              <a:rPr lang="en-US" smtClean="0"/>
-              <a:t>9</a:t>
-            </a:fld>
-            <a:endParaRPr lang="en-US"/>
-          </a:p>
-        </p:txBody>
-      </p:sp>
-      <p:pic>
-        <p:nvPicPr>
-          <p:cNvPr id="13" name="Picture 12">
-            <a:extLst>
-              <a:ext uri="{FF2B5EF4-FFF2-40B4-BE49-F238E27FC236}">
-                <a16:creationId xmlns:a16="http://schemas.microsoft.com/office/drawing/2014/main" id="{C6CC82BA-8986-654D-9749-C1F34B36D70B}"/>
-              </a:ext>
-            </a:extLst>
-          </p:cNvPr>
-          <p:cNvPicPr>
-            <a:picLocks noChangeAspect="1"/>
-          </p:cNvPicPr>
-          <p:nvPr/>
-        </p:nvPicPr>
-        <p:blipFill>
-          <a:blip r:embed="rId3"/>
-          <a:stretch>
-            <a:fillRect/>
-          </a:stretch>
-        </p:blipFill>
-        <p:spPr>
-          <a:xfrm>
-            <a:off x="6456296" y="1806670"/>
-            <a:ext cx="4897504" cy="4920390"/>
-          </a:xfrm>
-          <a:prstGeom prst="rect">
-            <a:avLst/>
-          </a:prstGeom>
-        </p:spPr>
-      </p:pic>
-      <p:sp>
-        <p:nvSpPr>
-          <p:cNvPr id="2" name="TextBox 1">
-            <a:extLst>
-              <a:ext uri="{FF2B5EF4-FFF2-40B4-BE49-F238E27FC236}">
-                <a16:creationId xmlns:a16="http://schemas.microsoft.com/office/drawing/2014/main" id="{3A2733A5-9A6F-C04B-B0B4-30BF2F429201}"/>
-              </a:ext>
-            </a:extLst>
-          </p:cNvPr>
-          <p:cNvSpPr txBox="1"/>
-          <p:nvPr/>
-        </p:nvSpPr>
-        <p:spPr>
-          <a:xfrm>
-            <a:off x="9510818" y="6535265"/>
-            <a:ext cx="2571538" cy="307777"/>
-          </a:xfrm>
-          <a:prstGeom prst="rect">
-            <a:avLst/>
-          </a:prstGeom>
-          <a:noFill/>
-        </p:spPr>
-        <p:txBody>
-          <a:bodyPr wrap="none" rtlCol="0">
-            <a:spAutoFit/>
-          </a:bodyPr>
-          <a:lstStyle/>
-          <a:p>
-            <a:r>
-              <a:rPr lang="en-US" sz="1400" dirty="0"/>
-              <a:t>DOI 10.1016/j.nima.2004.04.218</a:t>
-            </a:r>
-          </a:p>
-        </p:txBody>
-      </p:sp>
-    </p:spTree>
-    <p:extLst>
-      <p:ext uri="{BB962C8B-B14F-4D97-AF65-F5344CB8AC3E}">
-        <p14:creationId xmlns:p14="http://schemas.microsoft.com/office/powerpoint/2010/main" val="4115652011"/>
       </p:ext>
     </p:extLst>
   </p:cSld>

</xml_diff>